<commit_message>
Started adding xarray and pytensor to lecture 3.
</commit_message>
<xml_diff>
--- a/Lectures/Lecture 3 PyMC and Sampling.pptx
+++ b/Lectures/Lecture 3 PyMC and Sampling.pptx
@@ -5,7 +5,7 @@
     <p:sldMasterId id="2147483648" r:id="rId1"/>
   </p:sldMasterIdLst>
   <p:notesMasterIdLst>
-    <p:notesMasterId r:id="rId44"/>
+    <p:notesMasterId r:id="rId51"/>
   </p:notesMasterIdLst>
   <p:sldIdLst>
     <p:sldId id="256" r:id="rId2"/>
@@ -26,30 +26,37 @@
     <p:sldId id="527" r:id="rId17"/>
     <p:sldId id="528" r:id="rId18"/>
     <p:sldId id="530" r:id="rId19"/>
-    <p:sldId id="539" r:id="rId20"/>
-    <p:sldId id="304" r:id="rId21"/>
-    <p:sldId id="305" r:id="rId22"/>
-    <p:sldId id="307" r:id="rId23"/>
-    <p:sldId id="308" r:id="rId24"/>
-    <p:sldId id="531" r:id="rId25"/>
-    <p:sldId id="540" r:id="rId26"/>
-    <p:sldId id="413" r:id="rId27"/>
-    <p:sldId id="532" r:id="rId28"/>
-    <p:sldId id="349" r:id="rId29"/>
-    <p:sldId id="402" r:id="rId30"/>
-    <p:sldId id="541" r:id="rId31"/>
-    <p:sldId id="529" r:id="rId32"/>
-    <p:sldId id="533" r:id="rId33"/>
-    <p:sldId id="375" r:id="rId34"/>
-    <p:sldId id="376" r:id="rId35"/>
-    <p:sldId id="378" r:id="rId36"/>
-    <p:sldId id="534" r:id="rId37"/>
-    <p:sldId id="542" r:id="rId38"/>
-    <p:sldId id="535" r:id="rId39"/>
-    <p:sldId id="536" r:id="rId40"/>
-    <p:sldId id="537" r:id="rId41"/>
-    <p:sldId id="538" r:id="rId42"/>
-    <p:sldId id="311" r:id="rId43"/>
+    <p:sldId id="559" r:id="rId20"/>
+    <p:sldId id="561" r:id="rId21"/>
+    <p:sldId id="563" r:id="rId22"/>
+    <p:sldId id="560" r:id="rId23"/>
+    <p:sldId id="562" r:id="rId24"/>
+    <p:sldId id="539" r:id="rId25"/>
+    <p:sldId id="304" r:id="rId26"/>
+    <p:sldId id="305" r:id="rId27"/>
+    <p:sldId id="307" r:id="rId28"/>
+    <p:sldId id="308" r:id="rId29"/>
+    <p:sldId id="531" r:id="rId30"/>
+    <p:sldId id="540" r:id="rId31"/>
+    <p:sldId id="413" r:id="rId32"/>
+    <p:sldId id="532" r:id="rId33"/>
+    <p:sldId id="349" r:id="rId34"/>
+    <p:sldId id="402" r:id="rId35"/>
+    <p:sldId id="557" r:id="rId36"/>
+    <p:sldId id="558" r:id="rId37"/>
+    <p:sldId id="541" r:id="rId38"/>
+    <p:sldId id="529" r:id="rId39"/>
+    <p:sldId id="533" r:id="rId40"/>
+    <p:sldId id="375" r:id="rId41"/>
+    <p:sldId id="376" r:id="rId42"/>
+    <p:sldId id="378" r:id="rId43"/>
+    <p:sldId id="534" r:id="rId44"/>
+    <p:sldId id="542" r:id="rId45"/>
+    <p:sldId id="535" r:id="rId46"/>
+    <p:sldId id="536" r:id="rId47"/>
+    <p:sldId id="537" r:id="rId48"/>
+    <p:sldId id="538" r:id="rId49"/>
+    <p:sldId id="311" r:id="rId50"/>
   </p:sldIdLst>
   <p:sldSz cx="12192000" cy="6858000"/>
   <p:notesSz cx="6858000" cy="9144000"/>
@@ -2128,7 +2135,7 @@
           <a:p>
             <a:fld id="{9CF176CD-15D1-4787-BBAA-B7F61FF9E394}" type="datetimeFigureOut">
               <a:rPr lang="en-GB" smtClean="0"/>
-              <a:t>25/02/2025</a:t>
+              <a:t>28/02/2025</a:t>
             </a:fld>
             <a:endParaRPr lang="en-GB"/>
           </a:p>
@@ -2527,7 +2534,7 @@
           <a:p>
             <a:fld id="{633AF1EE-65BA-4140-B6B9-7F82C437F84A}" type="datetimeFigureOut">
               <a:rPr lang="en-GB" smtClean="0"/>
-              <a:t>25/02/2025</a:t>
+              <a:t>28/02/2025</a:t>
             </a:fld>
             <a:endParaRPr lang="en-GB"/>
           </a:p>
@@ -2697,7 +2704,7 @@
           <a:p>
             <a:fld id="{633AF1EE-65BA-4140-B6B9-7F82C437F84A}" type="datetimeFigureOut">
               <a:rPr lang="en-GB" smtClean="0"/>
-              <a:t>25/02/2025</a:t>
+              <a:t>28/02/2025</a:t>
             </a:fld>
             <a:endParaRPr lang="en-GB"/>
           </a:p>
@@ -2877,7 +2884,7 @@
           <a:p>
             <a:fld id="{633AF1EE-65BA-4140-B6B9-7F82C437F84A}" type="datetimeFigureOut">
               <a:rPr lang="en-GB" smtClean="0"/>
-              <a:t>25/02/2025</a:t>
+              <a:t>28/02/2025</a:t>
             </a:fld>
             <a:endParaRPr lang="en-GB"/>
           </a:p>
@@ -3047,7 +3054,7 @@
           <a:p>
             <a:fld id="{633AF1EE-65BA-4140-B6B9-7F82C437F84A}" type="datetimeFigureOut">
               <a:rPr lang="en-GB" smtClean="0"/>
-              <a:t>25/02/2025</a:t>
+              <a:t>28/02/2025</a:t>
             </a:fld>
             <a:endParaRPr lang="en-GB"/>
           </a:p>
@@ -3293,7 +3300,7 @@
           <a:p>
             <a:fld id="{633AF1EE-65BA-4140-B6B9-7F82C437F84A}" type="datetimeFigureOut">
               <a:rPr lang="en-GB" smtClean="0"/>
-              <a:t>25/02/2025</a:t>
+              <a:t>28/02/2025</a:t>
             </a:fld>
             <a:endParaRPr lang="en-GB"/>
           </a:p>
@@ -3525,7 +3532,7 @@
           <a:p>
             <a:fld id="{633AF1EE-65BA-4140-B6B9-7F82C437F84A}" type="datetimeFigureOut">
               <a:rPr lang="en-GB" smtClean="0"/>
-              <a:t>25/02/2025</a:t>
+              <a:t>28/02/2025</a:t>
             </a:fld>
             <a:endParaRPr lang="en-GB"/>
           </a:p>
@@ -3892,7 +3899,7 @@
           <a:p>
             <a:fld id="{633AF1EE-65BA-4140-B6B9-7F82C437F84A}" type="datetimeFigureOut">
               <a:rPr lang="en-GB" smtClean="0"/>
-              <a:t>25/02/2025</a:t>
+              <a:t>28/02/2025</a:t>
             </a:fld>
             <a:endParaRPr lang="en-GB"/>
           </a:p>
@@ -4010,7 +4017,7 @@
           <a:p>
             <a:fld id="{633AF1EE-65BA-4140-B6B9-7F82C437F84A}" type="datetimeFigureOut">
               <a:rPr lang="en-GB" smtClean="0"/>
-              <a:t>25/02/2025</a:t>
+              <a:t>28/02/2025</a:t>
             </a:fld>
             <a:endParaRPr lang="en-GB"/>
           </a:p>
@@ -4105,7 +4112,7 @@
           <a:p>
             <a:fld id="{633AF1EE-65BA-4140-B6B9-7F82C437F84A}" type="datetimeFigureOut">
               <a:rPr lang="en-GB" smtClean="0"/>
-              <a:t>25/02/2025</a:t>
+              <a:t>28/02/2025</a:t>
             </a:fld>
             <a:endParaRPr lang="en-GB"/>
           </a:p>
@@ -4382,7 +4389,7 @@
           <a:p>
             <a:fld id="{633AF1EE-65BA-4140-B6B9-7F82C437F84A}" type="datetimeFigureOut">
               <a:rPr lang="en-GB" smtClean="0"/>
-              <a:t>25/02/2025</a:t>
+              <a:t>28/02/2025</a:t>
             </a:fld>
             <a:endParaRPr lang="en-GB"/>
           </a:p>
@@ -4635,7 +4642,7 @@
           <a:p>
             <a:fld id="{633AF1EE-65BA-4140-B6B9-7F82C437F84A}" type="datetimeFigureOut">
               <a:rPr lang="en-GB" smtClean="0"/>
-              <a:t>25/02/2025</a:t>
+              <a:t>28/02/2025</a:t>
             </a:fld>
             <a:endParaRPr lang="en-GB"/>
           </a:p>
@@ -4848,7 +4855,7 @@
           <a:p>
             <a:fld id="{633AF1EE-65BA-4140-B6B9-7F82C437F84A}" type="datetimeFigureOut">
               <a:rPr lang="en-GB" smtClean="0"/>
-              <a:t>25/02/2025</a:t>
+              <a:t>28/02/2025</a:t>
             </a:fld>
             <a:endParaRPr lang="en-GB"/>
           </a:p>
@@ -5331,11 +5338,11 @@
   <p:clrMapOvr>
     <a:masterClrMapping/>
   </p:clrMapOvr>
-  <mc:AlternateContent xmlns:mc="http://schemas.openxmlformats.org/markup-compatibility/2006">
-    <mc:Choice xmlns:p14="http://schemas.microsoft.com/office/powerpoint/2010/main" Requires="p14">
+  <mc:AlternateContent xmlns:mc="http://schemas.openxmlformats.org/markup-compatibility/2006" xmlns:p14="http://schemas.microsoft.com/office/powerpoint/2010/main">
+    <mc:Choice Requires="p14">
       <p:transition spd="slow" p14:dur="2000" advTm="8862"/>
     </mc:Choice>
-    <mc:Fallback>
+    <mc:Fallback xmlns="">
       <p:transition spd="slow" advTm="8862"/>
     </mc:Fallback>
   </mc:AlternateContent>
@@ -7833,8 +7840,8 @@
         </p:nvSpPr>
         <p:spPr>
           <a:xfrm>
-            <a:off x="777815" y="1960215"/>
-            <a:ext cx="6096000" cy="1077218"/>
+            <a:off x="777814" y="1960215"/>
+            <a:ext cx="6637969" cy="830997"/>
           </a:xfrm>
           <a:prstGeom prst="rect">
             <a:avLst/>
@@ -7848,7 +7855,7 @@
           <a:lstStyle/>
           <a:p>
             <a:r>
-              <a:rPr lang="en-US" sz="1600" b="0">
+              <a:rPr lang="en-US" sz="1600" b="0" dirty="0">
                 <a:solidFill>
                   <a:srgbClr val="001080"/>
                 </a:solidFill>
@@ -7858,7 +7865,7 @@
               <a:t>trials</a:t>
             </a:r>
             <a:r>
-              <a:rPr lang="en-US" sz="1600" b="0">
+              <a:rPr lang="en-US" sz="1600" b="0" dirty="0">
                 <a:solidFill>
                   <a:srgbClr val="3B3B3B"/>
                 </a:solidFill>
@@ -7868,7 +7875,7 @@
               <a:t> </a:t>
             </a:r>
             <a:r>
-              <a:rPr lang="en-US" sz="1600" b="0">
+              <a:rPr lang="en-US" sz="1600" b="0" dirty="0">
                 <a:solidFill>
                   <a:srgbClr val="000000"/>
                 </a:solidFill>
@@ -7878,7 +7885,7 @@
               <a:t>=</a:t>
             </a:r>
             <a:r>
-              <a:rPr lang="en-US" sz="1600" b="0">
+              <a:rPr lang="en-US" sz="1600" b="0" dirty="0">
                 <a:solidFill>
                   <a:srgbClr val="3B3B3B"/>
                 </a:solidFill>
@@ -7888,7 +7895,7 @@
               <a:t> </a:t>
             </a:r>
             <a:r>
-              <a:rPr lang="en-US" sz="1600" b="0">
+              <a:rPr lang="en-US" sz="1600" b="0" dirty="0">
                 <a:solidFill>
                   <a:srgbClr val="098658"/>
                 </a:solidFill>
@@ -7897,7 +7904,7 @@
               </a:rPr>
               <a:t>4</a:t>
             </a:r>
-            <a:endParaRPr lang="en-US" sz="1600" b="0">
+            <a:endParaRPr lang="en-US" sz="1600" b="0" dirty="0">
               <a:solidFill>
                 <a:srgbClr val="3B3B3B"/>
               </a:solidFill>
@@ -7907,7 +7914,7 @@
           </a:p>
           <a:p>
             <a:r>
-              <a:rPr lang="en-US" sz="1600" b="0" err="1">
+              <a:rPr lang="en-US" sz="1600" b="0" dirty="0" err="1">
                 <a:solidFill>
                   <a:srgbClr val="001080"/>
                 </a:solidFill>
@@ -7917,7 +7924,7 @@
               <a:t>theta_real</a:t>
             </a:r>
             <a:r>
-              <a:rPr lang="en-US" sz="1600" b="0">
+              <a:rPr lang="en-US" sz="1600" b="0" dirty="0">
                 <a:solidFill>
                   <a:srgbClr val="3B3B3B"/>
                 </a:solidFill>
@@ -7927,7 +7934,7 @@
               <a:t> </a:t>
             </a:r>
             <a:r>
-              <a:rPr lang="en-US" sz="1600" b="0">
+              <a:rPr lang="en-US" sz="1600" b="0" dirty="0">
                 <a:solidFill>
                   <a:srgbClr val="000000"/>
                 </a:solidFill>
@@ -7937,7 +7944,7 @@
               <a:t>=</a:t>
             </a:r>
             <a:r>
-              <a:rPr lang="en-US" sz="1600" b="0">
+              <a:rPr lang="en-US" sz="1600" b="0" dirty="0">
                 <a:solidFill>
                   <a:srgbClr val="3B3B3B"/>
                 </a:solidFill>
@@ -7947,7 +7954,7 @@
               <a:t> </a:t>
             </a:r>
             <a:r>
-              <a:rPr lang="en-US" sz="1600" b="0">
+              <a:rPr lang="en-US" sz="1600" b="0" dirty="0">
                 <a:solidFill>
                   <a:srgbClr val="098658"/>
                 </a:solidFill>
@@ -7957,7 +7964,7 @@
               <a:t>0.35</a:t>
             </a:r>
             <a:r>
-              <a:rPr lang="en-US" sz="1600" b="0">
+              <a:rPr lang="en-US" sz="1600" b="0" dirty="0">
                 <a:solidFill>
                   <a:srgbClr val="3B3B3B"/>
                 </a:solidFill>
@@ -7967,7 +7974,7 @@
               <a:t> </a:t>
             </a:r>
             <a:r>
-              <a:rPr lang="en-US" sz="1600" b="0">
+              <a:rPr lang="en-US" sz="1600" b="0" dirty="0">
                 <a:solidFill>
                   <a:srgbClr val="008000"/>
                 </a:solidFill>
@@ -7976,7 +7983,7 @@
               </a:rPr>
               <a:t># unknown value in a real experiment</a:t>
             </a:r>
-            <a:endParaRPr lang="en-US" sz="1600" b="0">
+            <a:endParaRPr lang="en-US" sz="1600" b="0" dirty="0">
               <a:solidFill>
                 <a:srgbClr val="3B3B3B"/>
               </a:solidFill>
@@ -7986,7 +7993,7 @@
           </a:p>
           <a:p>
             <a:r>
-              <a:rPr lang="en-US" sz="1600" b="0">
+              <a:rPr lang="en-US" sz="1600" b="0" dirty="0">
                 <a:solidFill>
                   <a:srgbClr val="001080"/>
                 </a:solidFill>
@@ -7996,7 +8003,7 @@
               <a:t>data</a:t>
             </a:r>
             <a:r>
-              <a:rPr lang="en-US" sz="1600" b="0">
+              <a:rPr lang="en-US" sz="1600" b="0" dirty="0">
                 <a:solidFill>
                   <a:srgbClr val="3B3B3B"/>
                 </a:solidFill>
@@ -8006,7 +8013,7 @@
               <a:t> </a:t>
             </a:r>
             <a:r>
-              <a:rPr lang="en-US" sz="1600" b="0">
+              <a:rPr lang="en-US" sz="1600" b="0" dirty="0">
                 <a:solidFill>
                   <a:srgbClr val="000000"/>
                 </a:solidFill>
@@ -8016,7 +8023,7 @@
               <a:t>=</a:t>
             </a:r>
             <a:r>
-              <a:rPr lang="en-US" sz="1600" b="0">
+              <a:rPr lang="en-US" sz="1600" b="0" dirty="0">
                 <a:solidFill>
                   <a:srgbClr val="3B3B3B"/>
                 </a:solidFill>
@@ -8026,7 +8033,7 @@
               <a:t> </a:t>
             </a:r>
             <a:r>
-              <a:rPr lang="en-US" sz="1600" b="0" err="1">
+              <a:rPr lang="en-US" sz="1600" b="0" dirty="0" err="1">
                 <a:solidFill>
                   <a:srgbClr val="267F99"/>
                 </a:solidFill>
@@ -8036,7 +8043,7 @@
               <a:t>pz</a:t>
             </a:r>
             <a:r>
-              <a:rPr lang="en-US" sz="1600" b="0" err="1">
+              <a:rPr lang="en-US" sz="1600" b="0" dirty="0" err="1">
                 <a:solidFill>
                   <a:srgbClr val="3B3B3B"/>
                 </a:solidFill>
@@ -8046,7 +8053,7 @@
               <a:t>.Binomial</a:t>
             </a:r>
             <a:r>
-              <a:rPr lang="en-US" sz="1600" b="0">
+              <a:rPr lang="en-US" sz="1600" b="0" dirty="0">
                 <a:solidFill>
                   <a:srgbClr val="3B3B3B"/>
                 </a:solidFill>
@@ -8056,7 +8063,7 @@
               <a:t>(</a:t>
             </a:r>
             <a:r>
-              <a:rPr lang="en-US" sz="1600" b="0">
+              <a:rPr lang="en-US" sz="1600" b="0" dirty="0">
                 <a:solidFill>
                   <a:srgbClr val="001080"/>
                 </a:solidFill>
@@ -8066,7 +8073,7 @@
               <a:t>n</a:t>
             </a:r>
             <a:r>
-              <a:rPr lang="en-US" sz="1600" b="0">
+              <a:rPr lang="en-US" sz="1600" b="0" dirty="0">
                 <a:solidFill>
                   <a:srgbClr val="000000"/>
                 </a:solidFill>
@@ -8076,7 +8083,7 @@
               <a:t>=</a:t>
             </a:r>
             <a:r>
-              <a:rPr lang="en-US" sz="1600" b="0">
+              <a:rPr lang="en-US" sz="1600" b="0" dirty="0">
                 <a:solidFill>
                   <a:srgbClr val="098658"/>
                 </a:solidFill>
@@ -8086,7 +8093,7 @@
               <a:t>1</a:t>
             </a:r>
             <a:r>
-              <a:rPr lang="en-US" sz="1600" b="0">
+              <a:rPr lang="en-US" sz="1600" b="0" dirty="0">
                 <a:solidFill>
                   <a:srgbClr val="3B3B3B"/>
                 </a:solidFill>
@@ -8096,7 +8103,7 @@
               <a:t>, </a:t>
             </a:r>
             <a:r>
-              <a:rPr lang="en-US" sz="1600" b="0">
+              <a:rPr lang="en-US" sz="1600" b="0" dirty="0">
                 <a:solidFill>
                   <a:srgbClr val="001080"/>
                 </a:solidFill>
@@ -8106,7 +8113,7 @@
               <a:t>p</a:t>
             </a:r>
             <a:r>
-              <a:rPr lang="en-US" sz="1600" b="0">
+              <a:rPr lang="en-US" sz="1600" b="0" dirty="0">
                 <a:solidFill>
                   <a:srgbClr val="000000"/>
                 </a:solidFill>
@@ -8116,7 +8123,7 @@
               <a:t>=</a:t>
             </a:r>
             <a:r>
-              <a:rPr lang="en-US" sz="1600" b="0" err="1">
+              <a:rPr lang="en-US" sz="1600" b="0" dirty="0" err="1">
                 <a:solidFill>
                   <a:srgbClr val="001080"/>
                 </a:solidFill>
@@ -8126,7 +8133,7 @@
               <a:t>theta_real</a:t>
             </a:r>
             <a:r>
-              <a:rPr lang="en-US" sz="1600" b="0">
+              <a:rPr lang="en-US" sz="1600" b="0" dirty="0">
                 <a:solidFill>
                   <a:srgbClr val="3B3B3B"/>
                 </a:solidFill>
@@ -8136,7 +8143,7 @@
               <a:t>).</a:t>
             </a:r>
             <a:r>
-              <a:rPr lang="en-US" sz="1600" b="0" err="1">
+              <a:rPr lang="en-US" sz="1600" b="0" dirty="0" err="1">
                 <a:solidFill>
                   <a:srgbClr val="3B3B3B"/>
                 </a:solidFill>
@@ -8146,7 +8153,7 @@
               <a:t>rvs</a:t>
             </a:r>
             <a:r>
-              <a:rPr lang="en-US" sz="1600" b="0">
+              <a:rPr lang="en-US" sz="1600" b="0" dirty="0">
                 <a:solidFill>
                   <a:srgbClr val="3B3B3B"/>
                 </a:solidFill>
@@ -8156,7 +8163,7 @@
               <a:t>(</a:t>
             </a:r>
             <a:r>
-              <a:rPr lang="en-US" sz="1600" b="0">
+              <a:rPr lang="en-US" sz="1600" b="0" dirty="0">
                 <a:solidFill>
                   <a:srgbClr val="001080"/>
                 </a:solidFill>
@@ -8166,7 +8173,7 @@
               <a:t>trials</a:t>
             </a:r>
             <a:r>
-              <a:rPr lang="en-US" sz="1600" b="0">
+              <a:rPr lang="en-US" sz="1600" b="0" dirty="0">
                 <a:solidFill>
                   <a:srgbClr val="3B3B3B"/>
                 </a:solidFill>
@@ -8441,8 +8448,8 @@
           </a:p>
         </p:txBody>
       </p:sp>
-      <mc:AlternateContent xmlns:mc="http://schemas.openxmlformats.org/markup-compatibility/2006">
-        <mc:Choice xmlns:a14="http://schemas.microsoft.com/office/drawing/2010/main" Requires="a14">
+      <mc:AlternateContent xmlns:mc="http://schemas.openxmlformats.org/markup-compatibility/2006" xmlns:a14="http://schemas.microsoft.com/office/drawing/2010/main">
+        <mc:Choice Requires="a14">
           <p:sp>
             <p:nvSpPr>
               <p:cNvPr id="17" name="TextBox 16">
@@ -8493,7 +8500,7 @@
             </p:txBody>
           </p:sp>
         </mc:Choice>
-        <mc:Fallback>
+        <mc:Fallback xmlns="">
           <p:sp>
             <p:nvSpPr>
               <p:cNvPr id="17" name="TextBox 16">
@@ -8860,10 +8867,10 @@
       </p:sp>
       <p:pic>
         <p:nvPicPr>
-          <p:cNvPr id="4" name="Picture 3">
+          <p:cNvPr id="5" name="Picture 4">
             <a:extLst>
               <a:ext uri="{FF2B5EF4-FFF2-40B4-BE49-F238E27FC236}">
-                <a16:creationId xmlns:a16="http://schemas.microsoft.com/office/drawing/2014/main" id="{DF5822A6-48C8-FE7B-7FE3-57D31FF6AE0F}"/>
+                <a16:creationId xmlns:a16="http://schemas.microsoft.com/office/drawing/2014/main" id="{1E61F531-7DB3-E68F-C2A8-99960F7F042C}"/>
               </a:ext>
             </a:extLst>
           </p:cNvPr>
@@ -8880,8 +8887,8 @@
         </p:blipFill>
         <p:spPr>
           <a:xfrm>
-            <a:off x="838199" y="2889142"/>
-            <a:ext cx="9545659" cy="3234567"/>
+            <a:off x="1423838" y="3249075"/>
+            <a:ext cx="8776349" cy="2392773"/>
           </a:xfrm>
           <a:prstGeom prst="rect">
             <a:avLst/>
@@ -8906,13 +8913,7 @@
   <p:cSld>
     <p:spTree>
       <p:nvGrpSpPr>
-        <p:cNvPr id="1" name="">
-          <a:extLst>
-            <a:ext uri="{FF2B5EF4-FFF2-40B4-BE49-F238E27FC236}">
-              <a16:creationId xmlns:a16="http://schemas.microsoft.com/office/drawing/2014/main" id="{7915DE16-4CBB-F9F2-6538-CA19D02D1864}"/>
-            </a:ext>
-          </a:extLst>
-        </p:cNvPr>
+        <p:cNvPr id="1" name=""/>
         <p:cNvGrpSpPr/>
         <p:nvPr/>
       </p:nvGrpSpPr>
@@ -8926,10 +8927,10 @@
       </p:grpSpPr>
       <p:sp>
         <p:nvSpPr>
-          <p:cNvPr id="6" name="Title 5">
+          <p:cNvPr id="2" name="Title 1">
             <a:extLst>
               <a:ext uri="{FF2B5EF4-FFF2-40B4-BE49-F238E27FC236}">
-                <a16:creationId xmlns:a16="http://schemas.microsoft.com/office/drawing/2014/main" id="{FA766805-9578-29EF-345E-8FD0DB994233}"/>
+                <a16:creationId xmlns:a16="http://schemas.microsoft.com/office/drawing/2014/main" id="{1477C9D5-6E96-2021-60EA-D8D713FDD386}"/>
               </a:ext>
             </a:extLst>
           </p:cNvPr>
@@ -8945,16 +8946,36 @@
           <a:bodyPr/>
           <a:lstStyle/>
           <a:p>
-            <a:endParaRPr lang="en-IL"/>
+            <a:r>
+              <a:rPr lang="en-US" dirty="0"/>
+              <a:t>We get an </a:t>
+            </a:r>
+            <a:r>
+              <a:rPr lang="en-US" sz="3600" dirty="0">
+                <a:solidFill>
+                  <a:schemeClr val="accent6">
+                    <a:lumMod val="75000"/>
+                  </a:schemeClr>
+                </a:solidFill>
+                <a:latin typeface="Courier New" panose="02070309020205020404" pitchFamily="49" charset="0"/>
+                <a:cs typeface="Courier New" panose="02070309020205020404" pitchFamily="49" charset="0"/>
+              </a:rPr>
+              <a:t>inference data</a:t>
+            </a:r>
+            <a:r>
+              <a:rPr lang="en-US" dirty="0"/>
+              <a:t> object</a:t>
+            </a:r>
+            <a:endParaRPr lang="en-IL" dirty="0"/>
           </a:p>
         </p:txBody>
       </p:sp>
       <p:sp>
         <p:nvSpPr>
-          <p:cNvPr id="7" name="Text Placeholder 6">
+          <p:cNvPr id="3" name="Content Placeholder 2">
             <a:extLst>
               <a:ext uri="{FF2B5EF4-FFF2-40B4-BE49-F238E27FC236}">
-                <a16:creationId xmlns:a16="http://schemas.microsoft.com/office/drawing/2014/main" id="{00E80B95-5918-B2FC-5C32-0F37C0AFBAE5}"/>
+                <a16:creationId xmlns:a16="http://schemas.microsoft.com/office/drawing/2014/main" id="{DD99F3C5-740B-8DF1-6798-03FF232675D7}"/>
               </a:ext>
             </a:extLst>
           </p:cNvPr>
@@ -8962,98 +8983,83 @@
             <a:spLocks noGrp="1"/>
           </p:cNvSpPr>
           <p:nvPr>
-            <p:ph type="body" idx="1"/>
+            <p:ph idx="1"/>
           </p:nvPr>
         </p:nvSpPr>
-        <p:spPr/>
+        <p:spPr>
+          <a:xfrm>
+            <a:off x="838200" y="1825625"/>
+            <a:ext cx="10515600" cy="1325563"/>
+          </a:xfrm>
+        </p:spPr>
         <p:txBody>
           <a:bodyPr>
-            <a:normAutofit/>
+            <a:normAutofit lnSpcReduction="10000"/>
           </a:bodyPr>
           <a:lstStyle/>
           <a:p>
-            <a:pPr algn="ctr"/>
-            <a:r>
-              <a:rPr lang="en-US" sz="7200"/>
-              <a:t>3D Sampling</a:t>
-            </a:r>
-            <a:endParaRPr lang="en-IL" sz="7200"/>
+            <a:r>
+              <a:rPr lang="en-US" dirty="0"/>
+              <a:t>It has 3 groups</a:t>
+            </a:r>
+          </a:p>
+          <a:p>
+            <a:pPr lvl="1"/>
+            <a:r>
+              <a:rPr lang="en-US" dirty="0"/>
+              <a:t>So far</a:t>
+            </a:r>
+          </a:p>
+          <a:p>
+            <a:r>
+              <a:rPr lang="en-US" dirty="0"/>
+              <a:t>Each group is an </a:t>
+            </a:r>
+            <a:r>
+              <a:rPr lang="en-US" dirty="0" err="1"/>
+              <a:t>xarray</a:t>
+            </a:r>
+            <a:r>
+              <a:rPr lang="en-US" dirty="0"/>
+              <a:t> Dataset </a:t>
+            </a:r>
           </a:p>
         </p:txBody>
       </p:sp>
-      <p:sp>
-        <p:nvSpPr>
-          <p:cNvPr id="4" name="Footer Placeholder 3">
+      <p:pic>
+        <p:nvPicPr>
+          <p:cNvPr id="4" name="Picture 3">
             <a:extLst>
               <a:ext uri="{FF2B5EF4-FFF2-40B4-BE49-F238E27FC236}">
-                <a16:creationId xmlns:a16="http://schemas.microsoft.com/office/drawing/2014/main" id="{68C9045C-5DFB-FB06-1C84-EC88DD005722}"/>
+                <a16:creationId xmlns:a16="http://schemas.microsoft.com/office/drawing/2014/main" id="{0FA99945-EF1D-15EB-6974-EC7AB7D4BAD3}"/>
               </a:ext>
             </a:extLst>
           </p:cNvPr>
-          <p:cNvSpPr>
-            <a:spLocks noGrp="1"/>
-          </p:cNvSpPr>
-          <p:nvPr>
-            <p:ph type="ftr" sz="quarter" idx="11"/>
-          </p:nvPr>
-        </p:nvSpPr>
-        <p:spPr/>
-        <p:txBody>
-          <a:bodyPr/>
-          <a:lstStyle/>
-          <a:p>
-            <a:pPr>
-              <a:defRPr/>
-            </a:pPr>
-            <a:r>
-              <a:rPr lang="en-US"/>
-              <a:t>Data analysis, 2022-1, Lecture 1</a:t>
-            </a:r>
-          </a:p>
-        </p:txBody>
-      </p:sp>
-      <p:sp>
-        <p:nvSpPr>
-          <p:cNvPr id="5" name="Slide Number Placeholder 4">
-            <a:extLst>
-              <a:ext uri="{FF2B5EF4-FFF2-40B4-BE49-F238E27FC236}">
-                <a16:creationId xmlns:a16="http://schemas.microsoft.com/office/drawing/2014/main" id="{06696472-5AE0-D723-84D7-A399485D2652}"/>
-              </a:ext>
-            </a:extLst>
-          </p:cNvPr>
-          <p:cNvSpPr>
-            <a:spLocks noGrp="1"/>
-          </p:cNvSpPr>
-          <p:nvPr>
-            <p:ph type="sldNum" sz="quarter" idx="12"/>
-          </p:nvPr>
-        </p:nvSpPr>
-        <p:spPr/>
-        <p:txBody>
-          <a:bodyPr/>
-          <a:lstStyle/>
-          <a:p>
-            <a:pPr>
-              <a:defRPr/>
-            </a:pPr>
-            <a:fld id="{3469EAC8-EFAD-49DA-A425-6225312A328A}" type="slidenum">
-              <a:rPr lang="he-IL" altLang="en-US" smtClean="0"/>
-              <a:pPr>
-                <a:defRPr/>
-              </a:pPr>
-              <a:t>19</a:t>
-            </a:fld>
-            <a:r>
-              <a:rPr lang="en-US" altLang="en-US"/>
-              <a:t> /  72</a:t>
-            </a:r>
-          </a:p>
-        </p:txBody>
-      </p:sp>
+          <p:cNvPicPr>
+            <a:picLocks noChangeAspect="1"/>
+          </p:cNvPicPr>
+          <p:nvPr/>
+        </p:nvPicPr>
+        <p:blipFill>
+          <a:blip r:embed="rId2"/>
+          <a:stretch>
+            <a:fillRect/>
+          </a:stretch>
+        </p:blipFill>
+        <p:spPr>
+          <a:xfrm>
+            <a:off x="838200" y="3546241"/>
+            <a:ext cx="2453853" cy="2453853"/>
+          </a:xfrm>
+          <a:prstGeom prst="rect">
+            <a:avLst/>
+          </a:prstGeom>
+        </p:spPr>
+      </p:pic>
     </p:spTree>
     <p:extLst>
       <p:ext uri="{BB962C8B-B14F-4D97-AF65-F5344CB8AC3E}">
-        <p14:creationId xmlns:p14="http://schemas.microsoft.com/office/powerpoint/2010/main" val="4096231202"/>
+        <p14:creationId xmlns:p14="http://schemas.microsoft.com/office/powerpoint/2010/main" val="1665016493"/>
       </p:ext>
     </p:extLst>
   </p:cSld>
@@ -9242,6 +9248,774 @@
       </p:grpSpPr>
       <p:sp>
         <p:nvSpPr>
+          <p:cNvPr id="2" name="Title 1">
+            <a:extLst>
+              <a:ext uri="{FF2B5EF4-FFF2-40B4-BE49-F238E27FC236}">
+                <a16:creationId xmlns:a16="http://schemas.microsoft.com/office/drawing/2014/main" id="{452B5A50-F369-0F61-3798-7DFD420DC25C}"/>
+              </a:ext>
+            </a:extLst>
+          </p:cNvPr>
+          <p:cNvSpPr>
+            <a:spLocks noGrp="1"/>
+          </p:cNvSpPr>
+          <p:nvPr>
+            <p:ph type="title"/>
+          </p:nvPr>
+        </p:nvSpPr>
+        <p:spPr/>
+        <p:txBody>
+          <a:bodyPr/>
+          <a:lstStyle/>
+          <a:p>
+            <a:r>
+              <a:rPr lang="en-US" dirty="0" err="1"/>
+              <a:t>xarray</a:t>
+            </a:r>
+            <a:endParaRPr lang="en-IL" dirty="0"/>
+          </a:p>
+        </p:txBody>
+      </p:sp>
+      <p:sp>
+        <p:nvSpPr>
+          <p:cNvPr id="3" name="Content Placeholder 2">
+            <a:extLst>
+              <a:ext uri="{FF2B5EF4-FFF2-40B4-BE49-F238E27FC236}">
+                <a16:creationId xmlns:a16="http://schemas.microsoft.com/office/drawing/2014/main" id="{50073879-DD6C-F062-DA31-590EA29F47C5}"/>
+              </a:ext>
+            </a:extLst>
+          </p:cNvPr>
+          <p:cNvSpPr>
+            <a:spLocks noGrp="1"/>
+          </p:cNvSpPr>
+          <p:nvPr>
+            <p:ph idx="1"/>
+          </p:nvPr>
+        </p:nvSpPr>
+        <p:spPr>
+          <a:xfrm>
+            <a:off x="838200" y="4389120"/>
+            <a:ext cx="10515600" cy="1787842"/>
+          </a:xfrm>
+        </p:spPr>
+        <p:txBody>
+          <a:bodyPr>
+            <a:normAutofit/>
+          </a:bodyPr>
+          <a:lstStyle/>
+          <a:p>
+            <a:r>
+              <a:rPr lang="en-US" dirty="0" err="1"/>
+              <a:t>xarray</a:t>
+            </a:r>
+            <a:r>
+              <a:rPr lang="en-US" dirty="0"/>
+              <a:t> </a:t>
+            </a:r>
+            <a:r>
+              <a:rPr lang="en-US" dirty="0" err="1"/>
+              <a:t>Dataarrays</a:t>
+            </a:r>
+            <a:r>
+              <a:rPr lang="en-US" dirty="0"/>
+              <a:t> extend Pandas </a:t>
+            </a:r>
+            <a:r>
+              <a:rPr lang="en-US" dirty="0" err="1"/>
+              <a:t>dataframes</a:t>
+            </a:r>
+            <a:r>
+              <a:rPr lang="en-US" dirty="0"/>
+              <a:t> to multiple dimensions</a:t>
+            </a:r>
+          </a:p>
+          <a:p>
+            <a:pPr lvl="1"/>
+            <a:r>
+              <a:rPr lang="en-US" dirty="0"/>
+              <a:t>Each dimension and coordinate can have a name</a:t>
+            </a:r>
+          </a:p>
+          <a:p>
+            <a:r>
+              <a:rPr lang="en-US" dirty="0" err="1"/>
+              <a:t>Xarray</a:t>
+            </a:r>
+            <a:r>
+              <a:rPr lang="en-US" dirty="0"/>
+              <a:t> datasets combine multiple </a:t>
+            </a:r>
+            <a:r>
+              <a:rPr lang="en-US" dirty="0" err="1"/>
+              <a:t>Dataarrays</a:t>
+            </a:r>
+            <a:endParaRPr lang="en-US" dirty="0"/>
+          </a:p>
+          <a:p>
+            <a:pPr lvl="1"/>
+            <a:r>
+              <a:rPr lang="en-US" dirty="0"/>
+              <a:t>With shared dimensions</a:t>
+            </a:r>
+            <a:endParaRPr lang="en-IL" dirty="0"/>
+          </a:p>
+        </p:txBody>
+      </p:sp>
+      <p:pic>
+        <p:nvPicPr>
+          <p:cNvPr id="4" name="Picture 3">
+            <a:extLst>
+              <a:ext uri="{FF2B5EF4-FFF2-40B4-BE49-F238E27FC236}">
+                <a16:creationId xmlns:a16="http://schemas.microsoft.com/office/drawing/2014/main" id="{40C52499-F313-C469-5FDE-A2162B50A9C3}"/>
+              </a:ext>
+            </a:extLst>
+          </p:cNvPr>
+          <p:cNvPicPr>
+            <a:picLocks noChangeAspect="1"/>
+          </p:cNvPicPr>
+          <p:nvPr/>
+        </p:nvPicPr>
+        <p:blipFill>
+          <a:blip r:embed="rId2"/>
+          <a:stretch>
+            <a:fillRect/>
+          </a:stretch>
+        </p:blipFill>
+        <p:spPr>
+          <a:xfrm>
+            <a:off x="2434942" y="593725"/>
+            <a:ext cx="9565034" cy="3530219"/>
+          </a:xfrm>
+          <a:prstGeom prst="rect">
+            <a:avLst/>
+          </a:prstGeom>
+        </p:spPr>
+      </p:pic>
+    </p:spTree>
+    <p:extLst>
+      <p:ext uri="{BB962C8B-B14F-4D97-AF65-F5344CB8AC3E}">
+        <p14:creationId xmlns:p14="http://schemas.microsoft.com/office/powerpoint/2010/main" val="2156838901"/>
+      </p:ext>
+    </p:extLst>
+  </p:cSld>
+  <p:clrMapOvr>
+    <a:masterClrMapping/>
+  </p:clrMapOvr>
+</p:sld>
+</file>
+
+<file path=ppt/slides/slide21.xml><?xml version="1.0" encoding="utf-8"?>
+<p:sld xmlns:a="http://schemas.openxmlformats.org/drawingml/2006/main" xmlns:r="http://schemas.openxmlformats.org/officeDocument/2006/relationships" xmlns:p="http://schemas.openxmlformats.org/presentationml/2006/main">
+  <p:cSld>
+    <p:spTree>
+      <p:nvGrpSpPr>
+        <p:cNvPr id="1" name="">
+          <a:extLst>
+            <a:ext uri="{FF2B5EF4-FFF2-40B4-BE49-F238E27FC236}">
+              <a16:creationId xmlns:a16="http://schemas.microsoft.com/office/drawing/2014/main" id="{BB154C4D-AE7A-2941-4D99-6AC716FF22B6}"/>
+            </a:ext>
+          </a:extLst>
+        </p:cNvPr>
+        <p:cNvGrpSpPr/>
+        <p:nvPr/>
+      </p:nvGrpSpPr>
+      <p:grpSpPr>
+        <a:xfrm>
+          <a:off x="0" y="0"/>
+          <a:ext cx="0" cy="0"/>
+          <a:chOff x="0" y="0"/>
+          <a:chExt cx="0" cy="0"/>
+        </a:xfrm>
+      </p:grpSpPr>
+      <p:sp>
+        <p:nvSpPr>
+          <p:cNvPr id="2" name="Title 1">
+            <a:extLst>
+              <a:ext uri="{FF2B5EF4-FFF2-40B4-BE49-F238E27FC236}">
+                <a16:creationId xmlns:a16="http://schemas.microsoft.com/office/drawing/2014/main" id="{DA3524E5-3FE9-3DD3-BB3F-BCC58254E41F}"/>
+              </a:ext>
+            </a:extLst>
+          </p:cNvPr>
+          <p:cNvSpPr>
+            <a:spLocks noGrp="1"/>
+          </p:cNvSpPr>
+          <p:nvPr>
+            <p:ph type="title"/>
+          </p:nvPr>
+        </p:nvSpPr>
+        <p:spPr/>
+        <p:txBody>
+          <a:bodyPr/>
+          <a:lstStyle/>
+          <a:p>
+            <a:r>
+              <a:rPr lang="en-US" dirty="0" err="1"/>
+              <a:t>Observed_data</a:t>
+            </a:r>
+            <a:r>
+              <a:rPr lang="en-US" dirty="0"/>
+              <a:t> is an </a:t>
+            </a:r>
+            <a:r>
+              <a:rPr lang="en-US" dirty="0" err="1"/>
+              <a:t>xarray</a:t>
+            </a:r>
+            <a:r>
+              <a:rPr lang="en-US" dirty="0"/>
+              <a:t> </a:t>
+            </a:r>
+            <a:r>
+              <a:rPr lang="en-US" dirty="0" err="1"/>
+              <a:t>DataArray</a:t>
+            </a:r>
+            <a:r>
+              <a:rPr lang="en-US" dirty="0"/>
+              <a:t> with the actual data</a:t>
+            </a:r>
+            <a:endParaRPr lang="en-IL" dirty="0"/>
+          </a:p>
+        </p:txBody>
+      </p:sp>
+      <p:sp>
+        <p:nvSpPr>
+          <p:cNvPr id="3" name="Content Placeholder 2">
+            <a:extLst>
+              <a:ext uri="{FF2B5EF4-FFF2-40B4-BE49-F238E27FC236}">
+                <a16:creationId xmlns:a16="http://schemas.microsoft.com/office/drawing/2014/main" id="{F772EED8-4E4B-2CA1-5F8C-37802764C7A5}"/>
+              </a:ext>
+            </a:extLst>
+          </p:cNvPr>
+          <p:cNvSpPr>
+            <a:spLocks noGrp="1"/>
+          </p:cNvSpPr>
+          <p:nvPr>
+            <p:ph idx="1"/>
+          </p:nvPr>
+        </p:nvSpPr>
+        <p:spPr>
+          <a:xfrm>
+            <a:off x="838200" y="1825625"/>
+            <a:ext cx="4565904" cy="4351338"/>
+          </a:xfrm>
+        </p:spPr>
+        <p:txBody>
+          <a:bodyPr/>
+          <a:lstStyle/>
+          <a:p>
+            <a:r>
+              <a:rPr lang="en-US" dirty="0"/>
+              <a:t>Four coin flips</a:t>
+            </a:r>
+          </a:p>
+          <a:p>
+            <a:pPr lvl="1"/>
+            <a:r>
+              <a:rPr lang="en-US" dirty="0"/>
+              <a:t>1 head</a:t>
+            </a:r>
+          </a:p>
+          <a:p>
+            <a:pPr lvl="1"/>
+            <a:r>
+              <a:rPr lang="en-US" dirty="0"/>
+              <a:t>3 tails</a:t>
+            </a:r>
+          </a:p>
+        </p:txBody>
+      </p:sp>
+      <p:pic>
+        <p:nvPicPr>
+          <p:cNvPr id="5" name="Picture 4">
+            <a:extLst>
+              <a:ext uri="{FF2B5EF4-FFF2-40B4-BE49-F238E27FC236}">
+                <a16:creationId xmlns:a16="http://schemas.microsoft.com/office/drawing/2014/main" id="{2F2BB7E2-D91E-901E-82D2-B5F955A14FA6}"/>
+              </a:ext>
+            </a:extLst>
+          </p:cNvPr>
+          <p:cNvPicPr>
+            <a:picLocks noChangeAspect="1"/>
+          </p:cNvPicPr>
+          <p:nvPr/>
+        </p:nvPicPr>
+        <p:blipFill>
+          <a:blip r:embed="rId2"/>
+          <a:stretch>
+            <a:fillRect/>
+          </a:stretch>
+        </p:blipFill>
+        <p:spPr>
+          <a:xfrm>
+            <a:off x="7171787" y="2029817"/>
+            <a:ext cx="3627434" cy="3475021"/>
+          </a:xfrm>
+          <a:prstGeom prst="rect">
+            <a:avLst/>
+          </a:prstGeom>
+        </p:spPr>
+      </p:pic>
+    </p:spTree>
+    <p:extLst>
+      <p:ext uri="{BB962C8B-B14F-4D97-AF65-F5344CB8AC3E}">
+        <p14:creationId xmlns:p14="http://schemas.microsoft.com/office/powerpoint/2010/main" val="383378632"/>
+      </p:ext>
+    </p:extLst>
+  </p:cSld>
+  <p:clrMapOvr>
+    <a:masterClrMapping/>
+  </p:clrMapOvr>
+</p:sld>
+</file>
+
+<file path=ppt/slides/slide22.xml><?xml version="1.0" encoding="utf-8"?>
+<p:sld xmlns:a="http://schemas.openxmlformats.org/drawingml/2006/main" xmlns:r="http://schemas.openxmlformats.org/officeDocument/2006/relationships" xmlns:p="http://schemas.openxmlformats.org/presentationml/2006/main">
+  <p:cSld>
+    <p:spTree>
+      <p:nvGrpSpPr>
+        <p:cNvPr id="1" name="">
+          <a:extLst>
+            <a:ext uri="{FF2B5EF4-FFF2-40B4-BE49-F238E27FC236}">
+              <a16:creationId xmlns:a16="http://schemas.microsoft.com/office/drawing/2014/main" id="{11760456-15DF-DECB-2834-C393EF6E3E35}"/>
+            </a:ext>
+          </a:extLst>
+        </p:cNvPr>
+        <p:cNvGrpSpPr/>
+        <p:nvPr/>
+      </p:nvGrpSpPr>
+      <p:grpSpPr>
+        <a:xfrm>
+          <a:off x="0" y="0"/>
+          <a:ext cx="0" cy="0"/>
+          <a:chOff x="0" y="0"/>
+          <a:chExt cx="0" cy="0"/>
+        </a:xfrm>
+      </p:grpSpPr>
+      <p:sp>
+        <p:nvSpPr>
+          <p:cNvPr id="2" name="Title 1">
+            <a:extLst>
+              <a:ext uri="{FF2B5EF4-FFF2-40B4-BE49-F238E27FC236}">
+                <a16:creationId xmlns:a16="http://schemas.microsoft.com/office/drawing/2014/main" id="{0EFC3E33-465A-6E82-31BC-482B057F7A3A}"/>
+              </a:ext>
+            </a:extLst>
+          </p:cNvPr>
+          <p:cNvSpPr>
+            <a:spLocks noGrp="1"/>
+          </p:cNvSpPr>
+          <p:nvPr>
+            <p:ph type="title"/>
+          </p:nvPr>
+        </p:nvSpPr>
+        <p:spPr/>
+        <p:txBody>
+          <a:bodyPr/>
+          <a:lstStyle/>
+          <a:p>
+            <a:r>
+              <a:rPr lang="en-US" dirty="0"/>
+              <a:t>posterior has the samples</a:t>
+            </a:r>
+            <a:endParaRPr lang="en-IL" dirty="0"/>
+          </a:p>
+        </p:txBody>
+      </p:sp>
+      <p:sp>
+        <p:nvSpPr>
+          <p:cNvPr id="3" name="Content Placeholder 2">
+            <a:extLst>
+              <a:ext uri="{FF2B5EF4-FFF2-40B4-BE49-F238E27FC236}">
+                <a16:creationId xmlns:a16="http://schemas.microsoft.com/office/drawing/2014/main" id="{7BA70383-3BEA-B0F2-9814-374E69ACE971}"/>
+              </a:ext>
+            </a:extLst>
+          </p:cNvPr>
+          <p:cNvSpPr>
+            <a:spLocks noGrp="1"/>
+          </p:cNvSpPr>
+          <p:nvPr>
+            <p:ph idx="1"/>
+          </p:nvPr>
+        </p:nvSpPr>
+        <p:spPr>
+          <a:xfrm>
+            <a:off x="838200" y="1825625"/>
+            <a:ext cx="10515600" cy="1109599"/>
+          </a:xfrm>
+        </p:spPr>
+        <p:txBody>
+          <a:bodyPr>
+            <a:normAutofit fontScale="77500" lnSpcReduction="20000"/>
+          </a:bodyPr>
+          <a:lstStyle/>
+          <a:p>
+            <a:r>
+              <a:rPr lang="en-US" dirty="0"/>
+              <a:t>One variable: </a:t>
+            </a:r>
+            <a:r>
+              <a:rPr lang="el-GR" dirty="0"/>
+              <a:t>θ</a:t>
+            </a:r>
+            <a:endParaRPr lang="en-US" dirty="0"/>
+          </a:p>
+          <a:p>
+            <a:r>
+              <a:rPr lang="en-US" dirty="0"/>
+              <a:t>Two dimensions: chain and draw</a:t>
+            </a:r>
+          </a:p>
+          <a:p>
+            <a:r>
+              <a:rPr lang="en-US" dirty="0"/>
+              <a:t>4,000 samples</a:t>
+            </a:r>
+          </a:p>
+        </p:txBody>
+      </p:sp>
+      <p:pic>
+        <p:nvPicPr>
+          <p:cNvPr id="5" name="Picture 4">
+            <a:extLst>
+              <a:ext uri="{FF2B5EF4-FFF2-40B4-BE49-F238E27FC236}">
+                <a16:creationId xmlns:a16="http://schemas.microsoft.com/office/drawing/2014/main" id="{7A2BDDC6-A3F9-E3FD-DF1A-09C8AF7F980F}"/>
+              </a:ext>
+            </a:extLst>
+          </p:cNvPr>
+          <p:cNvPicPr>
+            <a:picLocks noChangeAspect="1"/>
+          </p:cNvPicPr>
+          <p:nvPr/>
+        </p:nvPicPr>
+        <p:blipFill>
+          <a:blip r:embed="rId2"/>
+          <a:stretch>
+            <a:fillRect/>
+          </a:stretch>
+        </p:blipFill>
+        <p:spPr>
+          <a:xfrm>
+            <a:off x="838200" y="3111812"/>
+            <a:ext cx="5654530" cy="3482642"/>
+          </a:xfrm>
+          <a:prstGeom prst="rect">
+            <a:avLst/>
+          </a:prstGeom>
+        </p:spPr>
+      </p:pic>
+    </p:spTree>
+    <p:extLst>
+      <p:ext uri="{BB962C8B-B14F-4D97-AF65-F5344CB8AC3E}">
+        <p14:creationId xmlns:p14="http://schemas.microsoft.com/office/powerpoint/2010/main" val="3752839301"/>
+      </p:ext>
+    </p:extLst>
+  </p:cSld>
+  <p:clrMapOvr>
+    <a:masterClrMapping/>
+  </p:clrMapOvr>
+</p:sld>
+</file>
+
+<file path=ppt/slides/slide23.xml><?xml version="1.0" encoding="utf-8"?>
+<p:sld xmlns:a="http://schemas.openxmlformats.org/drawingml/2006/main" xmlns:r="http://schemas.openxmlformats.org/officeDocument/2006/relationships" xmlns:p="http://schemas.openxmlformats.org/presentationml/2006/main">
+  <p:cSld>
+    <p:spTree>
+      <p:nvGrpSpPr>
+        <p:cNvPr id="1" name=""/>
+        <p:cNvGrpSpPr/>
+        <p:nvPr/>
+      </p:nvGrpSpPr>
+      <p:grpSpPr>
+        <a:xfrm>
+          <a:off x="0" y="0"/>
+          <a:ext cx="0" cy="0"/>
+          <a:chOff x="0" y="0"/>
+          <a:chExt cx="0" cy="0"/>
+        </a:xfrm>
+      </p:grpSpPr>
+      <p:sp>
+        <p:nvSpPr>
+          <p:cNvPr id="2" name="Title 1">
+            <a:extLst>
+              <a:ext uri="{FF2B5EF4-FFF2-40B4-BE49-F238E27FC236}">
+                <a16:creationId xmlns:a16="http://schemas.microsoft.com/office/drawing/2014/main" id="{2648625F-6827-3A29-B004-CA1677E4EBCC}"/>
+              </a:ext>
+            </a:extLst>
+          </p:cNvPr>
+          <p:cNvSpPr>
+            <a:spLocks noGrp="1"/>
+          </p:cNvSpPr>
+          <p:nvPr>
+            <p:ph type="title"/>
+          </p:nvPr>
+        </p:nvSpPr>
+        <p:spPr/>
+        <p:txBody>
+          <a:bodyPr/>
+          <a:lstStyle/>
+          <a:p>
+            <a:r>
+              <a:rPr lang="en-US" dirty="0"/>
+              <a:t>Sample stats contains data about sampling</a:t>
+            </a:r>
+            <a:endParaRPr lang="en-IL" dirty="0"/>
+          </a:p>
+        </p:txBody>
+      </p:sp>
+      <p:sp>
+        <p:nvSpPr>
+          <p:cNvPr id="3" name="Content Placeholder 2">
+            <a:extLst>
+              <a:ext uri="{FF2B5EF4-FFF2-40B4-BE49-F238E27FC236}">
+                <a16:creationId xmlns:a16="http://schemas.microsoft.com/office/drawing/2014/main" id="{BE4C7339-DC7F-0B81-C8DD-36C0A0B0BDFA}"/>
+              </a:ext>
+            </a:extLst>
+          </p:cNvPr>
+          <p:cNvSpPr>
+            <a:spLocks noGrp="1"/>
+          </p:cNvSpPr>
+          <p:nvPr>
+            <p:ph idx="1"/>
+          </p:nvPr>
+        </p:nvSpPr>
+        <p:spPr>
+          <a:xfrm>
+            <a:off x="838200" y="1825625"/>
+            <a:ext cx="4565904" cy="4351338"/>
+          </a:xfrm>
+        </p:spPr>
+        <p:txBody>
+          <a:bodyPr/>
+          <a:lstStyle/>
+          <a:p>
+            <a:r>
+              <a:rPr lang="en-US" dirty="0"/>
+              <a:t>Can be safely ignored for now</a:t>
+            </a:r>
+            <a:endParaRPr lang="en-IL" dirty="0"/>
+          </a:p>
+        </p:txBody>
+      </p:sp>
+      <p:pic>
+        <p:nvPicPr>
+          <p:cNvPr id="4" name="Picture 3">
+            <a:extLst>
+              <a:ext uri="{FF2B5EF4-FFF2-40B4-BE49-F238E27FC236}">
+                <a16:creationId xmlns:a16="http://schemas.microsoft.com/office/drawing/2014/main" id="{9579F29D-650E-8951-A951-29096CDCD037}"/>
+              </a:ext>
+            </a:extLst>
+          </p:cNvPr>
+          <p:cNvPicPr>
+            <a:picLocks noChangeAspect="1"/>
+          </p:cNvPicPr>
+          <p:nvPr/>
+        </p:nvPicPr>
+        <p:blipFill>
+          <a:blip r:embed="rId2"/>
+          <a:stretch>
+            <a:fillRect/>
+          </a:stretch>
+        </p:blipFill>
+        <p:spPr>
+          <a:xfrm>
+            <a:off x="6227064" y="1411008"/>
+            <a:ext cx="5598599" cy="5345455"/>
+          </a:xfrm>
+          <a:prstGeom prst="rect">
+            <a:avLst/>
+          </a:prstGeom>
+        </p:spPr>
+      </p:pic>
+    </p:spTree>
+    <p:extLst>
+      <p:ext uri="{BB962C8B-B14F-4D97-AF65-F5344CB8AC3E}">
+        <p14:creationId xmlns:p14="http://schemas.microsoft.com/office/powerpoint/2010/main" val="3848198670"/>
+      </p:ext>
+    </p:extLst>
+  </p:cSld>
+  <p:clrMapOvr>
+    <a:masterClrMapping/>
+  </p:clrMapOvr>
+</p:sld>
+</file>
+
+<file path=ppt/slides/slide24.xml><?xml version="1.0" encoding="utf-8"?>
+<p:sld xmlns:a="http://schemas.openxmlformats.org/drawingml/2006/main" xmlns:r="http://schemas.openxmlformats.org/officeDocument/2006/relationships" xmlns:p="http://schemas.openxmlformats.org/presentationml/2006/main">
+  <p:cSld>
+    <p:spTree>
+      <p:nvGrpSpPr>
+        <p:cNvPr id="1" name="">
+          <a:extLst>
+            <a:ext uri="{FF2B5EF4-FFF2-40B4-BE49-F238E27FC236}">
+              <a16:creationId xmlns:a16="http://schemas.microsoft.com/office/drawing/2014/main" id="{7915DE16-4CBB-F9F2-6538-CA19D02D1864}"/>
+            </a:ext>
+          </a:extLst>
+        </p:cNvPr>
+        <p:cNvGrpSpPr/>
+        <p:nvPr/>
+      </p:nvGrpSpPr>
+      <p:grpSpPr>
+        <a:xfrm>
+          <a:off x="0" y="0"/>
+          <a:ext cx="0" cy="0"/>
+          <a:chOff x="0" y="0"/>
+          <a:chExt cx="0" cy="0"/>
+        </a:xfrm>
+      </p:grpSpPr>
+      <p:sp>
+        <p:nvSpPr>
+          <p:cNvPr id="6" name="Title 5">
+            <a:extLst>
+              <a:ext uri="{FF2B5EF4-FFF2-40B4-BE49-F238E27FC236}">
+                <a16:creationId xmlns:a16="http://schemas.microsoft.com/office/drawing/2014/main" id="{FA766805-9578-29EF-345E-8FD0DB994233}"/>
+              </a:ext>
+            </a:extLst>
+          </p:cNvPr>
+          <p:cNvSpPr>
+            <a:spLocks noGrp="1"/>
+          </p:cNvSpPr>
+          <p:nvPr>
+            <p:ph type="title"/>
+          </p:nvPr>
+        </p:nvSpPr>
+        <p:spPr/>
+        <p:txBody>
+          <a:bodyPr/>
+          <a:lstStyle/>
+          <a:p>
+            <a:endParaRPr lang="en-IL"/>
+          </a:p>
+        </p:txBody>
+      </p:sp>
+      <p:sp>
+        <p:nvSpPr>
+          <p:cNvPr id="7" name="Text Placeholder 6">
+            <a:extLst>
+              <a:ext uri="{FF2B5EF4-FFF2-40B4-BE49-F238E27FC236}">
+                <a16:creationId xmlns:a16="http://schemas.microsoft.com/office/drawing/2014/main" id="{00E80B95-5918-B2FC-5C32-0F37C0AFBAE5}"/>
+              </a:ext>
+            </a:extLst>
+          </p:cNvPr>
+          <p:cNvSpPr>
+            <a:spLocks noGrp="1"/>
+          </p:cNvSpPr>
+          <p:nvPr>
+            <p:ph type="body" idx="1"/>
+          </p:nvPr>
+        </p:nvSpPr>
+        <p:spPr/>
+        <p:txBody>
+          <a:bodyPr>
+            <a:normAutofit/>
+          </a:bodyPr>
+          <a:lstStyle/>
+          <a:p>
+            <a:pPr algn="ctr"/>
+            <a:r>
+              <a:rPr lang="en-US" sz="7200"/>
+              <a:t>3D Sampling</a:t>
+            </a:r>
+            <a:endParaRPr lang="en-IL" sz="7200"/>
+          </a:p>
+        </p:txBody>
+      </p:sp>
+      <p:sp>
+        <p:nvSpPr>
+          <p:cNvPr id="4" name="Footer Placeholder 3">
+            <a:extLst>
+              <a:ext uri="{FF2B5EF4-FFF2-40B4-BE49-F238E27FC236}">
+                <a16:creationId xmlns:a16="http://schemas.microsoft.com/office/drawing/2014/main" id="{68C9045C-5DFB-FB06-1C84-EC88DD005722}"/>
+              </a:ext>
+            </a:extLst>
+          </p:cNvPr>
+          <p:cNvSpPr>
+            <a:spLocks noGrp="1"/>
+          </p:cNvSpPr>
+          <p:nvPr>
+            <p:ph type="ftr" sz="quarter" idx="11"/>
+          </p:nvPr>
+        </p:nvSpPr>
+        <p:spPr/>
+        <p:txBody>
+          <a:bodyPr/>
+          <a:lstStyle/>
+          <a:p>
+            <a:pPr>
+              <a:defRPr/>
+            </a:pPr>
+            <a:r>
+              <a:rPr lang="en-US"/>
+              <a:t>Data analysis, 2022-1, Lecture 1</a:t>
+            </a:r>
+          </a:p>
+        </p:txBody>
+      </p:sp>
+      <p:sp>
+        <p:nvSpPr>
+          <p:cNvPr id="5" name="Slide Number Placeholder 4">
+            <a:extLst>
+              <a:ext uri="{FF2B5EF4-FFF2-40B4-BE49-F238E27FC236}">
+                <a16:creationId xmlns:a16="http://schemas.microsoft.com/office/drawing/2014/main" id="{06696472-5AE0-D723-84D7-A399485D2652}"/>
+              </a:ext>
+            </a:extLst>
+          </p:cNvPr>
+          <p:cNvSpPr>
+            <a:spLocks noGrp="1"/>
+          </p:cNvSpPr>
+          <p:nvPr>
+            <p:ph type="sldNum" sz="quarter" idx="12"/>
+          </p:nvPr>
+        </p:nvSpPr>
+        <p:spPr/>
+        <p:txBody>
+          <a:bodyPr/>
+          <a:lstStyle/>
+          <a:p>
+            <a:pPr>
+              <a:defRPr/>
+            </a:pPr>
+            <a:fld id="{3469EAC8-EFAD-49DA-A425-6225312A328A}" type="slidenum">
+              <a:rPr lang="he-IL" altLang="en-US" smtClean="0"/>
+              <a:pPr>
+                <a:defRPr/>
+              </a:pPr>
+              <a:t>24</a:t>
+            </a:fld>
+            <a:r>
+              <a:rPr lang="en-US" altLang="en-US"/>
+              <a:t> /  72</a:t>
+            </a:r>
+          </a:p>
+        </p:txBody>
+      </p:sp>
+    </p:spTree>
+    <p:extLst>
+      <p:ext uri="{BB962C8B-B14F-4D97-AF65-F5344CB8AC3E}">
+        <p14:creationId xmlns:p14="http://schemas.microsoft.com/office/powerpoint/2010/main" val="4096231202"/>
+      </p:ext>
+    </p:extLst>
+  </p:cSld>
+  <p:clrMapOvr>
+    <a:masterClrMapping/>
+  </p:clrMapOvr>
+</p:sld>
+</file>
+
+<file path=ppt/slides/slide25.xml><?xml version="1.0" encoding="utf-8"?>
+<p:sld xmlns:a="http://schemas.openxmlformats.org/drawingml/2006/main" xmlns:r="http://schemas.openxmlformats.org/officeDocument/2006/relationships" xmlns:p="http://schemas.openxmlformats.org/presentationml/2006/main">
+  <p:cSld>
+    <p:spTree>
+      <p:nvGrpSpPr>
+        <p:cNvPr id="1" name=""/>
+        <p:cNvGrpSpPr/>
+        <p:nvPr/>
+      </p:nvGrpSpPr>
+      <p:grpSpPr>
+        <a:xfrm>
+          <a:off x="0" y="0"/>
+          <a:ext cx="0" cy="0"/>
+          <a:chOff x="0" y="0"/>
+          <a:chExt cx="0" cy="0"/>
+        </a:xfrm>
+      </p:grpSpPr>
+      <p:sp>
+        <p:nvSpPr>
           <p:cNvPr id="2" name="Title 1"/>
           <p:cNvSpPr>
             <a:spLocks noGrp="1"/>
@@ -9347,7 +10121,7 @@
 </p:sld>
 </file>
 
-<file path=ppt/slides/slide21.xml><?xml version="1.0" encoding="utf-8"?>
+<file path=ppt/slides/slide26.xml><?xml version="1.0" encoding="utf-8"?>
 <p:sld xmlns:a="http://schemas.openxmlformats.org/drawingml/2006/main" xmlns:r="http://schemas.openxmlformats.org/officeDocument/2006/relationships" xmlns:p="http://schemas.openxmlformats.org/presentationml/2006/main">
   <p:cSld>
     <p:spTree>
@@ -9455,7 +10229,7 @@
 </p:sld>
 </file>
 
-<file path=ppt/slides/slide22.xml><?xml version="1.0" encoding="utf-8"?>
+<file path=ppt/slides/slide27.xml><?xml version="1.0" encoding="utf-8"?>
 <p:sld xmlns:a="http://schemas.openxmlformats.org/drawingml/2006/main" xmlns:r="http://schemas.openxmlformats.org/officeDocument/2006/relationships" xmlns:p="http://schemas.openxmlformats.org/presentationml/2006/main">
   <p:cSld>
     <p:spTree>
@@ -9618,7 +10392,7 @@
 </p:sld>
 </file>
 
-<file path=ppt/slides/slide23.xml><?xml version="1.0" encoding="utf-8"?>
+<file path=ppt/slides/slide28.xml><?xml version="1.0" encoding="utf-8"?>
 <p:sld xmlns:a="http://schemas.openxmlformats.org/drawingml/2006/main" xmlns:r="http://schemas.openxmlformats.org/officeDocument/2006/relationships" xmlns:p="http://schemas.openxmlformats.org/presentationml/2006/main">
   <p:cSld>
     <p:spTree>
@@ -9871,7 +10645,7 @@
 </p:sld>
 </file>
 
-<file path=ppt/slides/slide24.xml><?xml version="1.0" encoding="utf-8"?>
+<file path=ppt/slides/slide29.xml><?xml version="1.0" encoding="utf-8"?>
 <p:sld xmlns:a="http://schemas.openxmlformats.org/drawingml/2006/main" xmlns:r="http://schemas.openxmlformats.org/officeDocument/2006/relationships" xmlns:p="http://schemas.openxmlformats.org/presentationml/2006/main">
   <p:cSld>
     <p:spTree>
@@ -10845,7 +11619,205 @@
 </p:sld>
 </file>
 
-<file path=ppt/slides/slide25.xml><?xml version="1.0" encoding="utf-8"?>
+<file path=ppt/slides/slide3.xml><?xml version="1.0" encoding="utf-8"?>
+<p:sld xmlns:a="http://schemas.openxmlformats.org/drawingml/2006/main" xmlns:r="http://schemas.openxmlformats.org/officeDocument/2006/relationships" xmlns:p="http://schemas.openxmlformats.org/presentationml/2006/main">
+  <p:cSld>
+    <p:spTree>
+      <p:nvGrpSpPr>
+        <p:cNvPr id="1" name=""/>
+        <p:cNvGrpSpPr/>
+        <p:nvPr/>
+      </p:nvGrpSpPr>
+      <p:grpSpPr>
+        <a:xfrm>
+          <a:off x="0" y="0"/>
+          <a:ext cx="0" cy="0"/>
+          <a:chOff x="0" y="0"/>
+          <a:chExt cx="0" cy="0"/>
+        </a:xfrm>
+      </p:grpSpPr>
+      <p:sp>
+        <p:nvSpPr>
+          <p:cNvPr id="4" name="Title 3">
+            <a:extLst>
+              <a:ext uri="{FF2B5EF4-FFF2-40B4-BE49-F238E27FC236}">
+                <a16:creationId xmlns:a16="http://schemas.microsoft.com/office/drawing/2014/main" id="{3DC65EE0-F03B-514B-483B-16C5CBAEACE0}"/>
+              </a:ext>
+            </a:extLst>
+          </p:cNvPr>
+          <p:cNvSpPr>
+            <a:spLocks noGrp="1"/>
+          </p:cNvSpPr>
+          <p:nvPr>
+            <p:ph type="title"/>
+          </p:nvPr>
+        </p:nvSpPr>
+        <p:spPr/>
+        <p:txBody>
+          <a:bodyPr/>
+          <a:lstStyle/>
+          <a:p>
+            <a:r>
+              <a:rPr lang="en-US"/>
+              <a:t>Models</a:t>
+            </a:r>
+            <a:endParaRPr lang="en-IL"/>
+          </a:p>
+        </p:txBody>
+      </p:sp>
+      <p:sp>
+        <p:nvSpPr>
+          <p:cNvPr id="5" name="Content Placeholder 4">
+            <a:extLst>
+              <a:ext uri="{FF2B5EF4-FFF2-40B4-BE49-F238E27FC236}">
+                <a16:creationId xmlns:a16="http://schemas.microsoft.com/office/drawing/2014/main" id="{4092FFCA-6A6D-88F6-BAB1-29F7D849F1DF}"/>
+              </a:ext>
+            </a:extLst>
+          </p:cNvPr>
+          <p:cNvSpPr>
+            <a:spLocks noGrp="1"/>
+          </p:cNvSpPr>
+          <p:nvPr>
+            <p:ph idx="1"/>
+          </p:nvPr>
+        </p:nvSpPr>
+        <p:spPr>
+          <a:xfrm>
+            <a:off x="329671" y="1588558"/>
+            <a:ext cx="5427133" cy="4351338"/>
+          </a:xfrm>
+        </p:spPr>
+        <p:txBody>
+          <a:bodyPr/>
+          <a:lstStyle/>
+          <a:p>
+            <a:r>
+              <a:rPr lang="en-US"/>
+              <a:t>Can write the model with equations or pictures</a:t>
+            </a:r>
+            <a:endParaRPr lang="en-IL"/>
+          </a:p>
+        </p:txBody>
+      </p:sp>
+      <p:pic>
+        <p:nvPicPr>
+          <p:cNvPr id="3" name="Graphic 2">
+            <a:extLst>
+              <a:ext uri="{FF2B5EF4-FFF2-40B4-BE49-F238E27FC236}">
+                <a16:creationId xmlns:a16="http://schemas.microsoft.com/office/drawing/2014/main" id="{31BA305D-8569-0910-4928-3C4B4AD6CBAE}"/>
+              </a:ext>
+            </a:extLst>
+          </p:cNvPr>
+          <p:cNvPicPr>
+            <a:picLocks noChangeAspect="1"/>
+          </p:cNvPicPr>
+          <p:nvPr/>
+        </p:nvPicPr>
+        <p:blipFill>
+          <a:blip r:embed="rId2">
+            <a:extLst>
+              <a:ext uri="{96DAC541-7B7A-43D3-8B79-37D633B846F1}">
+                <asvg:svgBlip xmlns:asvg="http://schemas.microsoft.com/office/drawing/2016/SVG/main" r:embed="rId3"/>
+              </a:ext>
+            </a:extLst>
+          </a:blip>
+          <a:stretch>
+            <a:fillRect/>
+          </a:stretch>
+        </p:blipFill>
+        <p:spPr>
+          <a:xfrm>
+            <a:off x="8177742" y="1266825"/>
+            <a:ext cx="1695450" cy="4324350"/>
+          </a:xfrm>
+          <a:prstGeom prst="rect">
+            <a:avLst/>
+          </a:prstGeom>
+        </p:spPr>
+      </p:pic>
+      <p:graphicFrame>
+        <p:nvGraphicFramePr>
+          <p:cNvPr id="2" name="Object 1">
+            <a:extLst>
+              <a:ext uri="{FF2B5EF4-FFF2-40B4-BE49-F238E27FC236}">
+                <a16:creationId xmlns:a16="http://schemas.microsoft.com/office/drawing/2014/main" id="{5079C67F-A11D-3C42-F63B-A3BC977BB773}"/>
+              </a:ext>
+            </a:extLst>
+          </p:cNvPr>
+          <p:cNvGraphicFramePr>
+            <a:graphicFrameLocks noChangeAspect="1"/>
+          </p:cNvGraphicFramePr>
+          <p:nvPr>
+            <p:extLst>
+              <p:ext uri="{D42A27DB-BD31-4B8C-83A1-F6EECF244321}">
+                <p14:modId xmlns:p14="http://schemas.microsoft.com/office/powerpoint/2010/main" val="2836876110"/>
+              </p:ext>
+            </p:extLst>
+          </p:nvPr>
+        </p:nvGraphicFramePr>
+        <p:xfrm>
+          <a:off x="4976284" y="1588558"/>
+          <a:ext cx="2374900" cy="1092200"/>
+        </p:xfrm>
+        <a:graphic>
+          <a:graphicData uri="http://schemas.openxmlformats.org/presentationml/2006/ole">
+            <mc:AlternateContent xmlns:mc="http://schemas.openxmlformats.org/markup-compatibility/2006">
+              <mc:Choice xmlns:v="urn:schemas-microsoft-com:vml" Requires="v">
+                <p:oleObj name="Equation" r:id="rId4" imgW="2374540" imgH="1092724" progId="Equation.DSMT4">
+                  <p:embed/>
+                </p:oleObj>
+              </mc:Choice>
+              <mc:Fallback>
+                <p:oleObj name="Equation" r:id="rId4" imgW="2374540" imgH="1092724" progId="Equation.DSMT4">
+                  <p:embed/>
+                  <p:pic>
+                    <p:nvPicPr>
+                      <p:cNvPr id="2" name="Object 1">
+                        <a:extLst>
+                          <a:ext uri="{FF2B5EF4-FFF2-40B4-BE49-F238E27FC236}">
+                            <a16:creationId xmlns:a16="http://schemas.microsoft.com/office/drawing/2014/main" id="{5079C67F-A11D-3C42-F63B-A3BC977BB773}"/>
+                          </a:ext>
+                        </a:extLst>
+                      </p:cNvPr>
+                      <p:cNvPicPr/>
+                      <p:nvPr/>
+                    </p:nvPicPr>
+                    <p:blipFill>
+                      <a:blip r:embed="rId5"/>
+                      <a:stretch>
+                        <a:fillRect/>
+                      </a:stretch>
+                    </p:blipFill>
+                    <p:spPr>
+                      <a:xfrm>
+                        <a:off x="4976284" y="1588558"/>
+                        <a:ext cx="2374900" cy="1092200"/>
+                      </a:xfrm>
+                      <a:prstGeom prst="rect">
+                        <a:avLst/>
+                      </a:prstGeom>
+                    </p:spPr>
+                  </p:pic>
+                </p:oleObj>
+              </mc:Fallback>
+            </mc:AlternateContent>
+          </a:graphicData>
+        </a:graphic>
+      </p:graphicFrame>
+    </p:spTree>
+    <p:extLst>
+      <p:ext uri="{BB962C8B-B14F-4D97-AF65-F5344CB8AC3E}">
+        <p14:creationId xmlns:p14="http://schemas.microsoft.com/office/powerpoint/2010/main" val="2689927869"/>
+      </p:ext>
+    </p:extLst>
+  </p:cSld>
+  <p:clrMapOvr>
+    <a:masterClrMapping/>
+  </p:clrMapOvr>
+</p:sld>
+</file>
+
+<file path=ppt/slides/slide30.xml><?xml version="1.0" encoding="utf-8"?>
 <p:sld xmlns:a="http://schemas.openxmlformats.org/drawingml/2006/main" xmlns:r="http://schemas.openxmlformats.org/officeDocument/2006/relationships" xmlns:p="http://schemas.openxmlformats.org/presentationml/2006/main">
   <p:cSld>
     <p:spTree>
@@ -10989,7 +11961,7 @@
               <a:pPr>
                 <a:defRPr/>
               </a:pPr>
-              <a:t>25</a:t>
+              <a:t>30</a:t>
             </a:fld>
             <a:r>
               <a:rPr lang="en-US" altLang="en-US"/>
@@ -11011,7 +11983,7 @@
 </p:sld>
 </file>
 
-<file path=ppt/slides/slide26.xml><?xml version="1.0" encoding="utf-8"?>
+<file path=ppt/slides/slide31.xml><?xml version="1.0" encoding="utf-8"?>
 <p:sld xmlns:a="http://schemas.openxmlformats.org/drawingml/2006/main" xmlns:r="http://schemas.openxmlformats.org/officeDocument/2006/relationships" xmlns:p="http://schemas.openxmlformats.org/presentationml/2006/main">
   <p:cSld>
     <p:spTree>
@@ -12077,7 +13049,7 @@
 </p:sld>
 </file>
 
-<file path=ppt/slides/slide27.xml><?xml version="1.0" encoding="utf-8"?>
+<file path=ppt/slides/slide32.xml><?xml version="1.0" encoding="utf-8"?>
 <p:sld xmlns:a="http://schemas.openxmlformats.org/drawingml/2006/main" xmlns:r="http://schemas.openxmlformats.org/officeDocument/2006/relationships" xmlns:p="http://schemas.openxmlformats.org/presentationml/2006/main">
   <p:cSld>
     <p:spTree>
@@ -12175,7 +13147,7 @@
 </p:sld>
 </file>
 
-<file path=ppt/slides/slide28.xml><?xml version="1.0" encoding="utf-8"?>
+<file path=ppt/slides/slide33.xml><?xml version="1.0" encoding="utf-8"?>
 <p:sld xmlns:a="http://schemas.openxmlformats.org/drawingml/2006/main" xmlns:r="http://schemas.openxmlformats.org/officeDocument/2006/relationships" xmlns:p="http://schemas.openxmlformats.org/presentationml/2006/main">
   <p:cSld>
     <p:spTree>
@@ -13181,7 +14153,7 @@
 </p:sld>
 </file>
 
-<file path=ppt/slides/slide29.xml><?xml version="1.0" encoding="utf-8"?>
+<file path=ppt/slides/slide34.xml><?xml version="1.0" encoding="utf-8"?>
 <p:sld xmlns:a="http://schemas.openxmlformats.org/drawingml/2006/main" xmlns:r="http://schemas.openxmlformats.org/officeDocument/2006/relationships" xmlns:p="http://schemas.openxmlformats.org/presentationml/2006/main">
   <p:cSld>
     <p:spTree>
@@ -13368,7 +14340,173 @@
 </p:sld>
 </file>
 
-<file path=ppt/slides/slide3.xml><?xml version="1.0" encoding="utf-8"?>
+<file path=ppt/slides/slide35.xml><?xml version="1.0" encoding="utf-8"?>
+<p:sld xmlns:a="http://schemas.openxmlformats.org/drawingml/2006/main" xmlns:r="http://schemas.openxmlformats.org/officeDocument/2006/relationships" xmlns:p="http://schemas.openxmlformats.org/presentationml/2006/main">
+  <p:cSld>
+    <p:spTree>
+      <p:nvGrpSpPr>
+        <p:cNvPr id="1" name="">
+          <a:extLst>
+            <a:ext uri="{FF2B5EF4-FFF2-40B4-BE49-F238E27FC236}">
+              <a16:creationId xmlns:a16="http://schemas.microsoft.com/office/drawing/2014/main" id="{84CD4721-186A-96A8-34CB-E5B021FDC8A0}"/>
+            </a:ext>
+          </a:extLst>
+        </p:cNvPr>
+        <p:cNvGrpSpPr/>
+        <p:nvPr/>
+      </p:nvGrpSpPr>
+      <p:grpSpPr>
+        <a:xfrm>
+          <a:off x="0" y="0"/>
+          <a:ext cx="0" cy="0"/>
+          <a:chOff x="0" y="0"/>
+          <a:chExt cx="0" cy="0"/>
+        </a:xfrm>
+      </p:grpSpPr>
+      <p:sp>
+        <p:nvSpPr>
+          <p:cNvPr id="6" name="Title 5">
+            <a:extLst>
+              <a:ext uri="{FF2B5EF4-FFF2-40B4-BE49-F238E27FC236}">
+                <a16:creationId xmlns:a16="http://schemas.microsoft.com/office/drawing/2014/main" id="{AE51B056-8EB3-CC44-D95B-A7968C588870}"/>
+              </a:ext>
+            </a:extLst>
+          </p:cNvPr>
+          <p:cNvSpPr>
+            <a:spLocks noGrp="1"/>
+          </p:cNvSpPr>
+          <p:nvPr>
+            <p:ph type="title"/>
+          </p:nvPr>
+        </p:nvSpPr>
+        <p:spPr/>
+        <p:txBody>
+          <a:bodyPr/>
+          <a:lstStyle/>
+          <a:p>
+            <a:endParaRPr lang="en-IL"/>
+          </a:p>
+        </p:txBody>
+      </p:sp>
+      <p:sp>
+        <p:nvSpPr>
+          <p:cNvPr id="7" name="Text Placeholder 6">
+            <a:extLst>
+              <a:ext uri="{FF2B5EF4-FFF2-40B4-BE49-F238E27FC236}">
+                <a16:creationId xmlns:a16="http://schemas.microsoft.com/office/drawing/2014/main" id="{97D24A66-4899-2F06-AC28-3D7356027BCA}"/>
+              </a:ext>
+            </a:extLst>
+          </p:cNvPr>
+          <p:cNvSpPr>
+            <a:spLocks noGrp="1"/>
+          </p:cNvSpPr>
+          <p:nvPr>
+            <p:ph type="body" idx="1"/>
+          </p:nvPr>
+        </p:nvSpPr>
+        <p:spPr/>
+        <p:txBody>
+          <a:bodyPr>
+            <a:normAutofit/>
+          </a:bodyPr>
+          <a:lstStyle/>
+          <a:p>
+            <a:pPr algn="ctr"/>
+            <a:r>
+              <a:rPr lang="en-US" sz="7200" dirty="0"/>
+              <a:t>3D </a:t>
+            </a:r>
+            <a:r>
+              <a:rPr lang="en-US" sz="7200" dirty="0" err="1"/>
+              <a:t>PyTensor</a:t>
+            </a:r>
+            <a:endParaRPr lang="en-IL" sz="7200" dirty="0"/>
+          </a:p>
+        </p:txBody>
+      </p:sp>
+      <p:sp>
+        <p:nvSpPr>
+          <p:cNvPr id="4" name="Footer Placeholder 3">
+            <a:extLst>
+              <a:ext uri="{FF2B5EF4-FFF2-40B4-BE49-F238E27FC236}">
+                <a16:creationId xmlns:a16="http://schemas.microsoft.com/office/drawing/2014/main" id="{F48AF364-B490-A74A-39B0-B968572AF455}"/>
+              </a:ext>
+            </a:extLst>
+          </p:cNvPr>
+          <p:cNvSpPr>
+            <a:spLocks noGrp="1"/>
+          </p:cNvSpPr>
+          <p:nvPr>
+            <p:ph type="ftr" sz="quarter" idx="11"/>
+          </p:nvPr>
+        </p:nvSpPr>
+        <p:spPr/>
+        <p:txBody>
+          <a:bodyPr/>
+          <a:lstStyle/>
+          <a:p>
+            <a:pPr>
+              <a:defRPr/>
+            </a:pPr>
+            <a:r>
+              <a:rPr lang="en-US"/>
+              <a:t>Data analysis, 2022-1, Lecture 1</a:t>
+            </a:r>
+          </a:p>
+        </p:txBody>
+      </p:sp>
+      <p:sp>
+        <p:nvSpPr>
+          <p:cNvPr id="5" name="Slide Number Placeholder 4">
+            <a:extLst>
+              <a:ext uri="{FF2B5EF4-FFF2-40B4-BE49-F238E27FC236}">
+                <a16:creationId xmlns:a16="http://schemas.microsoft.com/office/drawing/2014/main" id="{3F8BF6A2-B847-86D3-D2DC-1A91C0150F0B}"/>
+              </a:ext>
+            </a:extLst>
+          </p:cNvPr>
+          <p:cNvSpPr>
+            <a:spLocks noGrp="1"/>
+          </p:cNvSpPr>
+          <p:nvPr>
+            <p:ph type="sldNum" sz="quarter" idx="12"/>
+          </p:nvPr>
+        </p:nvSpPr>
+        <p:spPr/>
+        <p:txBody>
+          <a:bodyPr/>
+          <a:lstStyle/>
+          <a:p>
+            <a:pPr>
+              <a:defRPr/>
+            </a:pPr>
+            <a:fld id="{3469EAC8-EFAD-49DA-A425-6225312A328A}" type="slidenum">
+              <a:rPr lang="he-IL" altLang="en-US" smtClean="0"/>
+              <a:pPr>
+                <a:defRPr/>
+              </a:pPr>
+              <a:t>35</a:t>
+            </a:fld>
+            <a:r>
+              <a:rPr lang="en-US" altLang="en-US"/>
+              <a:t> /  72</a:t>
+            </a:r>
+          </a:p>
+        </p:txBody>
+      </p:sp>
+    </p:spTree>
+    <p:extLst>
+      <p:ext uri="{BB962C8B-B14F-4D97-AF65-F5344CB8AC3E}">
+        <p14:creationId xmlns:p14="http://schemas.microsoft.com/office/powerpoint/2010/main" val="3955428247"/>
+      </p:ext>
+    </p:extLst>
+  </p:cSld>
+  <p:clrMapOvr>
+    <a:masterClrMapping/>
+  </p:clrMapOvr>
+</p:sld>
+</file>
+
+<file path=ppt/slides/slide36.xml><?xml version="1.0" encoding="utf-8"?>
 <p:sld xmlns:a="http://schemas.openxmlformats.org/drawingml/2006/main" xmlns:r="http://schemas.openxmlformats.org/officeDocument/2006/relationships" xmlns:p="http://schemas.openxmlformats.org/presentationml/2006/main">
   <p:cSld>
     <p:spTree>
@@ -13390,7 +14528,7 @@
           <p:cNvPr id="4" name="Title 3">
             <a:extLst>
               <a:ext uri="{FF2B5EF4-FFF2-40B4-BE49-F238E27FC236}">
-                <a16:creationId xmlns:a16="http://schemas.microsoft.com/office/drawing/2014/main" id="{3DC65EE0-F03B-514B-483B-16C5CBAEACE0}"/>
+                <a16:creationId xmlns:a16="http://schemas.microsoft.com/office/drawing/2014/main" id="{5A4492B3-90E1-5249-B56D-70C88F713CA9}"/>
               </a:ext>
             </a:extLst>
           </p:cNvPr>
@@ -13406,10 +14544,6 @@
           <a:bodyPr/>
           <a:lstStyle/>
           <a:p>
-            <a:r>
-              <a:rPr lang="en-US"/>
-              <a:t>Models</a:t>
-            </a:r>
             <a:endParaRPr lang="en-IL"/>
           </a:p>
         </p:txBody>
@@ -13419,7 +14553,7 @@
           <p:cNvPr id="5" name="Content Placeholder 4">
             <a:extLst>
               <a:ext uri="{FF2B5EF4-FFF2-40B4-BE49-F238E27FC236}">
-                <a16:creationId xmlns:a16="http://schemas.microsoft.com/office/drawing/2014/main" id="{4092FFCA-6A6D-88F6-BAB1-29F7D849F1DF}"/>
+                <a16:creationId xmlns:a16="http://schemas.microsoft.com/office/drawing/2014/main" id="{BE89B5F8-70A3-E7D6-59ED-D6CFBFB0E7A9}"/>
               </a:ext>
             </a:extLst>
           </p:cNvPr>
@@ -13430,133 +14564,19 @@
             <p:ph idx="1"/>
           </p:nvPr>
         </p:nvSpPr>
-        <p:spPr>
-          <a:xfrm>
-            <a:off x="329671" y="1588558"/>
-            <a:ext cx="5427133" cy="4351338"/>
-          </a:xfrm>
-        </p:spPr>
+        <p:spPr/>
         <p:txBody>
           <a:bodyPr/>
           <a:lstStyle/>
           <a:p>
-            <a:r>
-              <a:rPr lang="en-US"/>
-              <a:t>Can write the model with equations or pictures</a:t>
-            </a:r>
             <a:endParaRPr lang="en-IL"/>
           </a:p>
         </p:txBody>
       </p:sp>
-      <p:pic>
-        <p:nvPicPr>
-          <p:cNvPr id="3" name="Graphic 2">
-            <a:extLst>
-              <a:ext uri="{FF2B5EF4-FFF2-40B4-BE49-F238E27FC236}">
-                <a16:creationId xmlns:a16="http://schemas.microsoft.com/office/drawing/2014/main" id="{31BA305D-8569-0910-4928-3C4B4AD6CBAE}"/>
-              </a:ext>
-            </a:extLst>
-          </p:cNvPr>
-          <p:cNvPicPr>
-            <a:picLocks noChangeAspect="1"/>
-          </p:cNvPicPr>
-          <p:nvPr/>
-        </p:nvPicPr>
-        <p:blipFill>
-          <a:blip r:embed="rId2">
-            <a:extLst>
-              <a:ext uri="{96DAC541-7B7A-43D3-8B79-37D633B846F1}">
-                <asvg:svgBlip xmlns:asvg="http://schemas.microsoft.com/office/drawing/2016/SVG/main" r:embed="rId3"/>
-              </a:ext>
-            </a:extLst>
-          </a:blip>
-          <a:stretch>
-            <a:fillRect/>
-          </a:stretch>
-        </p:blipFill>
-        <p:spPr>
-          <a:xfrm>
-            <a:off x="8177742" y="1266825"/>
-            <a:ext cx="1695450" cy="4324350"/>
-          </a:xfrm>
-          <a:prstGeom prst="rect">
-            <a:avLst/>
-          </a:prstGeom>
-        </p:spPr>
-      </p:pic>
-      <p:graphicFrame>
-        <p:nvGraphicFramePr>
-          <p:cNvPr id="2" name="Object 1">
-            <a:extLst>
-              <a:ext uri="{FF2B5EF4-FFF2-40B4-BE49-F238E27FC236}">
-                <a16:creationId xmlns:a16="http://schemas.microsoft.com/office/drawing/2014/main" id="{5079C67F-A11D-3C42-F63B-A3BC977BB773}"/>
-              </a:ext>
-            </a:extLst>
-          </p:cNvPr>
-          <p:cNvGraphicFramePr>
-            <a:graphicFrameLocks noChangeAspect="1"/>
-          </p:cNvGraphicFramePr>
-          <p:nvPr>
-            <p:extLst>
-              <p:ext uri="{D42A27DB-BD31-4B8C-83A1-F6EECF244321}">
-                <p14:modId xmlns:p14="http://schemas.microsoft.com/office/powerpoint/2010/main" val="2836876110"/>
-              </p:ext>
-            </p:extLst>
-          </p:nvPr>
-        </p:nvGraphicFramePr>
-        <p:xfrm>
-          <a:off x="4976284" y="1588558"/>
-          <a:ext cx="2374900" cy="1092200"/>
-        </p:xfrm>
-        <a:graphic>
-          <a:graphicData uri="http://schemas.openxmlformats.org/presentationml/2006/ole">
-            <mc:AlternateContent xmlns:mc="http://schemas.openxmlformats.org/markup-compatibility/2006">
-              <mc:Choice xmlns:v="urn:schemas-microsoft-com:vml" Requires="v">
-                <p:oleObj name="Equation" r:id="rId4" imgW="2374540" imgH="1092724" progId="Equation.DSMT4">
-                  <p:embed/>
-                </p:oleObj>
-              </mc:Choice>
-              <mc:Fallback>
-                <p:oleObj name="Equation" r:id="rId4" imgW="2374540" imgH="1092724" progId="Equation.DSMT4">
-                  <p:embed/>
-                  <p:pic>
-                    <p:nvPicPr>
-                      <p:cNvPr id="2" name="Object 1">
-                        <a:extLst>
-                          <a:ext uri="{FF2B5EF4-FFF2-40B4-BE49-F238E27FC236}">
-                            <a16:creationId xmlns:a16="http://schemas.microsoft.com/office/drawing/2014/main" id="{5079C67F-A11D-3C42-F63B-A3BC977BB773}"/>
-                          </a:ext>
-                        </a:extLst>
-                      </p:cNvPr>
-                      <p:cNvPicPr/>
-                      <p:nvPr/>
-                    </p:nvPicPr>
-                    <p:blipFill>
-                      <a:blip r:embed="rId5"/>
-                      <a:stretch>
-                        <a:fillRect/>
-                      </a:stretch>
-                    </p:blipFill>
-                    <p:spPr>
-                      <a:xfrm>
-                        <a:off x="4976284" y="1588558"/>
-                        <a:ext cx="2374900" cy="1092200"/>
-                      </a:xfrm>
-                      <a:prstGeom prst="rect">
-                        <a:avLst/>
-                      </a:prstGeom>
-                    </p:spPr>
-                  </p:pic>
-                </p:oleObj>
-              </mc:Fallback>
-            </mc:AlternateContent>
-          </a:graphicData>
-        </a:graphic>
-      </p:graphicFrame>
     </p:spTree>
     <p:extLst>
       <p:ext uri="{BB962C8B-B14F-4D97-AF65-F5344CB8AC3E}">
-        <p14:creationId xmlns:p14="http://schemas.microsoft.com/office/powerpoint/2010/main" val="2689927869"/>
+        <p14:creationId xmlns:p14="http://schemas.microsoft.com/office/powerpoint/2010/main" val="4187776219"/>
       </p:ext>
     </p:extLst>
   </p:cSld>
@@ -13566,7 +14586,7 @@
 </p:sld>
 </file>
 
-<file path=ppt/slides/slide30.xml><?xml version="1.0" encoding="utf-8"?>
+<file path=ppt/slides/slide37.xml><?xml version="1.0" encoding="utf-8"?>
 <p:sld xmlns:a="http://schemas.openxmlformats.org/drawingml/2006/main" xmlns:r="http://schemas.openxmlformats.org/officeDocument/2006/relationships" xmlns:p="http://schemas.openxmlformats.org/presentationml/2006/main">
   <p:cSld>
     <p:spTree>
@@ -13706,7 +14726,7 @@
               <a:pPr>
                 <a:defRPr/>
               </a:pPr>
-              <a:t>30</a:t>
+              <a:t>37</a:t>
             </a:fld>
             <a:r>
               <a:rPr lang="en-US" altLang="en-US"/>
@@ -13728,7 +14748,7 @@
 </p:sld>
 </file>
 
-<file path=ppt/slides/slide31.xml><?xml version="1.0" encoding="utf-8"?>
+<file path=ppt/slides/slide38.xml><?xml version="1.0" encoding="utf-8"?>
 <p:sld xmlns:a="http://schemas.openxmlformats.org/drawingml/2006/main" xmlns:r="http://schemas.openxmlformats.org/officeDocument/2006/relationships" xmlns:p="http://schemas.openxmlformats.org/presentationml/2006/main">
   <p:cSld>
     <p:spTree>
@@ -14006,8 +15026,8 @@
           </a:p>
         </p:txBody>
       </p:sp>
-      <mc:AlternateContent xmlns:mc="http://schemas.openxmlformats.org/markup-compatibility/2006">
-        <mc:Choice xmlns:a14="http://schemas.microsoft.com/office/drawing/2010/main" Requires="a14">
+      <mc:AlternateContent xmlns:mc="http://schemas.openxmlformats.org/markup-compatibility/2006" xmlns:a14="http://schemas.microsoft.com/office/drawing/2010/main">
+        <mc:Choice Requires="a14">
           <p:sp>
             <p:nvSpPr>
               <p:cNvPr id="17" name="TextBox 16">
@@ -14058,7 +15078,7 @@
             </p:txBody>
           </p:sp>
         </mc:Choice>
-        <mc:Fallback>
+        <mc:Fallback xmlns="">
           <p:sp>
             <p:nvSpPr>
               <p:cNvPr id="17" name="TextBox 16">
@@ -14277,7 +15297,7 @@
 </p:sld>
 </file>
 
-<file path=ppt/slides/slide32.xml><?xml version="1.0" encoding="utf-8"?>
+<file path=ppt/slides/slide39.xml><?xml version="1.0" encoding="utf-8"?>
 <p:sld xmlns:a="http://schemas.openxmlformats.org/drawingml/2006/main" xmlns:r="http://schemas.openxmlformats.org/officeDocument/2006/relationships" xmlns:p="http://schemas.openxmlformats.org/presentationml/2006/main">
   <p:cSld>
     <p:spTree>
@@ -14738,7 +15758,210 @@
 </p:sld>
 </file>
 
-<file path=ppt/slides/slide33.xml><?xml version="1.0" encoding="utf-8"?>
+<file path=ppt/slides/slide4.xml><?xml version="1.0" encoding="utf-8"?>
+<p:sld xmlns:a="http://schemas.openxmlformats.org/drawingml/2006/main" xmlns:r="http://schemas.openxmlformats.org/officeDocument/2006/relationships" xmlns:p="http://schemas.openxmlformats.org/presentationml/2006/main">
+  <p:cSld>
+    <p:spTree>
+      <p:nvGrpSpPr>
+        <p:cNvPr id="1" name="">
+          <a:extLst>
+            <a:ext uri="{FF2B5EF4-FFF2-40B4-BE49-F238E27FC236}">
+              <a16:creationId xmlns:a16="http://schemas.microsoft.com/office/drawing/2014/main" id="{9D3F8360-1187-AB3F-8E1B-22F658FA661B}"/>
+            </a:ext>
+          </a:extLst>
+        </p:cNvPr>
+        <p:cNvGrpSpPr/>
+        <p:nvPr/>
+      </p:nvGrpSpPr>
+      <p:grpSpPr>
+        <a:xfrm>
+          <a:off x="0" y="0"/>
+          <a:ext cx="0" cy="0"/>
+          <a:chOff x="0" y="0"/>
+          <a:chExt cx="0" cy="0"/>
+        </a:xfrm>
+      </p:grpSpPr>
+      <p:sp>
+        <p:nvSpPr>
+          <p:cNvPr id="2" name="Title 1">
+            <a:extLst>
+              <a:ext uri="{FF2B5EF4-FFF2-40B4-BE49-F238E27FC236}">
+                <a16:creationId xmlns:a16="http://schemas.microsoft.com/office/drawing/2014/main" id="{A684A59B-E364-E741-CFBD-3DAED845B164}"/>
+              </a:ext>
+            </a:extLst>
+          </p:cNvPr>
+          <p:cNvSpPr>
+            <a:spLocks noGrp="1"/>
+          </p:cNvSpPr>
+          <p:nvPr>
+            <p:ph type="title"/>
+          </p:nvPr>
+        </p:nvSpPr>
+        <p:spPr/>
+        <p:txBody>
+          <a:bodyPr/>
+          <a:lstStyle/>
+          <a:p>
+            <a:r>
+              <a:rPr lang="en-US" err="1"/>
+              <a:t>Baye’s</a:t>
+            </a:r>
+            <a:r>
+              <a:rPr lang="en-US"/>
+              <a:t> rule updates models</a:t>
+            </a:r>
+            <a:endParaRPr lang="en-GB"/>
+          </a:p>
+        </p:txBody>
+      </p:sp>
+      <p:graphicFrame>
+        <p:nvGraphicFramePr>
+          <p:cNvPr id="4" name="Object 3">
+            <a:extLst>
+              <a:ext uri="{FF2B5EF4-FFF2-40B4-BE49-F238E27FC236}">
+                <a16:creationId xmlns:a16="http://schemas.microsoft.com/office/drawing/2014/main" id="{435F5A3B-CC4A-88BC-24D0-B7025174E136}"/>
+              </a:ext>
+            </a:extLst>
+          </p:cNvPr>
+          <p:cNvGraphicFramePr>
+            <a:graphicFrameLocks noChangeAspect="1"/>
+          </p:cNvGraphicFramePr>
+          <p:nvPr>
+            <p:extLst>
+              <p:ext uri="{D42A27DB-BD31-4B8C-83A1-F6EECF244321}">
+                <p14:modId xmlns:p14="http://schemas.microsoft.com/office/powerpoint/2010/main" val="1880405255"/>
+              </p:ext>
+            </p:extLst>
+          </p:nvPr>
+        </p:nvGraphicFramePr>
+        <p:xfrm>
+          <a:off x="6310232" y="2961444"/>
+          <a:ext cx="5424491" cy="1068132"/>
+        </p:xfrm>
+        <a:graphic>
+          <a:graphicData uri="http://schemas.openxmlformats.org/presentationml/2006/ole">
+            <mc:AlternateContent xmlns:mc="http://schemas.openxmlformats.org/markup-compatibility/2006">
+              <mc:Choice xmlns:v="urn:schemas-microsoft-com:vml" Requires="v">
+                <p:oleObj name="Equation" r:id="rId2" imgW="2971800" imgH="583920" progId="Equation.DSMT4">
+                  <p:embed/>
+                </p:oleObj>
+              </mc:Choice>
+              <mc:Fallback>
+                <p:oleObj name="Equation" r:id="rId2" imgW="2971800" imgH="583920" progId="Equation.DSMT4">
+                  <p:embed/>
+                  <p:pic>
+                    <p:nvPicPr>
+                      <p:cNvPr id="4" name="Object 3">
+                        <a:extLst>
+                          <a:ext uri="{FF2B5EF4-FFF2-40B4-BE49-F238E27FC236}">
+                            <a16:creationId xmlns:a16="http://schemas.microsoft.com/office/drawing/2014/main" id="{435F5A3B-CC4A-88BC-24D0-B7025174E136}"/>
+                          </a:ext>
+                        </a:extLst>
+                      </p:cNvPr>
+                      <p:cNvPicPr/>
+                      <p:nvPr/>
+                    </p:nvPicPr>
+                    <p:blipFill>
+                      <a:blip r:embed="rId3"/>
+                      <a:stretch>
+                        <a:fillRect/>
+                      </a:stretch>
+                    </p:blipFill>
+                    <p:spPr>
+                      <a:xfrm>
+                        <a:off x="6310232" y="2961444"/>
+                        <a:ext cx="5424491" cy="1068132"/>
+                      </a:xfrm>
+                      <a:prstGeom prst="rect">
+                        <a:avLst/>
+                      </a:prstGeom>
+                    </p:spPr>
+                  </p:pic>
+                </p:oleObj>
+              </mc:Fallback>
+            </mc:AlternateContent>
+          </a:graphicData>
+        </a:graphic>
+      </p:graphicFrame>
+      <p:pic>
+        <p:nvPicPr>
+          <p:cNvPr id="7" name="Picture 6">
+            <a:extLst>
+              <a:ext uri="{FF2B5EF4-FFF2-40B4-BE49-F238E27FC236}">
+                <a16:creationId xmlns:a16="http://schemas.microsoft.com/office/drawing/2014/main" id="{E65BB742-817F-8B14-BD56-742C89FBE69D}"/>
+              </a:ext>
+            </a:extLst>
+          </p:cNvPr>
+          <p:cNvPicPr>
+            <a:picLocks noChangeAspect="1"/>
+          </p:cNvPicPr>
+          <p:nvPr/>
+        </p:nvPicPr>
+        <p:blipFill>
+          <a:blip r:embed="rId4"/>
+          <a:srcRect l="25235" r="25904" b="9101"/>
+          <a:stretch/>
+        </p:blipFill>
+        <p:spPr>
+          <a:xfrm>
+            <a:off x="2507115" y="2002759"/>
+            <a:ext cx="3650794" cy="3171769"/>
+          </a:xfrm>
+          <a:prstGeom prst="rect">
+            <a:avLst/>
+          </a:prstGeom>
+        </p:spPr>
+      </p:pic>
+      <p:pic>
+        <p:nvPicPr>
+          <p:cNvPr id="3" name="Graphic 2">
+            <a:extLst>
+              <a:ext uri="{FF2B5EF4-FFF2-40B4-BE49-F238E27FC236}">
+                <a16:creationId xmlns:a16="http://schemas.microsoft.com/office/drawing/2014/main" id="{B61A7830-99E1-A7A6-90AA-5773B83FD31C}"/>
+              </a:ext>
+            </a:extLst>
+          </p:cNvPr>
+          <p:cNvPicPr>
+            <a:picLocks noChangeAspect="1"/>
+          </p:cNvPicPr>
+          <p:nvPr/>
+        </p:nvPicPr>
+        <p:blipFill>
+          <a:blip r:embed="rId5">
+            <a:extLst>
+              <a:ext uri="{96DAC541-7B7A-43D3-8B79-37D633B846F1}">
+                <asvg:svgBlip xmlns:asvg="http://schemas.microsoft.com/office/drawing/2016/SVG/main" r:embed="rId6"/>
+              </a:ext>
+            </a:extLst>
+          </a:blip>
+          <a:stretch>
+            <a:fillRect/>
+          </a:stretch>
+        </p:blipFill>
+        <p:spPr>
+          <a:xfrm>
+            <a:off x="202142" y="1901825"/>
+            <a:ext cx="1695450" cy="4324350"/>
+          </a:xfrm>
+          <a:prstGeom prst="rect">
+            <a:avLst/>
+          </a:prstGeom>
+        </p:spPr>
+      </p:pic>
+    </p:spTree>
+    <p:extLst>
+      <p:ext uri="{BB962C8B-B14F-4D97-AF65-F5344CB8AC3E}">
+        <p14:creationId xmlns:p14="http://schemas.microsoft.com/office/powerpoint/2010/main" val="858020458"/>
+      </p:ext>
+    </p:extLst>
+  </p:cSld>
+  <p:clrMapOvr>
+    <a:masterClrMapping/>
+  </p:clrMapOvr>
+</p:sld>
+</file>
+
+<file path=ppt/slides/slide40.xml><?xml version="1.0" encoding="utf-8"?>
 <p:sld xmlns:a="http://schemas.openxmlformats.org/drawingml/2006/main" xmlns:r="http://schemas.openxmlformats.org/officeDocument/2006/relationships" xmlns:p="http://schemas.openxmlformats.org/presentationml/2006/main">
   <p:cSld>
     <p:spTree>
@@ -15009,11 +16232,11 @@
   <p:clrMapOvr>
     <a:masterClrMapping/>
   </p:clrMapOvr>
-  <mc:AlternateContent xmlns:mc="http://schemas.openxmlformats.org/markup-compatibility/2006">
-    <mc:Choice xmlns:p14="http://schemas.microsoft.com/office/powerpoint/2010/main" Requires="p14">
+  <mc:AlternateContent xmlns:mc="http://schemas.openxmlformats.org/markup-compatibility/2006" xmlns:p14="http://schemas.microsoft.com/office/powerpoint/2010/main">
+    <mc:Choice Requires="p14">
       <p:transition spd="slow" p14:dur="2000" advTm="63862"/>
     </mc:Choice>
-    <mc:Fallback>
+    <mc:Fallback xmlns="">
       <p:transition spd="slow" advTm="63862"/>
     </mc:Fallback>
   </mc:AlternateContent>
@@ -16287,7 +17510,7 @@
 </p:sld>
 </file>
 
-<file path=ppt/slides/slide34.xml><?xml version="1.0" encoding="utf-8"?>
+<file path=ppt/slides/slide41.xml><?xml version="1.0" encoding="utf-8"?>
 <p:sld xmlns:a="http://schemas.openxmlformats.org/drawingml/2006/main" xmlns:r="http://schemas.openxmlformats.org/officeDocument/2006/relationships" xmlns:p="http://schemas.openxmlformats.org/presentationml/2006/main">
   <p:cSld>
     <p:spTree>
@@ -16497,11 +17720,11 @@
   <p:clrMapOvr>
     <a:masterClrMapping/>
   </p:clrMapOvr>
-  <mc:AlternateContent xmlns:mc="http://schemas.openxmlformats.org/markup-compatibility/2006">
-    <mc:Choice xmlns:p14="http://schemas.microsoft.com/office/powerpoint/2010/main" Requires="p14">
+  <mc:AlternateContent xmlns:mc="http://schemas.openxmlformats.org/markup-compatibility/2006" xmlns:p14="http://schemas.microsoft.com/office/powerpoint/2010/main">
+    <mc:Choice Requires="p14">
       <p:transition spd="slow" p14:dur="2000" advTm="11019"/>
     </mc:Choice>
-    <mc:Fallback>
+    <mc:Fallback xmlns="">
       <p:transition spd="slow" advTm="11019"/>
     </mc:Fallback>
   </mc:AlternateContent>
@@ -16847,7 +18070,7 @@
 </p:sld>
 </file>
 
-<file path=ppt/slides/slide35.xml><?xml version="1.0" encoding="utf-8"?>
+<file path=ppt/slides/slide42.xml><?xml version="1.0" encoding="utf-8"?>
 <p:sld xmlns:a="http://schemas.openxmlformats.org/drawingml/2006/main" xmlns:r="http://schemas.openxmlformats.org/officeDocument/2006/relationships" xmlns:p="http://schemas.openxmlformats.org/presentationml/2006/main">
   <p:cSld>
     <p:spTree>
@@ -16964,7 +18187,7 @@
 </p:sld>
 </file>
 
-<file path=ppt/slides/slide36.xml><?xml version="1.0" encoding="utf-8"?>
+<file path=ppt/slides/slide43.xml><?xml version="1.0" encoding="utf-8"?>
 <p:sld xmlns:a="http://schemas.openxmlformats.org/drawingml/2006/main" xmlns:r="http://schemas.openxmlformats.org/officeDocument/2006/relationships" xmlns:p="http://schemas.openxmlformats.org/presentationml/2006/main">
   <p:cSld>
     <p:spTree>
@@ -17100,7 +18323,7 @@
 </p:sld>
 </file>
 
-<file path=ppt/slides/slide37.xml><?xml version="1.0" encoding="utf-8"?>
+<file path=ppt/slides/slide44.xml><?xml version="1.0" encoding="utf-8"?>
 <p:sld xmlns:a="http://schemas.openxmlformats.org/drawingml/2006/main" xmlns:r="http://schemas.openxmlformats.org/officeDocument/2006/relationships" xmlns:p="http://schemas.openxmlformats.org/presentationml/2006/main">
   <p:cSld>
     <p:spTree>
@@ -17240,7 +18463,7 @@
               <a:pPr>
                 <a:defRPr/>
               </a:pPr>
-              <a:t>37</a:t>
+              <a:t>44</a:t>
             </a:fld>
             <a:r>
               <a:rPr lang="en-US" altLang="en-US"/>
@@ -17262,7 +18485,7 @@
 </p:sld>
 </file>
 
-<file path=ppt/slides/slide38.xml><?xml version="1.0" encoding="utf-8"?>
+<file path=ppt/slides/slide45.xml><?xml version="1.0" encoding="utf-8"?>
 <p:sld xmlns:a="http://schemas.openxmlformats.org/drawingml/2006/main" xmlns:r="http://schemas.openxmlformats.org/officeDocument/2006/relationships" xmlns:p="http://schemas.openxmlformats.org/presentationml/2006/main">
   <p:cSld>
     <p:spTree>
@@ -17385,7 +18608,7 @@
 </p:sld>
 </file>
 
-<file path=ppt/slides/slide39.xml><?xml version="1.0" encoding="utf-8"?>
+<file path=ppt/slides/slide46.xml><?xml version="1.0" encoding="utf-8"?>
 <p:sld xmlns:a="http://schemas.openxmlformats.org/drawingml/2006/main" xmlns:r="http://schemas.openxmlformats.org/officeDocument/2006/relationships" xmlns:p="http://schemas.openxmlformats.org/presentationml/2006/main">
   <p:cSld>
     <p:spTree>
@@ -17908,210 +19131,7 @@
 </p:sld>
 </file>
 
-<file path=ppt/slides/slide4.xml><?xml version="1.0" encoding="utf-8"?>
-<p:sld xmlns:a="http://schemas.openxmlformats.org/drawingml/2006/main" xmlns:r="http://schemas.openxmlformats.org/officeDocument/2006/relationships" xmlns:p="http://schemas.openxmlformats.org/presentationml/2006/main">
-  <p:cSld>
-    <p:spTree>
-      <p:nvGrpSpPr>
-        <p:cNvPr id="1" name="">
-          <a:extLst>
-            <a:ext uri="{FF2B5EF4-FFF2-40B4-BE49-F238E27FC236}">
-              <a16:creationId xmlns:a16="http://schemas.microsoft.com/office/drawing/2014/main" id="{9D3F8360-1187-AB3F-8E1B-22F658FA661B}"/>
-            </a:ext>
-          </a:extLst>
-        </p:cNvPr>
-        <p:cNvGrpSpPr/>
-        <p:nvPr/>
-      </p:nvGrpSpPr>
-      <p:grpSpPr>
-        <a:xfrm>
-          <a:off x="0" y="0"/>
-          <a:ext cx="0" cy="0"/>
-          <a:chOff x="0" y="0"/>
-          <a:chExt cx="0" cy="0"/>
-        </a:xfrm>
-      </p:grpSpPr>
-      <p:sp>
-        <p:nvSpPr>
-          <p:cNvPr id="2" name="Title 1">
-            <a:extLst>
-              <a:ext uri="{FF2B5EF4-FFF2-40B4-BE49-F238E27FC236}">
-                <a16:creationId xmlns:a16="http://schemas.microsoft.com/office/drawing/2014/main" id="{A684A59B-E364-E741-CFBD-3DAED845B164}"/>
-              </a:ext>
-            </a:extLst>
-          </p:cNvPr>
-          <p:cNvSpPr>
-            <a:spLocks noGrp="1"/>
-          </p:cNvSpPr>
-          <p:nvPr>
-            <p:ph type="title"/>
-          </p:nvPr>
-        </p:nvSpPr>
-        <p:spPr/>
-        <p:txBody>
-          <a:bodyPr/>
-          <a:lstStyle/>
-          <a:p>
-            <a:r>
-              <a:rPr lang="en-US" err="1"/>
-              <a:t>Baye’s</a:t>
-            </a:r>
-            <a:r>
-              <a:rPr lang="en-US"/>
-              <a:t> rule updates models</a:t>
-            </a:r>
-            <a:endParaRPr lang="en-GB"/>
-          </a:p>
-        </p:txBody>
-      </p:sp>
-      <p:graphicFrame>
-        <p:nvGraphicFramePr>
-          <p:cNvPr id="4" name="Object 3">
-            <a:extLst>
-              <a:ext uri="{FF2B5EF4-FFF2-40B4-BE49-F238E27FC236}">
-                <a16:creationId xmlns:a16="http://schemas.microsoft.com/office/drawing/2014/main" id="{435F5A3B-CC4A-88BC-24D0-B7025174E136}"/>
-              </a:ext>
-            </a:extLst>
-          </p:cNvPr>
-          <p:cNvGraphicFramePr>
-            <a:graphicFrameLocks noChangeAspect="1"/>
-          </p:cNvGraphicFramePr>
-          <p:nvPr>
-            <p:extLst>
-              <p:ext uri="{D42A27DB-BD31-4B8C-83A1-F6EECF244321}">
-                <p14:modId xmlns:p14="http://schemas.microsoft.com/office/powerpoint/2010/main" val="1880405255"/>
-              </p:ext>
-            </p:extLst>
-          </p:nvPr>
-        </p:nvGraphicFramePr>
-        <p:xfrm>
-          <a:off x="6310232" y="2961444"/>
-          <a:ext cx="5424491" cy="1068132"/>
-        </p:xfrm>
-        <a:graphic>
-          <a:graphicData uri="http://schemas.openxmlformats.org/presentationml/2006/ole">
-            <mc:AlternateContent xmlns:mc="http://schemas.openxmlformats.org/markup-compatibility/2006">
-              <mc:Choice xmlns:v="urn:schemas-microsoft-com:vml" Requires="v">
-                <p:oleObj name="Equation" r:id="rId2" imgW="2971800" imgH="583920" progId="Equation.DSMT4">
-                  <p:embed/>
-                </p:oleObj>
-              </mc:Choice>
-              <mc:Fallback>
-                <p:oleObj name="Equation" r:id="rId2" imgW="2971800" imgH="583920" progId="Equation.DSMT4">
-                  <p:embed/>
-                  <p:pic>
-                    <p:nvPicPr>
-                      <p:cNvPr id="4" name="Object 3">
-                        <a:extLst>
-                          <a:ext uri="{FF2B5EF4-FFF2-40B4-BE49-F238E27FC236}">
-                            <a16:creationId xmlns:a16="http://schemas.microsoft.com/office/drawing/2014/main" id="{435F5A3B-CC4A-88BC-24D0-B7025174E136}"/>
-                          </a:ext>
-                        </a:extLst>
-                      </p:cNvPr>
-                      <p:cNvPicPr/>
-                      <p:nvPr/>
-                    </p:nvPicPr>
-                    <p:blipFill>
-                      <a:blip r:embed="rId3"/>
-                      <a:stretch>
-                        <a:fillRect/>
-                      </a:stretch>
-                    </p:blipFill>
-                    <p:spPr>
-                      <a:xfrm>
-                        <a:off x="6310232" y="2961444"/>
-                        <a:ext cx="5424491" cy="1068132"/>
-                      </a:xfrm>
-                      <a:prstGeom prst="rect">
-                        <a:avLst/>
-                      </a:prstGeom>
-                    </p:spPr>
-                  </p:pic>
-                </p:oleObj>
-              </mc:Fallback>
-            </mc:AlternateContent>
-          </a:graphicData>
-        </a:graphic>
-      </p:graphicFrame>
-      <p:pic>
-        <p:nvPicPr>
-          <p:cNvPr id="7" name="Picture 6">
-            <a:extLst>
-              <a:ext uri="{FF2B5EF4-FFF2-40B4-BE49-F238E27FC236}">
-                <a16:creationId xmlns:a16="http://schemas.microsoft.com/office/drawing/2014/main" id="{E65BB742-817F-8B14-BD56-742C89FBE69D}"/>
-              </a:ext>
-            </a:extLst>
-          </p:cNvPr>
-          <p:cNvPicPr>
-            <a:picLocks noChangeAspect="1"/>
-          </p:cNvPicPr>
-          <p:nvPr/>
-        </p:nvPicPr>
-        <p:blipFill>
-          <a:blip r:embed="rId4"/>
-          <a:srcRect l="25235" r="25904" b="9101"/>
-          <a:stretch/>
-        </p:blipFill>
-        <p:spPr>
-          <a:xfrm>
-            <a:off x="2507115" y="2002759"/>
-            <a:ext cx="3650794" cy="3171769"/>
-          </a:xfrm>
-          <a:prstGeom prst="rect">
-            <a:avLst/>
-          </a:prstGeom>
-        </p:spPr>
-      </p:pic>
-      <p:pic>
-        <p:nvPicPr>
-          <p:cNvPr id="3" name="Graphic 2">
-            <a:extLst>
-              <a:ext uri="{FF2B5EF4-FFF2-40B4-BE49-F238E27FC236}">
-                <a16:creationId xmlns:a16="http://schemas.microsoft.com/office/drawing/2014/main" id="{B61A7830-99E1-A7A6-90AA-5773B83FD31C}"/>
-              </a:ext>
-            </a:extLst>
-          </p:cNvPr>
-          <p:cNvPicPr>
-            <a:picLocks noChangeAspect="1"/>
-          </p:cNvPicPr>
-          <p:nvPr/>
-        </p:nvPicPr>
-        <p:blipFill>
-          <a:blip r:embed="rId5">
-            <a:extLst>
-              <a:ext uri="{96DAC541-7B7A-43D3-8B79-37D633B846F1}">
-                <asvg:svgBlip xmlns:asvg="http://schemas.microsoft.com/office/drawing/2016/SVG/main" r:embed="rId6"/>
-              </a:ext>
-            </a:extLst>
-          </a:blip>
-          <a:stretch>
-            <a:fillRect/>
-          </a:stretch>
-        </p:blipFill>
-        <p:spPr>
-          <a:xfrm>
-            <a:off x="202142" y="1901825"/>
-            <a:ext cx="1695450" cy="4324350"/>
-          </a:xfrm>
-          <a:prstGeom prst="rect">
-            <a:avLst/>
-          </a:prstGeom>
-        </p:spPr>
-      </p:pic>
-    </p:spTree>
-    <p:extLst>
-      <p:ext uri="{BB962C8B-B14F-4D97-AF65-F5344CB8AC3E}">
-        <p14:creationId xmlns:p14="http://schemas.microsoft.com/office/powerpoint/2010/main" val="858020458"/>
-      </p:ext>
-    </p:extLst>
-  </p:cSld>
-  <p:clrMapOvr>
-    <a:masterClrMapping/>
-  </p:clrMapOvr>
-</p:sld>
-</file>
-
-<file path=ppt/slides/slide40.xml><?xml version="1.0" encoding="utf-8"?>
+<file path=ppt/slides/slide47.xml><?xml version="1.0" encoding="utf-8"?>
 <p:sld xmlns:a="http://schemas.openxmlformats.org/drawingml/2006/main" xmlns:r="http://schemas.openxmlformats.org/officeDocument/2006/relationships" xmlns:p="http://schemas.openxmlformats.org/presentationml/2006/main">
   <p:cSld>
     <p:spTree>
@@ -18163,8 +19183,8 @@
           </a:p>
         </p:txBody>
       </p:sp>
-      <mc:AlternateContent xmlns:mc="http://schemas.openxmlformats.org/markup-compatibility/2006">
-        <mc:Choice xmlns:a14="http://schemas.microsoft.com/office/drawing/2010/main" Requires="a14">
+      <mc:AlternateContent xmlns:mc="http://schemas.openxmlformats.org/markup-compatibility/2006" xmlns:a14="http://schemas.microsoft.com/office/drawing/2010/main">
+        <mc:Choice Requires="a14">
           <p:sp>
             <p:nvSpPr>
               <p:cNvPr id="3" name="Content Placeholder 2">
@@ -18250,7 +19270,7 @@
             </p:txBody>
           </p:sp>
         </mc:Choice>
-        <mc:Fallback>
+        <mc:Fallback xmlns="">
           <p:sp>
             <p:nvSpPr>
               <p:cNvPr id="3" name="Content Placeholder 2">
@@ -18363,8 +19383,8 @@
           </a:graphicData>
         </a:graphic>
       </p:graphicFrame>
-      <mc:AlternateContent xmlns:mc="http://schemas.openxmlformats.org/markup-compatibility/2006">
-        <mc:Choice xmlns:a14="http://schemas.microsoft.com/office/drawing/2010/main" Requires="a14">
+      <mc:AlternateContent xmlns:mc="http://schemas.openxmlformats.org/markup-compatibility/2006" xmlns:a14="http://schemas.microsoft.com/office/drawing/2010/main">
+        <mc:Choice Requires="a14">
           <p:graphicFrame>
             <p:nvGraphicFramePr>
               <p:cNvPr id="5" name="Table 4">
@@ -18629,7 +19649,7 @@
             </a:graphic>
           </p:graphicFrame>
         </mc:Choice>
-        <mc:Fallback>
+        <mc:Fallback xmlns="">
           <p:graphicFrame>
             <p:nvGraphicFramePr>
               <p:cNvPr id="5" name="Table 4">
@@ -18877,7 +19897,7 @@
 </p:sld>
 </file>
 
-<file path=ppt/slides/slide41.xml><?xml version="1.0" encoding="utf-8"?>
+<file path=ppt/slides/slide48.xml><?xml version="1.0" encoding="utf-8"?>
 <p:sld xmlns:a="http://schemas.openxmlformats.org/drawingml/2006/main" xmlns:r="http://schemas.openxmlformats.org/officeDocument/2006/relationships" xmlns:p="http://schemas.openxmlformats.org/presentationml/2006/main">
   <p:cSld>
     <p:spTree>
@@ -19006,7 +20026,7 @@
 </p:sld>
 </file>
 
-<file path=ppt/slides/slide42.xml><?xml version="1.0" encoding="utf-8"?>
+<file path=ppt/slides/slide49.xml><?xml version="1.0" encoding="utf-8"?>
 <p:sld xmlns:a="http://schemas.openxmlformats.org/drawingml/2006/main" xmlns:r="http://schemas.openxmlformats.org/officeDocument/2006/relationships" xmlns:p="http://schemas.openxmlformats.org/presentationml/2006/main">
   <p:cSld>
     <p:spTree>
@@ -19072,7 +20092,7 @@
           <p:nvPr/>
         </p:nvPicPr>
         <p:blipFill>
-          <a:blip r:embed="rId2">
+          <a:blip r:embed="rId2" cstate="email">
             <a:extLst>
               <a:ext uri="{28A0092B-C50C-407E-A947-70E740481C1C}">
                 <a14:useLocalDpi xmlns:a14="http://schemas.microsoft.com/office/drawing/2010/main" val="0"/>

</xml_diff>

<commit_message>
Working on lecture 4
Almost done with Gaussian slides.
</commit_message>
<xml_diff>
--- a/Lectures/Lecture 3 PyMC and Sampling.pptx
+++ b/Lectures/Lecture 3 PyMC and Sampling.pptx
@@ -53,16 +53,16 @@
     <p:sldId id="557" r:id="rId44"/>
     <p:sldId id="572" r:id="rId45"/>
     <p:sldId id="558" r:id="rId46"/>
-    <p:sldId id="565" r:id="rId47"/>
-    <p:sldId id="566" r:id="rId48"/>
-    <p:sldId id="567" r:id="rId49"/>
-    <p:sldId id="571" r:id="rId50"/>
-    <p:sldId id="568" r:id="rId51"/>
-    <p:sldId id="569" r:id="rId52"/>
-    <p:sldId id="570" r:id="rId53"/>
-    <p:sldId id="573" r:id="rId54"/>
-    <p:sldId id="574" r:id="rId55"/>
-    <p:sldId id="575" r:id="rId56"/>
+    <p:sldId id="573" r:id="rId47"/>
+    <p:sldId id="574" r:id="rId48"/>
+    <p:sldId id="575" r:id="rId49"/>
+    <p:sldId id="565" r:id="rId50"/>
+    <p:sldId id="566" r:id="rId51"/>
+    <p:sldId id="567" r:id="rId52"/>
+    <p:sldId id="571" r:id="rId53"/>
+    <p:sldId id="568" r:id="rId54"/>
+    <p:sldId id="569" r:id="rId55"/>
+    <p:sldId id="570" r:id="rId56"/>
     <p:sldId id="542" r:id="rId57"/>
     <p:sldId id="535" r:id="rId58"/>
     <p:sldId id="536" r:id="rId59"/>
@@ -2147,7 +2147,7 @@
           <a:p>
             <a:fld id="{9CF176CD-15D1-4787-BBAA-B7F61FF9E394}" type="datetimeFigureOut">
               <a:rPr lang="en-GB" smtClean="0"/>
-              <a:t>04/03/2025</a:t>
+              <a:t>09/03/2025</a:t>
             </a:fld>
             <a:endParaRPr lang="en-GB"/>
           </a:p>
@@ -2546,7 +2546,7 @@
           <a:p>
             <a:fld id="{633AF1EE-65BA-4140-B6B9-7F82C437F84A}" type="datetimeFigureOut">
               <a:rPr lang="en-GB" smtClean="0"/>
-              <a:t>04/03/2025</a:t>
+              <a:t>09/03/2025</a:t>
             </a:fld>
             <a:endParaRPr lang="en-GB"/>
           </a:p>
@@ -2716,7 +2716,7 @@
           <a:p>
             <a:fld id="{633AF1EE-65BA-4140-B6B9-7F82C437F84A}" type="datetimeFigureOut">
               <a:rPr lang="en-GB" smtClean="0"/>
-              <a:t>04/03/2025</a:t>
+              <a:t>09/03/2025</a:t>
             </a:fld>
             <a:endParaRPr lang="en-GB"/>
           </a:p>
@@ -2896,7 +2896,7 @@
           <a:p>
             <a:fld id="{633AF1EE-65BA-4140-B6B9-7F82C437F84A}" type="datetimeFigureOut">
               <a:rPr lang="en-GB" smtClean="0"/>
-              <a:t>04/03/2025</a:t>
+              <a:t>09/03/2025</a:t>
             </a:fld>
             <a:endParaRPr lang="en-GB"/>
           </a:p>
@@ -3066,7 +3066,7 @@
           <a:p>
             <a:fld id="{633AF1EE-65BA-4140-B6B9-7F82C437F84A}" type="datetimeFigureOut">
               <a:rPr lang="en-GB" smtClean="0"/>
-              <a:t>04/03/2025</a:t>
+              <a:t>09/03/2025</a:t>
             </a:fld>
             <a:endParaRPr lang="en-GB"/>
           </a:p>
@@ -3312,7 +3312,7 @@
           <a:p>
             <a:fld id="{633AF1EE-65BA-4140-B6B9-7F82C437F84A}" type="datetimeFigureOut">
               <a:rPr lang="en-GB" smtClean="0"/>
-              <a:t>04/03/2025</a:t>
+              <a:t>09/03/2025</a:t>
             </a:fld>
             <a:endParaRPr lang="en-GB"/>
           </a:p>
@@ -3544,7 +3544,7 @@
           <a:p>
             <a:fld id="{633AF1EE-65BA-4140-B6B9-7F82C437F84A}" type="datetimeFigureOut">
               <a:rPr lang="en-GB" smtClean="0"/>
-              <a:t>04/03/2025</a:t>
+              <a:t>09/03/2025</a:t>
             </a:fld>
             <a:endParaRPr lang="en-GB"/>
           </a:p>
@@ -3911,7 +3911,7 @@
           <a:p>
             <a:fld id="{633AF1EE-65BA-4140-B6B9-7F82C437F84A}" type="datetimeFigureOut">
               <a:rPr lang="en-GB" smtClean="0"/>
-              <a:t>04/03/2025</a:t>
+              <a:t>09/03/2025</a:t>
             </a:fld>
             <a:endParaRPr lang="en-GB"/>
           </a:p>
@@ -4029,7 +4029,7 @@
           <a:p>
             <a:fld id="{633AF1EE-65BA-4140-B6B9-7F82C437F84A}" type="datetimeFigureOut">
               <a:rPr lang="en-GB" smtClean="0"/>
-              <a:t>04/03/2025</a:t>
+              <a:t>09/03/2025</a:t>
             </a:fld>
             <a:endParaRPr lang="en-GB"/>
           </a:p>
@@ -4124,7 +4124,7 @@
           <a:p>
             <a:fld id="{633AF1EE-65BA-4140-B6B9-7F82C437F84A}" type="datetimeFigureOut">
               <a:rPr lang="en-GB" smtClean="0"/>
-              <a:t>04/03/2025</a:t>
+              <a:t>09/03/2025</a:t>
             </a:fld>
             <a:endParaRPr lang="en-GB"/>
           </a:p>
@@ -4401,7 +4401,7 @@
           <a:p>
             <a:fld id="{633AF1EE-65BA-4140-B6B9-7F82C437F84A}" type="datetimeFigureOut">
               <a:rPr lang="en-GB" smtClean="0"/>
-              <a:t>04/03/2025</a:t>
+              <a:t>09/03/2025</a:t>
             </a:fld>
             <a:endParaRPr lang="en-GB"/>
           </a:p>
@@ -4654,7 +4654,7 @@
           <a:p>
             <a:fld id="{633AF1EE-65BA-4140-B6B9-7F82C437F84A}" type="datetimeFigureOut">
               <a:rPr lang="en-GB" smtClean="0"/>
-              <a:t>04/03/2025</a:t>
+              <a:t>09/03/2025</a:t>
             </a:fld>
             <a:endParaRPr lang="en-GB"/>
           </a:p>
@@ -4867,7 +4867,7 @@
           <a:p>
             <a:fld id="{633AF1EE-65BA-4140-B6B9-7F82C437F84A}" type="datetimeFigureOut">
               <a:rPr lang="en-GB" smtClean="0"/>
-              <a:t>04/03/2025</a:t>
+              <a:t>09/03/2025</a:t>
             </a:fld>
             <a:endParaRPr lang="en-GB"/>
           </a:p>
@@ -18739,6 +18739,428 @@
           <p:cNvPr id="2" name="Title 1">
             <a:extLst>
               <a:ext uri="{FF2B5EF4-FFF2-40B4-BE49-F238E27FC236}">
+                <a16:creationId xmlns:a16="http://schemas.microsoft.com/office/drawing/2014/main" id="{168FABAB-79B4-A6B1-BEF5-2A45076B7B02}"/>
+              </a:ext>
+            </a:extLst>
+          </p:cNvPr>
+          <p:cNvSpPr>
+            <a:spLocks noGrp="1"/>
+          </p:cNvSpPr>
+          <p:nvPr>
+            <p:ph type="title"/>
+          </p:nvPr>
+        </p:nvSpPr>
+        <p:spPr/>
+        <p:txBody>
+          <a:bodyPr/>
+          <a:lstStyle/>
+          <a:p>
+            <a:r>
+              <a:rPr lang="en-US" dirty="0"/>
+              <a:t>The Jacobian is a matrix that keeps track of partial derivatives for vector functions</a:t>
+            </a:r>
+            <a:endParaRPr lang="en-IL" dirty="0"/>
+          </a:p>
+        </p:txBody>
+      </p:sp>
+      <p:pic>
+        <p:nvPicPr>
+          <p:cNvPr id="5" name="Picture 4">
+            <a:extLst>
+              <a:ext uri="{FF2B5EF4-FFF2-40B4-BE49-F238E27FC236}">
+                <a16:creationId xmlns:a16="http://schemas.microsoft.com/office/drawing/2014/main" id="{8FA3046C-AA8B-8CA9-C809-BFCE23C70DE3}"/>
+              </a:ext>
+            </a:extLst>
+          </p:cNvPr>
+          <p:cNvPicPr>
+            <a:picLocks noChangeAspect="1"/>
+          </p:cNvPicPr>
+          <p:nvPr/>
+        </p:nvPicPr>
+        <p:blipFill>
+          <a:blip r:embed="rId2">
+            <a:extLst>
+              <a:ext uri="{28A0092B-C50C-407E-A947-70E740481C1C}">
+                <a14:useLocalDpi xmlns:a14="http://schemas.microsoft.com/office/drawing/2010/main" val="0"/>
+              </a:ext>
+            </a:extLst>
+          </a:blip>
+          <a:srcRect/>
+          <a:stretch/>
+        </p:blipFill>
+        <p:spPr>
+          <a:xfrm>
+            <a:off x="480027" y="2287057"/>
+            <a:ext cx="5355280" cy="3631142"/>
+          </a:xfrm>
+          <a:prstGeom prst="rect">
+            <a:avLst/>
+          </a:prstGeom>
+        </p:spPr>
+      </p:pic>
+      <p:graphicFrame>
+        <p:nvGraphicFramePr>
+          <p:cNvPr id="6" name="Object 5">
+            <a:extLst>
+              <a:ext uri="{FF2B5EF4-FFF2-40B4-BE49-F238E27FC236}">
+                <a16:creationId xmlns:a16="http://schemas.microsoft.com/office/drawing/2014/main" id="{111F68A8-FF81-5E99-A9E0-57C2BAC03373}"/>
+              </a:ext>
+            </a:extLst>
+          </p:cNvPr>
+          <p:cNvGraphicFramePr>
+            <a:graphicFrameLocks noChangeAspect="1"/>
+          </p:cNvGraphicFramePr>
+          <p:nvPr/>
+        </p:nvGraphicFramePr>
+        <p:xfrm>
+          <a:off x="7230533" y="2433331"/>
+          <a:ext cx="3850217" cy="3484868"/>
+        </p:xfrm>
+        <a:graphic>
+          <a:graphicData uri="http://schemas.openxmlformats.org/presentationml/2006/ole">
+            <mc:AlternateContent xmlns:mc="http://schemas.openxmlformats.org/markup-compatibility/2006">
+              <mc:Choice xmlns:v="urn:schemas-microsoft-com:vml" Requires="v">
+                <p:oleObj name="Equation" r:id="rId3" imgW="1739880" imgH="1574640" progId="Equation.DSMT4">
+                  <p:embed/>
+                </p:oleObj>
+              </mc:Choice>
+              <mc:Fallback>
+                <p:oleObj name="Equation" r:id="rId3" imgW="1739880" imgH="1574640" progId="Equation.DSMT4">
+                  <p:embed/>
+                  <p:pic>
+                    <p:nvPicPr>
+                      <p:cNvPr id="6" name="Object 5">
+                        <a:extLst>
+                          <a:ext uri="{FF2B5EF4-FFF2-40B4-BE49-F238E27FC236}">
+                            <a16:creationId xmlns:a16="http://schemas.microsoft.com/office/drawing/2014/main" id="{111F68A8-FF81-5E99-A9E0-57C2BAC03373}"/>
+                          </a:ext>
+                        </a:extLst>
+                      </p:cNvPr>
+                      <p:cNvPicPr/>
+                      <p:nvPr/>
+                    </p:nvPicPr>
+                    <p:blipFill>
+                      <a:blip r:embed="rId4"/>
+                      <a:stretch>
+                        <a:fillRect/>
+                      </a:stretch>
+                    </p:blipFill>
+                    <p:spPr>
+                      <a:xfrm>
+                        <a:off x="7230533" y="2433331"/>
+                        <a:ext cx="3850217" cy="3484868"/>
+                      </a:xfrm>
+                      <a:prstGeom prst="rect">
+                        <a:avLst/>
+                      </a:prstGeom>
+                    </p:spPr>
+                  </p:pic>
+                </p:oleObj>
+              </mc:Fallback>
+            </mc:AlternateContent>
+          </a:graphicData>
+        </a:graphic>
+      </p:graphicFrame>
+    </p:spTree>
+    <p:extLst>
+      <p:ext uri="{BB962C8B-B14F-4D97-AF65-F5344CB8AC3E}">
+        <p14:creationId xmlns:p14="http://schemas.microsoft.com/office/powerpoint/2010/main" val="2747427732"/>
+      </p:ext>
+    </p:extLst>
+  </p:cSld>
+  <p:clrMapOvr>
+    <a:masterClrMapping/>
+  </p:clrMapOvr>
+</p:sld>
+</file>
+
+<file path=ppt/slides/slide47.xml><?xml version="1.0" encoding="utf-8"?>
+<p:sld xmlns:a="http://schemas.openxmlformats.org/drawingml/2006/main" xmlns:r="http://schemas.openxmlformats.org/officeDocument/2006/relationships" xmlns:p="http://schemas.openxmlformats.org/presentationml/2006/main">
+  <p:cSld>
+    <p:spTree>
+      <p:nvGrpSpPr>
+        <p:cNvPr id="1" name="">
+          <a:extLst>
+            <a:ext uri="{FF2B5EF4-FFF2-40B4-BE49-F238E27FC236}">
+              <a16:creationId xmlns:a16="http://schemas.microsoft.com/office/drawing/2014/main" id="{B25C5126-1892-3EF7-01BA-94863F0FDB81}"/>
+            </a:ext>
+          </a:extLst>
+        </p:cNvPr>
+        <p:cNvGrpSpPr/>
+        <p:nvPr/>
+      </p:nvGrpSpPr>
+      <p:grpSpPr>
+        <a:xfrm>
+          <a:off x="0" y="0"/>
+          <a:ext cx="0" cy="0"/>
+          <a:chOff x="0" y="0"/>
+          <a:chExt cx="0" cy="0"/>
+        </a:xfrm>
+      </p:grpSpPr>
+      <p:sp>
+        <p:nvSpPr>
+          <p:cNvPr id="2" name="Title 1">
+            <a:extLst>
+              <a:ext uri="{FF2B5EF4-FFF2-40B4-BE49-F238E27FC236}">
+                <a16:creationId xmlns:a16="http://schemas.microsoft.com/office/drawing/2014/main" id="{D43B0B22-990C-A51E-E8B6-0654F8AED84D}"/>
+              </a:ext>
+            </a:extLst>
+          </p:cNvPr>
+          <p:cNvSpPr>
+            <a:spLocks noGrp="1"/>
+          </p:cNvSpPr>
+          <p:nvPr>
+            <p:ph type="title"/>
+          </p:nvPr>
+        </p:nvSpPr>
+        <p:spPr/>
+        <p:txBody>
+          <a:bodyPr>
+            <a:normAutofit fontScale="90000"/>
+          </a:bodyPr>
+          <a:lstStyle/>
+          <a:p>
+            <a:r>
+              <a:rPr lang="en-US" dirty="0"/>
+              <a:t>A tensor generalizes the Jacobian to keep track of partial derivatives for matrix functions</a:t>
+            </a:r>
+            <a:endParaRPr lang="en-IL" dirty="0"/>
+          </a:p>
+        </p:txBody>
+      </p:sp>
+      <p:pic>
+        <p:nvPicPr>
+          <p:cNvPr id="3" name="Picture 2">
+            <a:extLst>
+              <a:ext uri="{FF2B5EF4-FFF2-40B4-BE49-F238E27FC236}">
+                <a16:creationId xmlns:a16="http://schemas.microsoft.com/office/drawing/2014/main" id="{468B13E8-1DD9-CC33-7E2B-53BA17E7F08F}"/>
+              </a:ext>
+            </a:extLst>
+          </p:cNvPr>
+          <p:cNvPicPr>
+            <a:picLocks noChangeAspect="1"/>
+          </p:cNvPicPr>
+          <p:nvPr/>
+        </p:nvPicPr>
+        <p:blipFill>
+          <a:blip r:embed="rId2"/>
+          <a:stretch>
+            <a:fillRect/>
+          </a:stretch>
+        </p:blipFill>
+        <p:spPr>
+          <a:xfrm>
+            <a:off x="546945" y="2579157"/>
+            <a:ext cx="5549055" cy="3339042"/>
+          </a:xfrm>
+          <a:prstGeom prst="rect">
+            <a:avLst/>
+          </a:prstGeom>
+        </p:spPr>
+      </p:pic>
+      <p:graphicFrame>
+        <p:nvGraphicFramePr>
+          <p:cNvPr id="4" name="Object 3">
+            <a:extLst>
+              <a:ext uri="{FF2B5EF4-FFF2-40B4-BE49-F238E27FC236}">
+                <a16:creationId xmlns:a16="http://schemas.microsoft.com/office/drawing/2014/main" id="{6328CF83-07B9-1F03-6A23-F53E3090FBBA}"/>
+              </a:ext>
+            </a:extLst>
+          </p:cNvPr>
+          <p:cNvGraphicFramePr>
+            <a:graphicFrameLocks noChangeAspect="1"/>
+          </p:cNvGraphicFramePr>
+          <p:nvPr/>
+        </p:nvGraphicFramePr>
+        <p:xfrm>
+          <a:off x="7589123" y="3317345"/>
+          <a:ext cx="2947644" cy="1593321"/>
+        </p:xfrm>
+        <a:graphic>
+          <a:graphicData uri="http://schemas.openxmlformats.org/presentationml/2006/ole">
+            <mc:AlternateContent xmlns:mc="http://schemas.openxmlformats.org/markup-compatibility/2006">
+              <mc:Choice xmlns:v="urn:schemas-microsoft-com:vml" Requires="v">
+                <p:oleObj name="Equation" r:id="rId3" imgW="939600" imgH="507960" progId="Equation.DSMT4">
+                  <p:embed/>
+                </p:oleObj>
+              </mc:Choice>
+              <mc:Fallback>
+                <p:oleObj name="Equation" r:id="rId3" imgW="939600" imgH="507960" progId="Equation.DSMT4">
+                  <p:embed/>
+                  <p:pic>
+                    <p:nvPicPr>
+                      <p:cNvPr id="4" name="Object 3">
+                        <a:extLst>
+                          <a:ext uri="{FF2B5EF4-FFF2-40B4-BE49-F238E27FC236}">
+                            <a16:creationId xmlns:a16="http://schemas.microsoft.com/office/drawing/2014/main" id="{6328CF83-07B9-1F03-6A23-F53E3090FBBA}"/>
+                          </a:ext>
+                        </a:extLst>
+                      </p:cNvPr>
+                      <p:cNvPicPr/>
+                      <p:nvPr/>
+                    </p:nvPicPr>
+                    <p:blipFill>
+                      <a:blip r:embed="rId4"/>
+                      <a:stretch>
+                        <a:fillRect/>
+                      </a:stretch>
+                    </p:blipFill>
+                    <p:spPr>
+                      <a:xfrm>
+                        <a:off x="7589123" y="3317345"/>
+                        <a:ext cx="2947644" cy="1593321"/>
+                      </a:xfrm>
+                      <a:prstGeom prst="rect">
+                        <a:avLst/>
+                      </a:prstGeom>
+                    </p:spPr>
+                  </p:pic>
+                </p:oleObj>
+              </mc:Fallback>
+            </mc:AlternateContent>
+          </a:graphicData>
+        </a:graphic>
+      </p:graphicFrame>
+    </p:spTree>
+    <p:extLst>
+      <p:ext uri="{BB962C8B-B14F-4D97-AF65-F5344CB8AC3E}">
+        <p14:creationId xmlns:p14="http://schemas.microsoft.com/office/powerpoint/2010/main" val="1205540472"/>
+      </p:ext>
+    </p:extLst>
+  </p:cSld>
+  <p:clrMapOvr>
+    <a:masterClrMapping/>
+  </p:clrMapOvr>
+</p:sld>
+</file>
+
+<file path=ppt/slides/slide48.xml><?xml version="1.0" encoding="utf-8"?>
+<p:sld xmlns:a="http://schemas.openxmlformats.org/drawingml/2006/main" xmlns:r="http://schemas.openxmlformats.org/officeDocument/2006/relationships" xmlns:p="http://schemas.openxmlformats.org/presentationml/2006/main">
+  <p:cSld>
+    <p:spTree>
+      <p:nvGrpSpPr>
+        <p:cNvPr id="1" name=""/>
+        <p:cNvGrpSpPr/>
+        <p:nvPr/>
+      </p:nvGrpSpPr>
+      <p:grpSpPr>
+        <a:xfrm>
+          <a:off x="0" y="0"/>
+          <a:ext cx="0" cy="0"/>
+          <a:chOff x="0" y="0"/>
+          <a:chExt cx="0" cy="0"/>
+        </a:xfrm>
+      </p:grpSpPr>
+      <p:sp>
+        <p:nvSpPr>
+          <p:cNvPr id="2" name="Title 1">
+            <a:extLst>
+              <a:ext uri="{FF2B5EF4-FFF2-40B4-BE49-F238E27FC236}">
+                <a16:creationId xmlns:a16="http://schemas.microsoft.com/office/drawing/2014/main" id="{1371D413-320D-D3EE-6093-47AC8E01493F}"/>
+              </a:ext>
+            </a:extLst>
+          </p:cNvPr>
+          <p:cNvSpPr>
+            <a:spLocks noGrp="1"/>
+          </p:cNvSpPr>
+          <p:nvPr>
+            <p:ph type="title"/>
+          </p:nvPr>
+        </p:nvSpPr>
+        <p:spPr/>
+        <p:txBody>
+          <a:bodyPr/>
+          <a:lstStyle/>
+          <a:p>
+            <a:r>
+              <a:rPr lang="en-US" dirty="0"/>
+              <a:t>Tensor processing is important</a:t>
+            </a:r>
+            <a:endParaRPr lang="en-IL" dirty="0"/>
+          </a:p>
+        </p:txBody>
+      </p:sp>
+      <p:sp>
+        <p:nvSpPr>
+          <p:cNvPr id="3" name="Content Placeholder 2">
+            <a:extLst>
+              <a:ext uri="{FF2B5EF4-FFF2-40B4-BE49-F238E27FC236}">
+                <a16:creationId xmlns:a16="http://schemas.microsoft.com/office/drawing/2014/main" id="{FD080D8A-CFCB-4014-E85F-252D0EB3F707}"/>
+              </a:ext>
+            </a:extLst>
+          </p:cNvPr>
+          <p:cNvSpPr>
+            <a:spLocks noGrp="1"/>
+          </p:cNvSpPr>
+          <p:nvPr>
+            <p:ph idx="1"/>
+          </p:nvPr>
+        </p:nvSpPr>
+        <p:spPr/>
+        <p:txBody>
+          <a:bodyPr>
+            <a:normAutofit/>
+          </a:bodyPr>
+          <a:lstStyle/>
+          <a:p>
+            <a:r>
+              <a:rPr lang="en-US" sz="2400" dirty="0"/>
+              <a:t>Modern machine learning does calculations with very large multi-dimensional matrixes</a:t>
+            </a:r>
+          </a:p>
+          <a:p>
+            <a:r>
+              <a:rPr lang="en-US" sz="2400" dirty="0"/>
+              <a:t>Probabilistic models are nodes with multi-dimensional input and output</a:t>
+            </a:r>
+          </a:p>
+          <a:p>
+            <a:endParaRPr lang="en-US" sz="2400" dirty="0"/>
+          </a:p>
+          <a:p>
+            <a:r>
+              <a:rPr lang="en-US" sz="2400" dirty="0"/>
+              <a:t>Both fields need automatic differentiation!</a:t>
+            </a:r>
+            <a:endParaRPr lang="en-IL" sz="2400" dirty="0"/>
+          </a:p>
+        </p:txBody>
+      </p:sp>
+    </p:spTree>
+    <p:extLst>
+      <p:ext uri="{BB962C8B-B14F-4D97-AF65-F5344CB8AC3E}">
+        <p14:creationId xmlns:p14="http://schemas.microsoft.com/office/powerpoint/2010/main" val="2076285864"/>
+      </p:ext>
+    </p:extLst>
+  </p:cSld>
+  <p:clrMapOvr>
+    <a:masterClrMapping/>
+  </p:clrMapOvr>
+</p:sld>
+</file>
+
+<file path=ppt/slides/slide49.xml><?xml version="1.0" encoding="utf-8"?>
+<p:sld xmlns:a="http://schemas.openxmlformats.org/drawingml/2006/main" xmlns:r="http://schemas.openxmlformats.org/officeDocument/2006/relationships" xmlns:p="http://schemas.openxmlformats.org/presentationml/2006/main">
+  <p:cSld>
+    <p:spTree>
+      <p:nvGrpSpPr>
+        <p:cNvPr id="1" name=""/>
+        <p:cNvGrpSpPr/>
+        <p:nvPr/>
+      </p:nvGrpSpPr>
+      <p:grpSpPr>
+        <a:xfrm>
+          <a:off x="0" y="0"/>
+          <a:ext cx="0" cy="0"/>
+          <a:chOff x="0" y="0"/>
+          <a:chExt cx="0" cy="0"/>
+        </a:xfrm>
+      </p:grpSpPr>
+      <p:sp>
+        <p:nvSpPr>
+          <p:cNvPr id="2" name="Title 1">
+            <a:extLst>
+              <a:ext uri="{FF2B5EF4-FFF2-40B4-BE49-F238E27FC236}">
                 <a16:creationId xmlns:a16="http://schemas.microsoft.com/office/drawing/2014/main" id="{FB1D440F-C212-7D1D-FD3E-579D372C5806}"/>
               </a:ext>
             </a:extLst>
@@ -18952,591 +19374,6 @@
     <p:extLst>
       <p:ext uri="{BB962C8B-B14F-4D97-AF65-F5344CB8AC3E}">
         <p14:creationId xmlns:p14="http://schemas.microsoft.com/office/powerpoint/2010/main" val="363638187"/>
-      </p:ext>
-    </p:extLst>
-  </p:cSld>
-  <p:clrMapOvr>
-    <a:masterClrMapping/>
-  </p:clrMapOvr>
-</p:sld>
-</file>
-
-<file path=ppt/slides/slide47.xml><?xml version="1.0" encoding="utf-8"?>
-<p:sld xmlns:a="http://schemas.openxmlformats.org/drawingml/2006/main" xmlns:r="http://schemas.openxmlformats.org/officeDocument/2006/relationships" xmlns:p="http://schemas.openxmlformats.org/presentationml/2006/main">
-  <p:cSld>
-    <p:spTree>
-      <p:nvGrpSpPr>
-        <p:cNvPr id="1" name=""/>
-        <p:cNvGrpSpPr/>
-        <p:nvPr/>
-      </p:nvGrpSpPr>
-      <p:grpSpPr>
-        <a:xfrm>
-          <a:off x="0" y="0"/>
-          <a:ext cx="0" cy="0"/>
-          <a:chOff x="0" y="0"/>
-          <a:chExt cx="0" cy="0"/>
-        </a:xfrm>
-      </p:grpSpPr>
-      <p:sp>
-        <p:nvSpPr>
-          <p:cNvPr id="2" name="Title 1">
-            <a:extLst>
-              <a:ext uri="{FF2B5EF4-FFF2-40B4-BE49-F238E27FC236}">
-                <a16:creationId xmlns:a16="http://schemas.microsoft.com/office/drawing/2014/main" id="{47FD9B1C-10D3-6230-56CE-4A7718C5CBCC}"/>
-              </a:ext>
-            </a:extLst>
-          </p:cNvPr>
-          <p:cNvSpPr>
-            <a:spLocks noGrp="1"/>
-          </p:cNvSpPr>
-          <p:nvPr>
-            <p:ph type="title"/>
-          </p:nvPr>
-        </p:nvSpPr>
-        <p:spPr/>
-        <p:txBody>
-          <a:bodyPr/>
-          <a:lstStyle/>
-          <a:p>
-            <a:r>
-              <a:rPr lang="en-US" dirty="0"/>
-              <a:t>Each </a:t>
-            </a:r>
-            <a:r>
-              <a:rPr lang="en-US" dirty="0" err="1"/>
-              <a:t>PyMC</a:t>
-            </a:r>
-            <a:r>
-              <a:rPr lang="en-US" dirty="0"/>
-              <a:t> object is a </a:t>
-            </a:r>
-            <a:r>
-              <a:rPr lang="en-US" dirty="0" err="1"/>
-              <a:t>PyTensor</a:t>
-            </a:r>
-            <a:r>
-              <a:rPr lang="en-US" dirty="0"/>
-              <a:t> object</a:t>
-            </a:r>
-            <a:endParaRPr lang="en-IL" dirty="0"/>
-          </a:p>
-        </p:txBody>
-      </p:sp>
-      <p:sp>
-        <p:nvSpPr>
-          <p:cNvPr id="3" name="Content Placeholder 2">
-            <a:extLst>
-              <a:ext uri="{FF2B5EF4-FFF2-40B4-BE49-F238E27FC236}">
-                <a16:creationId xmlns:a16="http://schemas.microsoft.com/office/drawing/2014/main" id="{E0D40D6A-A4C2-54B8-70DD-940A1FF12B35}"/>
-              </a:ext>
-            </a:extLst>
-          </p:cNvPr>
-          <p:cNvSpPr>
-            <a:spLocks noGrp="1"/>
-          </p:cNvSpPr>
-          <p:nvPr>
-            <p:ph idx="1"/>
-          </p:nvPr>
-        </p:nvSpPr>
-        <p:spPr>
-          <a:xfrm>
-            <a:off x="838200" y="1825625"/>
-            <a:ext cx="10515600" cy="1054735"/>
-          </a:xfrm>
-        </p:spPr>
-        <p:txBody>
-          <a:bodyPr/>
-          <a:lstStyle/>
-          <a:p>
-            <a:r>
-              <a:rPr lang="en-US" sz="2400" dirty="0" err="1">
-                <a:latin typeface="Courier New" panose="02070309020205020404" pitchFamily="49" charset="0"/>
-                <a:cs typeface="Courier New" panose="02070309020205020404" pitchFamily="49" charset="0"/>
-              </a:rPr>
-              <a:t>basic_RVs</a:t>
-            </a:r>
-            <a:r>
-              <a:rPr lang="en-US" sz="2400" dirty="0">
-                <a:latin typeface="Courier New" panose="02070309020205020404" pitchFamily="49" charset="0"/>
-                <a:cs typeface="Courier New" panose="02070309020205020404" pitchFamily="49" charset="0"/>
-              </a:rPr>
-              <a:t> </a:t>
-            </a:r>
-            <a:r>
-              <a:rPr lang="en-US" dirty="0"/>
-              <a:t>shows the random variables in our model</a:t>
-            </a:r>
-            <a:endParaRPr lang="en-IL" dirty="0"/>
-          </a:p>
-        </p:txBody>
-      </p:sp>
-      <p:pic>
-        <p:nvPicPr>
-          <p:cNvPr id="4" name="Picture 3">
-            <a:extLst>
-              <a:ext uri="{FF2B5EF4-FFF2-40B4-BE49-F238E27FC236}">
-                <a16:creationId xmlns:a16="http://schemas.microsoft.com/office/drawing/2014/main" id="{FEB2D5B6-F152-FD6B-1599-943F472BB315}"/>
-              </a:ext>
-            </a:extLst>
-          </p:cNvPr>
-          <p:cNvPicPr>
-            <a:picLocks noChangeAspect="1"/>
-          </p:cNvPicPr>
-          <p:nvPr/>
-        </p:nvPicPr>
-        <p:blipFill>
-          <a:blip r:embed="rId2"/>
-          <a:stretch>
-            <a:fillRect/>
-          </a:stretch>
-        </p:blipFill>
-        <p:spPr>
-          <a:xfrm>
-            <a:off x="5820793" y="3120351"/>
-            <a:ext cx="5090033" cy="1579665"/>
-          </a:xfrm>
-          <a:prstGeom prst="rect">
-            <a:avLst/>
-          </a:prstGeom>
-        </p:spPr>
-      </p:pic>
-    </p:spTree>
-    <p:extLst>
-      <p:ext uri="{BB962C8B-B14F-4D97-AF65-F5344CB8AC3E}">
-        <p14:creationId xmlns:p14="http://schemas.microsoft.com/office/powerpoint/2010/main" val="636229580"/>
-      </p:ext>
-    </p:extLst>
-  </p:cSld>
-  <p:clrMapOvr>
-    <a:masterClrMapping/>
-  </p:clrMapOvr>
-</p:sld>
-</file>
-
-<file path=ppt/slides/slide48.xml><?xml version="1.0" encoding="utf-8"?>
-<p:sld xmlns:a="http://schemas.openxmlformats.org/drawingml/2006/main" xmlns:r="http://schemas.openxmlformats.org/officeDocument/2006/relationships" xmlns:p="http://schemas.openxmlformats.org/presentationml/2006/main">
-  <p:cSld>
-    <p:spTree>
-      <p:nvGrpSpPr>
-        <p:cNvPr id="1" name="">
-          <a:extLst>
-            <a:ext uri="{FF2B5EF4-FFF2-40B4-BE49-F238E27FC236}">
-              <a16:creationId xmlns:a16="http://schemas.microsoft.com/office/drawing/2014/main" id="{919AA02B-8216-10ED-7BAE-28EA2DD9453D}"/>
-            </a:ext>
-          </a:extLst>
-        </p:cNvPr>
-        <p:cNvGrpSpPr/>
-        <p:nvPr/>
-      </p:nvGrpSpPr>
-      <p:grpSpPr>
-        <a:xfrm>
-          <a:off x="0" y="0"/>
-          <a:ext cx="0" cy="0"/>
-          <a:chOff x="0" y="0"/>
-          <a:chExt cx="0" cy="0"/>
-        </a:xfrm>
-      </p:grpSpPr>
-      <p:sp>
-        <p:nvSpPr>
-          <p:cNvPr id="2" name="Title 1">
-            <a:extLst>
-              <a:ext uri="{FF2B5EF4-FFF2-40B4-BE49-F238E27FC236}">
-                <a16:creationId xmlns:a16="http://schemas.microsoft.com/office/drawing/2014/main" id="{00B77CCF-FABD-1E05-0E8F-BD689B5215D9}"/>
-              </a:ext>
-            </a:extLst>
-          </p:cNvPr>
-          <p:cNvSpPr>
-            <a:spLocks noGrp="1"/>
-          </p:cNvSpPr>
-          <p:nvPr>
-            <p:ph type="title"/>
-          </p:nvPr>
-        </p:nvSpPr>
-        <p:spPr/>
-        <p:txBody>
-          <a:bodyPr/>
-          <a:lstStyle/>
-          <a:p>
-            <a:r>
-              <a:rPr lang="en-US" dirty="0"/>
-              <a:t>Each </a:t>
-            </a:r>
-            <a:r>
-              <a:rPr lang="en-US" dirty="0" err="1"/>
-              <a:t>PyMC</a:t>
-            </a:r>
-            <a:r>
-              <a:rPr lang="en-US" dirty="0"/>
-              <a:t> object is a </a:t>
-            </a:r>
-            <a:r>
-              <a:rPr lang="en-US" dirty="0" err="1"/>
-              <a:t>PyTensor</a:t>
-            </a:r>
-            <a:r>
-              <a:rPr lang="en-US" dirty="0"/>
-              <a:t> object</a:t>
-            </a:r>
-            <a:endParaRPr lang="en-IL" dirty="0"/>
-          </a:p>
-        </p:txBody>
-      </p:sp>
-      <p:sp>
-        <p:nvSpPr>
-          <p:cNvPr id="3" name="Content Placeholder 2">
-            <a:extLst>
-              <a:ext uri="{FF2B5EF4-FFF2-40B4-BE49-F238E27FC236}">
-                <a16:creationId xmlns:a16="http://schemas.microsoft.com/office/drawing/2014/main" id="{A299205C-DF29-E26B-CD5E-66928CA1A893}"/>
-              </a:ext>
-            </a:extLst>
-          </p:cNvPr>
-          <p:cNvSpPr>
-            <a:spLocks noGrp="1"/>
-          </p:cNvSpPr>
-          <p:nvPr>
-            <p:ph idx="1"/>
-          </p:nvPr>
-        </p:nvSpPr>
-        <p:spPr>
-          <a:xfrm>
-            <a:off x="838200" y="1825625"/>
-            <a:ext cx="10515600" cy="1054735"/>
-          </a:xfrm>
-        </p:spPr>
-        <p:txBody>
-          <a:bodyPr/>
-          <a:lstStyle/>
-          <a:p>
-            <a:r>
-              <a:rPr lang="en-US" sz="2400" dirty="0" err="1">
-                <a:latin typeface="Courier New" panose="02070309020205020404" pitchFamily="49" charset="0"/>
-                <a:cs typeface="Courier New" panose="02070309020205020404" pitchFamily="49" charset="0"/>
-              </a:rPr>
-              <a:t>basic_RVs</a:t>
-            </a:r>
-            <a:r>
-              <a:rPr lang="en-US" sz="2400" dirty="0">
-                <a:latin typeface="Courier New" panose="02070309020205020404" pitchFamily="49" charset="0"/>
-                <a:cs typeface="Courier New" panose="02070309020205020404" pitchFamily="49" charset="0"/>
-              </a:rPr>
-              <a:t> </a:t>
-            </a:r>
-            <a:r>
-              <a:rPr lang="en-US" dirty="0"/>
-              <a:t>shows the random variables in our model</a:t>
-            </a:r>
-          </a:p>
-          <a:p>
-            <a:r>
-              <a:rPr lang="en-US" sz="2400" dirty="0" err="1">
-                <a:latin typeface="Courier New" panose="02070309020205020404" pitchFamily="49" charset="0"/>
-                <a:cs typeface="Courier New" panose="02070309020205020404" pitchFamily="49" charset="0"/>
-              </a:rPr>
-              <a:t>dprint</a:t>
-            </a:r>
-            <a:r>
-              <a:rPr lang="en-US" dirty="0"/>
-              <a:t> show the graph of relationships</a:t>
-            </a:r>
-          </a:p>
-          <a:p>
-            <a:endParaRPr lang="en-IL" dirty="0"/>
-          </a:p>
-        </p:txBody>
-      </p:sp>
-      <p:pic>
-        <p:nvPicPr>
-          <p:cNvPr id="4" name="Picture 3">
-            <a:extLst>
-              <a:ext uri="{FF2B5EF4-FFF2-40B4-BE49-F238E27FC236}">
-                <a16:creationId xmlns:a16="http://schemas.microsoft.com/office/drawing/2014/main" id="{AA20D924-66D3-B343-A248-0B73CC44DBF0}"/>
-              </a:ext>
-            </a:extLst>
-          </p:cNvPr>
-          <p:cNvPicPr>
-            <a:picLocks noChangeAspect="1"/>
-          </p:cNvPicPr>
-          <p:nvPr/>
-        </p:nvPicPr>
-        <p:blipFill>
-          <a:blip r:embed="rId2"/>
-          <a:stretch>
-            <a:fillRect/>
-          </a:stretch>
-        </p:blipFill>
-        <p:spPr>
-          <a:xfrm>
-            <a:off x="471553" y="2908106"/>
-            <a:ext cx="4191887" cy="1300930"/>
-          </a:xfrm>
-          <a:prstGeom prst="rect">
-            <a:avLst/>
-          </a:prstGeom>
-        </p:spPr>
-      </p:pic>
-      <p:pic>
-        <p:nvPicPr>
-          <p:cNvPr id="5" name="Picture 4">
-            <a:extLst>
-              <a:ext uri="{FF2B5EF4-FFF2-40B4-BE49-F238E27FC236}">
-                <a16:creationId xmlns:a16="http://schemas.microsoft.com/office/drawing/2014/main" id="{A5AB66A9-6712-AFFE-7B18-CBDD839FEF45}"/>
-              </a:ext>
-            </a:extLst>
-          </p:cNvPr>
-          <p:cNvPicPr>
-            <a:picLocks noChangeAspect="1"/>
-          </p:cNvPicPr>
-          <p:nvPr/>
-        </p:nvPicPr>
-        <p:blipFill>
-          <a:blip r:embed="rId3"/>
-          <a:stretch>
-            <a:fillRect/>
-          </a:stretch>
-        </p:blipFill>
-        <p:spPr>
-          <a:xfrm>
-            <a:off x="4902755" y="3015297"/>
-            <a:ext cx="7289245" cy="2827137"/>
-          </a:xfrm>
-          <a:prstGeom prst="rect">
-            <a:avLst/>
-          </a:prstGeom>
-        </p:spPr>
-      </p:pic>
-    </p:spTree>
-    <p:extLst>
-      <p:ext uri="{BB962C8B-B14F-4D97-AF65-F5344CB8AC3E}">
-        <p14:creationId xmlns:p14="http://schemas.microsoft.com/office/powerpoint/2010/main" val="1683935356"/>
-      </p:ext>
-    </p:extLst>
-  </p:cSld>
-  <p:clrMapOvr>
-    <a:masterClrMapping/>
-  </p:clrMapOvr>
-  <p:timing>
-    <p:tnLst>
-      <p:par>
-        <p:cTn id="1" dur="indefinite" restart="never" nodeType="tmRoot">
-          <p:childTnLst>
-            <p:seq concurrent="1" nextAc="seek">
-              <p:cTn id="2" dur="indefinite" nodeType="mainSeq">
-                <p:childTnLst>
-                  <p:par>
-                    <p:cTn id="3" fill="hold">
-                      <p:stCondLst>
-                        <p:cond delay="indefinite"/>
-                      </p:stCondLst>
-                      <p:childTnLst>
-                        <p:par>
-                          <p:cTn id="4" fill="hold">
-                            <p:stCondLst>
-                              <p:cond delay="0"/>
-                            </p:stCondLst>
-                            <p:childTnLst>
-                              <p:par>
-                                <p:cTn id="5" presetID="1" presetClass="entr" presetSubtype="0" fill="hold" nodeType="clickEffect">
-                                  <p:stCondLst>
-                                    <p:cond delay="0"/>
-                                  </p:stCondLst>
-                                  <p:childTnLst>
-                                    <p:set>
-                                      <p:cBhvr>
-                                        <p:cTn id="6" dur="1" fill="hold">
-                                          <p:stCondLst>
-                                            <p:cond delay="0"/>
-                                          </p:stCondLst>
-                                        </p:cTn>
-                                        <p:tgtEl>
-                                          <p:spTgt spid="3">
-                                            <p:txEl>
-                                              <p:pRg st="1" end="1"/>
-                                            </p:txEl>
-                                          </p:spTgt>
-                                        </p:tgtEl>
-                                        <p:attrNameLst>
-                                          <p:attrName>style.visibility</p:attrName>
-                                        </p:attrNameLst>
-                                      </p:cBhvr>
-                                      <p:to>
-                                        <p:strVal val="visible"/>
-                                      </p:to>
-                                    </p:set>
-                                  </p:childTnLst>
-                                </p:cTn>
-                              </p:par>
-                              <p:par>
-                                <p:cTn id="7" presetID="1" presetClass="entr" presetSubtype="0" fill="hold" nodeType="withEffect">
-                                  <p:stCondLst>
-                                    <p:cond delay="0"/>
-                                  </p:stCondLst>
-                                  <p:childTnLst>
-                                    <p:set>
-                                      <p:cBhvr>
-                                        <p:cTn id="8" dur="1" fill="hold">
-                                          <p:stCondLst>
-                                            <p:cond delay="0"/>
-                                          </p:stCondLst>
-                                        </p:cTn>
-                                        <p:tgtEl>
-                                          <p:spTgt spid="5"/>
-                                        </p:tgtEl>
-                                        <p:attrNameLst>
-                                          <p:attrName>style.visibility</p:attrName>
-                                        </p:attrNameLst>
-                                      </p:cBhvr>
-                                      <p:to>
-                                        <p:strVal val="visible"/>
-                                      </p:to>
-                                    </p:set>
-                                  </p:childTnLst>
-                                </p:cTn>
-                              </p:par>
-                            </p:childTnLst>
-                          </p:cTn>
-                        </p:par>
-                      </p:childTnLst>
-                    </p:cTn>
-                  </p:par>
-                </p:childTnLst>
-              </p:cTn>
-              <p:prevCondLst>
-                <p:cond evt="onPrev" delay="0">
-                  <p:tgtEl>
-                    <p:sldTgt/>
-                  </p:tgtEl>
-                </p:cond>
-              </p:prevCondLst>
-              <p:nextCondLst>
-                <p:cond evt="onNext" delay="0">
-                  <p:tgtEl>
-                    <p:sldTgt/>
-                  </p:tgtEl>
-                </p:cond>
-              </p:nextCondLst>
-            </p:seq>
-          </p:childTnLst>
-        </p:cTn>
-      </p:par>
-    </p:tnLst>
-  </p:timing>
-</p:sld>
-</file>
-
-<file path=ppt/slides/slide49.xml><?xml version="1.0" encoding="utf-8"?>
-<p:sld xmlns:a="http://schemas.openxmlformats.org/drawingml/2006/main" xmlns:r="http://schemas.openxmlformats.org/officeDocument/2006/relationships" xmlns:p="http://schemas.openxmlformats.org/presentationml/2006/main">
-  <p:cSld>
-    <p:spTree>
-      <p:nvGrpSpPr>
-        <p:cNvPr id="1" name=""/>
-        <p:cNvGrpSpPr/>
-        <p:nvPr/>
-      </p:nvGrpSpPr>
-      <p:grpSpPr>
-        <a:xfrm>
-          <a:off x="0" y="0"/>
-          <a:ext cx="0" cy="0"/>
-          <a:chOff x="0" y="0"/>
-          <a:chExt cx="0" cy="0"/>
-        </a:xfrm>
-      </p:grpSpPr>
-      <p:sp>
-        <p:nvSpPr>
-          <p:cNvPr id="2" name="Title 1">
-            <a:extLst>
-              <a:ext uri="{FF2B5EF4-FFF2-40B4-BE49-F238E27FC236}">
-                <a16:creationId xmlns:a16="http://schemas.microsoft.com/office/drawing/2014/main" id="{0BCA2CD2-7671-5FAC-E475-6074266365DE}"/>
-              </a:ext>
-            </a:extLst>
-          </p:cNvPr>
-          <p:cNvSpPr>
-            <a:spLocks noGrp="1"/>
-          </p:cNvSpPr>
-          <p:nvPr>
-            <p:ph type="title"/>
-          </p:nvPr>
-        </p:nvSpPr>
-        <p:spPr/>
-        <p:txBody>
-          <a:bodyPr/>
-          <a:lstStyle/>
-          <a:p>
-            <a:r>
-              <a:rPr lang="en-US" dirty="0"/>
-              <a:t>The </a:t>
-            </a:r>
-            <a:r>
-              <a:rPr lang="en-US" dirty="0" err="1"/>
-              <a:t>PyTensor</a:t>
-            </a:r>
-            <a:r>
-              <a:rPr lang="en-US" dirty="0"/>
-              <a:t> graphical visualization</a:t>
-            </a:r>
-            <a:endParaRPr lang="en-IL" dirty="0"/>
-          </a:p>
-        </p:txBody>
-      </p:sp>
-      <p:sp>
-        <p:nvSpPr>
-          <p:cNvPr id="3" name="Content Placeholder 2">
-            <a:extLst>
-              <a:ext uri="{FF2B5EF4-FFF2-40B4-BE49-F238E27FC236}">
-                <a16:creationId xmlns:a16="http://schemas.microsoft.com/office/drawing/2014/main" id="{D906BA4E-7156-BE20-B2A7-4006AEDC0385}"/>
-              </a:ext>
-            </a:extLst>
-          </p:cNvPr>
-          <p:cNvSpPr>
-            <a:spLocks noGrp="1"/>
-          </p:cNvSpPr>
-          <p:nvPr>
-            <p:ph idx="1"/>
-          </p:nvPr>
-        </p:nvSpPr>
-        <p:spPr/>
-        <p:txBody>
-          <a:bodyPr/>
-          <a:lstStyle/>
-          <a:p>
-            <a:endParaRPr lang="en-IL"/>
-          </a:p>
-        </p:txBody>
-      </p:sp>
-      <p:pic>
-        <p:nvPicPr>
-          <p:cNvPr id="4" name="Picture 3">
-            <a:extLst>
-              <a:ext uri="{FF2B5EF4-FFF2-40B4-BE49-F238E27FC236}">
-                <a16:creationId xmlns:a16="http://schemas.microsoft.com/office/drawing/2014/main" id="{B5F13272-F280-1BDE-B13A-44D8CD0FFA8A}"/>
-              </a:ext>
-            </a:extLst>
-          </p:cNvPr>
-          <p:cNvPicPr>
-            <a:picLocks noChangeAspect="1"/>
-          </p:cNvPicPr>
-          <p:nvPr/>
-        </p:nvPicPr>
-        <p:blipFill>
-          <a:blip r:embed="rId2"/>
-          <a:stretch>
-            <a:fillRect/>
-          </a:stretch>
-        </p:blipFill>
-        <p:spPr>
-          <a:xfrm>
-            <a:off x="380999" y="1751568"/>
-            <a:ext cx="11549133" cy="3861832"/>
-          </a:xfrm>
-          <a:prstGeom prst="rect">
-            <a:avLst/>
-          </a:prstGeom>
-        </p:spPr>
-      </p:pic>
-    </p:spTree>
-    <p:extLst>
-      <p:ext uri="{BB962C8B-B14F-4D97-AF65-F5344CB8AC3E}">
-        <p14:creationId xmlns:p14="http://schemas.microsoft.com/office/powerpoint/2010/main" val="3222122075"/>
       </p:ext>
     </p:extLst>
   </p:cSld>
@@ -19944,6 +19781,1361 @@
           <p:cNvPr id="2" name="Title 1">
             <a:extLst>
               <a:ext uri="{FF2B5EF4-FFF2-40B4-BE49-F238E27FC236}">
+                <a16:creationId xmlns:a16="http://schemas.microsoft.com/office/drawing/2014/main" id="{47FD9B1C-10D3-6230-56CE-4A7718C5CBCC}"/>
+              </a:ext>
+            </a:extLst>
+          </p:cNvPr>
+          <p:cNvSpPr>
+            <a:spLocks noGrp="1"/>
+          </p:cNvSpPr>
+          <p:nvPr>
+            <p:ph type="title"/>
+          </p:nvPr>
+        </p:nvSpPr>
+        <p:spPr/>
+        <p:txBody>
+          <a:bodyPr/>
+          <a:lstStyle/>
+          <a:p>
+            <a:r>
+              <a:rPr lang="en-US" dirty="0"/>
+              <a:t>Each </a:t>
+            </a:r>
+            <a:r>
+              <a:rPr lang="en-US" dirty="0" err="1"/>
+              <a:t>PyMC</a:t>
+            </a:r>
+            <a:r>
+              <a:rPr lang="en-US" dirty="0"/>
+              <a:t> object is a </a:t>
+            </a:r>
+            <a:r>
+              <a:rPr lang="en-US" dirty="0" err="1"/>
+              <a:t>PyTensor</a:t>
+            </a:r>
+            <a:r>
+              <a:rPr lang="en-US" dirty="0"/>
+              <a:t> object</a:t>
+            </a:r>
+            <a:endParaRPr lang="en-IL" dirty="0"/>
+          </a:p>
+        </p:txBody>
+      </p:sp>
+      <p:sp>
+        <p:nvSpPr>
+          <p:cNvPr id="3" name="Content Placeholder 2">
+            <a:extLst>
+              <a:ext uri="{FF2B5EF4-FFF2-40B4-BE49-F238E27FC236}">
+                <a16:creationId xmlns:a16="http://schemas.microsoft.com/office/drawing/2014/main" id="{E0D40D6A-A4C2-54B8-70DD-940A1FF12B35}"/>
+              </a:ext>
+            </a:extLst>
+          </p:cNvPr>
+          <p:cNvSpPr>
+            <a:spLocks noGrp="1"/>
+          </p:cNvSpPr>
+          <p:nvPr>
+            <p:ph idx="1"/>
+          </p:nvPr>
+        </p:nvSpPr>
+        <p:spPr>
+          <a:xfrm>
+            <a:off x="838200" y="1825625"/>
+            <a:ext cx="10515600" cy="1054735"/>
+          </a:xfrm>
+        </p:spPr>
+        <p:txBody>
+          <a:bodyPr/>
+          <a:lstStyle/>
+          <a:p>
+            <a:r>
+              <a:rPr lang="en-US" sz="2400" dirty="0" err="1">
+                <a:latin typeface="Courier New" panose="02070309020205020404" pitchFamily="49" charset="0"/>
+                <a:cs typeface="Courier New" panose="02070309020205020404" pitchFamily="49" charset="0"/>
+              </a:rPr>
+              <a:t>basic_RVs</a:t>
+            </a:r>
+            <a:r>
+              <a:rPr lang="en-US" sz="2400" dirty="0">
+                <a:latin typeface="Courier New" panose="02070309020205020404" pitchFamily="49" charset="0"/>
+                <a:cs typeface="Courier New" panose="02070309020205020404" pitchFamily="49" charset="0"/>
+              </a:rPr>
+              <a:t> </a:t>
+            </a:r>
+            <a:r>
+              <a:rPr lang="en-US" dirty="0"/>
+              <a:t>shows the random variables in our model</a:t>
+            </a:r>
+            <a:endParaRPr lang="en-IL" dirty="0"/>
+          </a:p>
+        </p:txBody>
+      </p:sp>
+      <p:pic>
+        <p:nvPicPr>
+          <p:cNvPr id="4" name="Picture 3">
+            <a:extLst>
+              <a:ext uri="{FF2B5EF4-FFF2-40B4-BE49-F238E27FC236}">
+                <a16:creationId xmlns:a16="http://schemas.microsoft.com/office/drawing/2014/main" id="{FEB2D5B6-F152-FD6B-1599-943F472BB315}"/>
+              </a:ext>
+            </a:extLst>
+          </p:cNvPr>
+          <p:cNvPicPr>
+            <a:picLocks noChangeAspect="1"/>
+          </p:cNvPicPr>
+          <p:nvPr/>
+        </p:nvPicPr>
+        <p:blipFill>
+          <a:blip r:embed="rId2"/>
+          <a:stretch>
+            <a:fillRect/>
+          </a:stretch>
+        </p:blipFill>
+        <p:spPr>
+          <a:xfrm>
+            <a:off x="5820793" y="3120351"/>
+            <a:ext cx="5090033" cy="1579665"/>
+          </a:xfrm>
+          <a:prstGeom prst="rect">
+            <a:avLst/>
+          </a:prstGeom>
+        </p:spPr>
+      </p:pic>
+    </p:spTree>
+    <p:extLst>
+      <p:ext uri="{BB962C8B-B14F-4D97-AF65-F5344CB8AC3E}">
+        <p14:creationId xmlns:p14="http://schemas.microsoft.com/office/powerpoint/2010/main" val="636229580"/>
+      </p:ext>
+    </p:extLst>
+  </p:cSld>
+  <p:clrMapOvr>
+    <a:masterClrMapping/>
+  </p:clrMapOvr>
+</p:sld>
+</file>
+
+<file path=ppt/slides/slide51.xml><?xml version="1.0" encoding="utf-8"?>
+<p:sld xmlns:a="http://schemas.openxmlformats.org/drawingml/2006/main" xmlns:r="http://schemas.openxmlformats.org/officeDocument/2006/relationships" xmlns:p="http://schemas.openxmlformats.org/presentationml/2006/main">
+  <p:cSld>
+    <p:spTree>
+      <p:nvGrpSpPr>
+        <p:cNvPr id="1" name="">
+          <a:extLst>
+            <a:ext uri="{FF2B5EF4-FFF2-40B4-BE49-F238E27FC236}">
+              <a16:creationId xmlns:a16="http://schemas.microsoft.com/office/drawing/2014/main" id="{919AA02B-8216-10ED-7BAE-28EA2DD9453D}"/>
+            </a:ext>
+          </a:extLst>
+        </p:cNvPr>
+        <p:cNvGrpSpPr/>
+        <p:nvPr/>
+      </p:nvGrpSpPr>
+      <p:grpSpPr>
+        <a:xfrm>
+          <a:off x="0" y="0"/>
+          <a:ext cx="0" cy="0"/>
+          <a:chOff x="0" y="0"/>
+          <a:chExt cx="0" cy="0"/>
+        </a:xfrm>
+      </p:grpSpPr>
+      <p:sp>
+        <p:nvSpPr>
+          <p:cNvPr id="2" name="Title 1">
+            <a:extLst>
+              <a:ext uri="{FF2B5EF4-FFF2-40B4-BE49-F238E27FC236}">
+                <a16:creationId xmlns:a16="http://schemas.microsoft.com/office/drawing/2014/main" id="{00B77CCF-FABD-1E05-0E8F-BD689B5215D9}"/>
+              </a:ext>
+            </a:extLst>
+          </p:cNvPr>
+          <p:cNvSpPr>
+            <a:spLocks noGrp="1"/>
+          </p:cNvSpPr>
+          <p:nvPr>
+            <p:ph type="title"/>
+          </p:nvPr>
+        </p:nvSpPr>
+        <p:spPr/>
+        <p:txBody>
+          <a:bodyPr/>
+          <a:lstStyle/>
+          <a:p>
+            <a:r>
+              <a:rPr lang="en-US" dirty="0"/>
+              <a:t>Each </a:t>
+            </a:r>
+            <a:r>
+              <a:rPr lang="en-US" dirty="0" err="1"/>
+              <a:t>PyMC</a:t>
+            </a:r>
+            <a:r>
+              <a:rPr lang="en-US" dirty="0"/>
+              <a:t> object is a </a:t>
+            </a:r>
+            <a:r>
+              <a:rPr lang="en-US" dirty="0" err="1"/>
+              <a:t>PyTensor</a:t>
+            </a:r>
+            <a:r>
+              <a:rPr lang="en-US" dirty="0"/>
+              <a:t> object</a:t>
+            </a:r>
+            <a:endParaRPr lang="en-IL" dirty="0"/>
+          </a:p>
+        </p:txBody>
+      </p:sp>
+      <p:sp>
+        <p:nvSpPr>
+          <p:cNvPr id="3" name="Content Placeholder 2">
+            <a:extLst>
+              <a:ext uri="{FF2B5EF4-FFF2-40B4-BE49-F238E27FC236}">
+                <a16:creationId xmlns:a16="http://schemas.microsoft.com/office/drawing/2014/main" id="{A299205C-DF29-E26B-CD5E-66928CA1A893}"/>
+              </a:ext>
+            </a:extLst>
+          </p:cNvPr>
+          <p:cNvSpPr>
+            <a:spLocks noGrp="1"/>
+          </p:cNvSpPr>
+          <p:nvPr>
+            <p:ph idx="1"/>
+          </p:nvPr>
+        </p:nvSpPr>
+        <p:spPr>
+          <a:xfrm>
+            <a:off x="838200" y="1825625"/>
+            <a:ext cx="10515600" cy="1054735"/>
+          </a:xfrm>
+        </p:spPr>
+        <p:txBody>
+          <a:bodyPr/>
+          <a:lstStyle/>
+          <a:p>
+            <a:r>
+              <a:rPr lang="en-US" sz="2400" dirty="0" err="1">
+                <a:latin typeface="Courier New" panose="02070309020205020404" pitchFamily="49" charset="0"/>
+                <a:cs typeface="Courier New" panose="02070309020205020404" pitchFamily="49" charset="0"/>
+              </a:rPr>
+              <a:t>basic_RVs</a:t>
+            </a:r>
+            <a:r>
+              <a:rPr lang="en-US" sz="2400" dirty="0">
+                <a:latin typeface="Courier New" panose="02070309020205020404" pitchFamily="49" charset="0"/>
+                <a:cs typeface="Courier New" panose="02070309020205020404" pitchFamily="49" charset="0"/>
+              </a:rPr>
+              <a:t> </a:t>
+            </a:r>
+            <a:r>
+              <a:rPr lang="en-US" dirty="0"/>
+              <a:t>shows the random variables in our model</a:t>
+            </a:r>
+          </a:p>
+          <a:p>
+            <a:r>
+              <a:rPr lang="en-US" sz="2400" dirty="0" err="1">
+                <a:latin typeface="Courier New" panose="02070309020205020404" pitchFamily="49" charset="0"/>
+                <a:cs typeface="Courier New" panose="02070309020205020404" pitchFamily="49" charset="0"/>
+              </a:rPr>
+              <a:t>dprint</a:t>
+            </a:r>
+            <a:r>
+              <a:rPr lang="en-US" dirty="0"/>
+              <a:t> show the graph of relationships</a:t>
+            </a:r>
+          </a:p>
+          <a:p>
+            <a:endParaRPr lang="en-IL" dirty="0"/>
+          </a:p>
+        </p:txBody>
+      </p:sp>
+      <p:pic>
+        <p:nvPicPr>
+          <p:cNvPr id="4" name="Picture 3">
+            <a:extLst>
+              <a:ext uri="{FF2B5EF4-FFF2-40B4-BE49-F238E27FC236}">
+                <a16:creationId xmlns:a16="http://schemas.microsoft.com/office/drawing/2014/main" id="{AA20D924-66D3-B343-A248-0B73CC44DBF0}"/>
+              </a:ext>
+            </a:extLst>
+          </p:cNvPr>
+          <p:cNvPicPr>
+            <a:picLocks noChangeAspect="1"/>
+          </p:cNvPicPr>
+          <p:nvPr/>
+        </p:nvPicPr>
+        <p:blipFill>
+          <a:blip r:embed="rId2"/>
+          <a:stretch>
+            <a:fillRect/>
+          </a:stretch>
+        </p:blipFill>
+        <p:spPr>
+          <a:xfrm>
+            <a:off x="471553" y="2908106"/>
+            <a:ext cx="4191887" cy="1300930"/>
+          </a:xfrm>
+          <a:prstGeom prst="rect">
+            <a:avLst/>
+          </a:prstGeom>
+        </p:spPr>
+      </p:pic>
+      <p:pic>
+        <p:nvPicPr>
+          <p:cNvPr id="5" name="Picture 4">
+            <a:extLst>
+              <a:ext uri="{FF2B5EF4-FFF2-40B4-BE49-F238E27FC236}">
+                <a16:creationId xmlns:a16="http://schemas.microsoft.com/office/drawing/2014/main" id="{A5AB66A9-6712-AFFE-7B18-CBDD839FEF45}"/>
+              </a:ext>
+            </a:extLst>
+          </p:cNvPr>
+          <p:cNvPicPr>
+            <a:picLocks noChangeAspect="1"/>
+          </p:cNvPicPr>
+          <p:nvPr/>
+        </p:nvPicPr>
+        <p:blipFill>
+          <a:blip r:embed="rId3"/>
+          <a:stretch>
+            <a:fillRect/>
+          </a:stretch>
+        </p:blipFill>
+        <p:spPr>
+          <a:xfrm>
+            <a:off x="4902755" y="3015297"/>
+            <a:ext cx="7289245" cy="2827137"/>
+          </a:xfrm>
+          <a:prstGeom prst="rect">
+            <a:avLst/>
+          </a:prstGeom>
+        </p:spPr>
+      </p:pic>
+      <p:sp>
+        <p:nvSpPr>
+          <p:cNvPr id="6" name="TextBox 5">
+            <a:extLst>
+              <a:ext uri="{FF2B5EF4-FFF2-40B4-BE49-F238E27FC236}">
+                <a16:creationId xmlns:a16="http://schemas.microsoft.com/office/drawing/2014/main" id="{67C69000-6425-81B7-5481-9489E2BCDC65}"/>
+              </a:ext>
+            </a:extLst>
+          </p:cNvPr>
+          <p:cNvSpPr txBox="1"/>
+          <p:nvPr/>
+        </p:nvSpPr>
+        <p:spPr>
+          <a:xfrm>
+            <a:off x="1226239" y="4998968"/>
+            <a:ext cx="568425" cy="400110"/>
+          </a:xfrm>
+          <a:prstGeom prst="rect">
+            <a:avLst/>
+          </a:prstGeom>
+          <a:noFill/>
+        </p:spPr>
+        <p:txBody>
+          <a:bodyPr wrap="none" rtlCol="0">
+            <a:spAutoFit/>
+          </a:bodyPr>
+          <a:lstStyle/>
+          <a:p>
+            <a:r>
+              <a:rPr lang="en-US" sz="2000" dirty="0">
+                <a:solidFill>
+                  <a:srgbClr val="FF0000"/>
+                </a:solidFill>
+              </a:rPr>
+              <a:t>size</a:t>
+            </a:r>
+            <a:endParaRPr lang="en-IL" sz="2000" dirty="0">
+              <a:solidFill>
+                <a:srgbClr val="FF0000"/>
+              </a:solidFill>
+            </a:endParaRPr>
+          </a:p>
+        </p:txBody>
+      </p:sp>
+      <p:cxnSp>
+        <p:nvCxnSpPr>
+          <p:cNvPr id="8" name="Straight Arrow Connector 7">
+            <a:extLst>
+              <a:ext uri="{FF2B5EF4-FFF2-40B4-BE49-F238E27FC236}">
+                <a16:creationId xmlns:a16="http://schemas.microsoft.com/office/drawing/2014/main" id="{54569A9A-9B6E-F291-2A6D-55B789A3923A}"/>
+              </a:ext>
+            </a:extLst>
+          </p:cNvPr>
+          <p:cNvCxnSpPr>
+            <a:cxnSpLocks/>
+            <a:stCxn id="6" idx="3"/>
+          </p:cNvCxnSpPr>
+          <p:nvPr/>
+        </p:nvCxnSpPr>
+        <p:spPr>
+          <a:xfrm flipV="1">
+            <a:off x="1794664" y="4209036"/>
+            <a:ext cx="3191811" cy="989987"/>
+          </a:xfrm>
+          <a:prstGeom prst="straightConnector1">
+            <a:avLst/>
+          </a:prstGeom>
+          <a:ln>
+            <a:solidFill>
+              <a:srgbClr val="FF0000"/>
+            </a:solidFill>
+            <a:tailEnd type="triangle"/>
+          </a:ln>
+        </p:spPr>
+        <p:style>
+          <a:lnRef idx="1">
+            <a:schemeClr val="accent2"/>
+          </a:lnRef>
+          <a:fillRef idx="0">
+            <a:schemeClr val="accent2"/>
+          </a:fillRef>
+          <a:effectRef idx="0">
+            <a:schemeClr val="accent2"/>
+          </a:effectRef>
+          <a:fontRef idx="minor">
+            <a:schemeClr val="tx1"/>
+          </a:fontRef>
+        </p:style>
+      </p:cxnSp>
+      <p:cxnSp>
+        <p:nvCxnSpPr>
+          <p:cNvPr id="9" name="Straight Arrow Connector 8">
+            <a:extLst>
+              <a:ext uri="{FF2B5EF4-FFF2-40B4-BE49-F238E27FC236}">
+                <a16:creationId xmlns:a16="http://schemas.microsoft.com/office/drawing/2014/main" id="{7ED8794F-9B17-1184-2CC1-8BBCF4AA814E}"/>
+              </a:ext>
+            </a:extLst>
+          </p:cNvPr>
+          <p:cNvCxnSpPr>
+            <a:cxnSpLocks/>
+            <a:stCxn id="6" idx="3"/>
+          </p:cNvCxnSpPr>
+          <p:nvPr/>
+        </p:nvCxnSpPr>
+        <p:spPr>
+          <a:xfrm flipV="1">
+            <a:off x="1794664" y="5070633"/>
+            <a:ext cx="3439809" cy="128390"/>
+          </a:xfrm>
+          <a:prstGeom prst="straightConnector1">
+            <a:avLst/>
+          </a:prstGeom>
+          <a:ln>
+            <a:solidFill>
+              <a:srgbClr val="FF0000"/>
+            </a:solidFill>
+            <a:tailEnd type="triangle"/>
+          </a:ln>
+        </p:spPr>
+        <p:style>
+          <a:lnRef idx="1">
+            <a:schemeClr val="accent2"/>
+          </a:lnRef>
+          <a:fillRef idx="0">
+            <a:schemeClr val="accent2"/>
+          </a:fillRef>
+          <a:effectRef idx="0">
+            <a:schemeClr val="accent2"/>
+          </a:effectRef>
+          <a:fontRef idx="minor">
+            <a:schemeClr val="tx1"/>
+          </a:fontRef>
+        </p:style>
+      </p:cxnSp>
+      <p:sp>
+        <p:nvSpPr>
+          <p:cNvPr id="12" name="TextBox 11">
+            <a:extLst>
+              <a:ext uri="{FF2B5EF4-FFF2-40B4-BE49-F238E27FC236}">
+                <a16:creationId xmlns:a16="http://schemas.microsoft.com/office/drawing/2014/main" id="{E46AA7CF-E34C-AC04-998C-8D7659FDF3A7}"/>
+              </a:ext>
+            </a:extLst>
+          </p:cNvPr>
+          <p:cNvSpPr txBox="1"/>
+          <p:nvPr/>
+        </p:nvSpPr>
+        <p:spPr>
+          <a:xfrm>
+            <a:off x="905812" y="4598858"/>
+            <a:ext cx="649537" cy="400110"/>
+          </a:xfrm>
+          <a:prstGeom prst="rect">
+            <a:avLst/>
+          </a:prstGeom>
+          <a:noFill/>
+        </p:spPr>
+        <p:txBody>
+          <a:bodyPr wrap="none" rtlCol="0">
+            <a:spAutoFit/>
+          </a:bodyPr>
+          <a:lstStyle/>
+          <a:p>
+            <a:r>
+              <a:rPr lang="en-US" sz="2000" dirty="0">
+                <a:solidFill>
+                  <a:srgbClr val="00B0F0"/>
+                </a:solidFill>
+              </a:rPr>
+              <a:t>type</a:t>
+            </a:r>
+            <a:endParaRPr lang="en-IL" sz="2000" dirty="0">
+              <a:solidFill>
+                <a:srgbClr val="00B0F0"/>
+              </a:solidFill>
+            </a:endParaRPr>
+          </a:p>
+        </p:txBody>
+      </p:sp>
+      <p:cxnSp>
+        <p:nvCxnSpPr>
+          <p:cNvPr id="13" name="Straight Arrow Connector 12">
+            <a:extLst>
+              <a:ext uri="{FF2B5EF4-FFF2-40B4-BE49-F238E27FC236}">
+                <a16:creationId xmlns:a16="http://schemas.microsoft.com/office/drawing/2014/main" id="{22F6935A-AB59-4F0F-CEC0-512605963F31}"/>
+              </a:ext>
+            </a:extLst>
+          </p:cNvPr>
+          <p:cNvCxnSpPr>
+            <a:cxnSpLocks/>
+            <a:stCxn id="12" idx="3"/>
+          </p:cNvCxnSpPr>
+          <p:nvPr/>
+        </p:nvCxnSpPr>
+        <p:spPr>
+          <a:xfrm flipV="1">
+            <a:off x="1555349" y="4031321"/>
+            <a:ext cx="3511173" cy="767592"/>
+          </a:xfrm>
+          <a:prstGeom prst="straightConnector1">
+            <a:avLst/>
+          </a:prstGeom>
+          <a:ln>
+            <a:tailEnd type="triangle"/>
+          </a:ln>
+        </p:spPr>
+        <p:style>
+          <a:lnRef idx="1">
+            <a:schemeClr val="accent1"/>
+          </a:lnRef>
+          <a:fillRef idx="0">
+            <a:schemeClr val="accent1"/>
+          </a:fillRef>
+          <a:effectRef idx="0">
+            <a:schemeClr val="accent1"/>
+          </a:effectRef>
+          <a:fontRef idx="minor">
+            <a:schemeClr val="tx1"/>
+          </a:fontRef>
+        </p:style>
+      </p:cxnSp>
+      <p:cxnSp>
+        <p:nvCxnSpPr>
+          <p:cNvPr id="14" name="Straight Arrow Connector 13">
+            <a:extLst>
+              <a:ext uri="{FF2B5EF4-FFF2-40B4-BE49-F238E27FC236}">
+                <a16:creationId xmlns:a16="http://schemas.microsoft.com/office/drawing/2014/main" id="{1FB5ED27-C544-C3D0-A8AE-287F1A9B5636}"/>
+              </a:ext>
+            </a:extLst>
+          </p:cNvPr>
+          <p:cNvCxnSpPr>
+            <a:cxnSpLocks/>
+            <a:stCxn id="12" idx="3"/>
+          </p:cNvCxnSpPr>
+          <p:nvPr/>
+        </p:nvCxnSpPr>
+        <p:spPr>
+          <a:xfrm>
+            <a:off x="1555349" y="4798913"/>
+            <a:ext cx="3679124" cy="71665"/>
+          </a:xfrm>
+          <a:prstGeom prst="straightConnector1">
+            <a:avLst/>
+          </a:prstGeom>
+          <a:ln>
+            <a:tailEnd type="triangle"/>
+          </a:ln>
+        </p:spPr>
+        <p:style>
+          <a:lnRef idx="1">
+            <a:schemeClr val="accent1"/>
+          </a:lnRef>
+          <a:fillRef idx="0">
+            <a:schemeClr val="accent1"/>
+          </a:fillRef>
+          <a:effectRef idx="0">
+            <a:schemeClr val="accent1"/>
+          </a:effectRef>
+          <a:fontRef idx="minor">
+            <a:schemeClr val="tx1"/>
+          </a:fontRef>
+        </p:style>
+      </p:cxnSp>
+      <p:sp>
+        <p:nvSpPr>
+          <p:cNvPr id="25" name="TextBox 24">
+            <a:extLst>
+              <a:ext uri="{FF2B5EF4-FFF2-40B4-BE49-F238E27FC236}">
+                <a16:creationId xmlns:a16="http://schemas.microsoft.com/office/drawing/2014/main" id="{B4D01079-E63B-0510-A13F-910157AD80EE}"/>
+              </a:ext>
+            </a:extLst>
+          </p:cNvPr>
+          <p:cNvSpPr txBox="1"/>
+          <p:nvPr/>
+        </p:nvSpPr>
+        <p:spPr>
+          <a:xfrm>
+            <a:off x="721168" y="5399078"/>
+            <a:ext cx="1381212" cy="400110"/>
+          </a:xfrm>
+          <a:prstGeom prst="rect">
+            <a:avLst/>
+          </a:prstGeom>
+          <a:noFill/>
+        </p:spPr>
+        <p:txBody>
+          <a:bodyPr wrap="none" rtlCol="0">
+            <a:spAutoFit/>
+          </a:bodyPr>
+          <a:lstStyle/>
+          <a:p>
+            <a:r>
+              <a:rPr lang="en-US" sz="2000" dirty="0">
+                <a:solidFill>
+                  <a:srgbClr val="00B050"/>
+                </a:solidFill>
+              </a:rPr>
+              <a:t>parameters</a:t>
+            </a:r>
+            <a:endParaRPr lang="en-IL" sz="2000" dirty="0">
+              <a:solidFill>
+                <a:srgbClr val="00B050"/>
+              </a:solidFill>
+            </a:endParaRPr>
+          </a:p>
+        </p:txBody>
+      </p:sp>
+      <p:cxnSp>
+        <p:nvCxnSpPr>
+          <p:cNvPr id="26" name="Straight Arrow Connector 25">
+            <a:extLst>
+              <a:ext uri="{FF2B5EF4-FFF2-40B4-BE49-F238E27FC236}">
+                <a16:creationId xmlns:a16="http://schemas.microsoft.com/office/drawing/2014/main" id="{9F0B8125-5A94-72A7-8882-9D8C05F681B9}"/>
+              </a:ext>
+            </a:extLst>
+          </p:cNvPr>
+          <p:cNvCxnSpPr>
+            <a:cxnSpLocks/>
+            <a:stCxn id="25" idx="3"/>
+          </p:cNvCxnSpPr>
+          <p:nvPr/>
+        </p:nvCxnSpPr>
+        <p:spPr>
+          <a:xfrm flipV="1">
+            <a:off x="2102380" y="4625625"/>
+            <a:ext cx="2964142" cy="973508"/>
+          </a:xfrm>
+          <a:prstGeom prst="straightConnector1">
+            <a:avLst/>
+          </a:prstGeom>
+          <a:ln>
+            <a:solidFill>
+              <a:srgbClr val="00B050"/>
+            </a:solidFill>
+            <a:tailEnd type="triangle"/>
+          </a:ln>
+        </p:spPr>
+        <p:style>
+          <a:lnRef idx="1">
+            <a:schemeClr val="accent2"/>
+          </a:lnRef>
+          <a:fillRef idx="0">
+            <a:schemeClr val="accent2"/>
+          </a:fillRef>
+          <a:effectRef idx="0">
+            <a:schemeClr val="accent2"/>
+          </a:effectRef>
+          <a:fontRef idx="minor">
+            <a:schemeClr val="tx1"/>
+          </a:fontRef>
+        </p:style>
+      </p:cxnSp>
+      <p:cxnSp>
+        <p:nvCxnSpPr>
+          <p:cNvPr id="27" name="Straight Arrow Connector 26">
+            <a:extLst>
+              <a:ext uri="{FF2B5EF4-FFF2-40B4-BE49-F238E27FC236}">
+                <a16:creationId xmlns:a16="http://schemas.microsoft.com/office/drawing/2014/main" id="{0B437B96-EFAE-0DDD-278E-605B9E63B329}"/>
+              </a:ext>
+            </a:extLst>
+          </p:cNvPr>
+          <p:cNvCxnSpPr>
+            <a:cxnSpLocks/>
+            <a:stCxn id="25" idx="3"/>
+          </p:cNvCxnSpPr>
+          <p:nvPr/>
+        </p:nvCxnSpPr>
+        <p:spPr>
+          <a:xfrm flipV="1">
+            <a:off x="2102380" y="5456533"/>
+            <a:ext cx="3108091" cy="142600"/>
+          </a:xfrm>
+          <a:prstGeom prst="straightConnector1">
+            <a:avLst/>
+          </a:prstGeom>
+          <a:ln>
+            <a:solidFill>
+              <a:srgbClr val="00B050"/>
+            </a:solidFill>
+            <a:tailEnd type="triangle"/>
+          </a:ln>
+        </p:spPr>
+        <p:style>
+          <a:lnRef idx="1">
+            <a:schemeClr val="accent2"/>
+          </a:lnRef>
+          <a:fillRef idx="0">
+            <a:schemeClr val="accent2"/>
+          </a:fillRef>
+          <a:effectRef idx="0">
+            <a:schemeClr val="accent2"/>
+          </a:effectRef>
+          <a:fontRef idx="minor">
+            <a:schemeClr val="tx1"/>
+          </a:fontRef>
+        </p:style>
+      </p:cxnSp>
+      <p:cxnSp>
+        <p:nvCxnSpPr>
+          <p:cNvPr id="28" name="Straight Arrow Connector 27">
+            <a:extLst>
+              <a:ext uri="{FF2B5EF4-FFF2-40B4-BE49-F238E27FC236}">
+                <a16:creationId xmlns:a16="http://schemas.microsoft.com/office/drawing/2014/main" id="{7E8D5A7F-BE45-81D3-DDC4-6DDDAB9AB7F1}"/>
+              </a:ext>
+            </a:extLst>
+          </p:cNvPr>
+          <p:cNvCxnSpPr>
+            <a:cxnSpLocks/>
+            <a:stCxn id="25" idx="3"/>
+          </p:cNvCxnSpPr>
+          <p:nvPr/>
+        </p:nvCxnSpPr>
+        <p:spPr>
+          <a:xfrm>
+            <a:off x="2102380" y="5599133"/>
+            <a:ext cx="3108091" cy="33506"/>
+          </a:xfrm>
+          <a:prstGeom prst="straightConnector1">
+            <a:avLst/>
+          </a:prstGeom>
+          <a:ln>
+            <a:solidFill>
+              <a:srgbClr val="00B050"/>
+            </a:solidFill>
+            <a:tailEnd type="triangle"/>
+          </a:ln>
+        </p:spPr>
+        <p:style>
+          <a:lnRef idx="1">
+            <a:schemeClr val="accent2"/>
+          </a:lnRef>
+          <a:fillRef idx="0">
+            <a:schemeClr val="accent2"/>
+          </a:fillRef>
+          <a:effectRef idx="0">
+            <a:schemeClr val="accent2"/>
+          </a:effectRef>
+          <a:fontRef idx="minor">
+            <a:schemeClr val="tx1"/>
+          </a:fontRef>
+        </p:style>
+      </p:cxnSp>
+    </p:spTree>
+    <p:extLst>
+      <p:ext uri="{BB962C8B-B14F-4D97-AF65-F5344CB8AC3E}">
+        <p14:creationId xmlns:p14="http://schemas.microsoft.com/office/powerpoint/2010/main" val="1683935356"/>
+      </p:ext>
+    </p:extLst>
+  </p:cSld>
+  <p:clrMapOvr>
+    <a:masterClrMapping/>
+  </p:clrMapOvr>
+  <p:timing>
+    <p:tnLst>
+      <p:par>
+        <p:cTn id="1" dur="indefinite" restart="never" nodeType="tmRoot">
+          <p:childTnLst>
+            <p:seq concurrent="1" nextAc="seek">
+              <p:cTn id="2" dur="indefinite" nodeType="mainSeq">
+                <p:childTnLst>
+                  <p:par>
+                    <p:cTn id="3" fill="hold">
+                      <p:stCondLst>
+                        <p:cond delay="indefinite"/>
+                      </p:stCondLst>
+                      <p:childTnLst>
+                        <p:par>
+                          <p:cTn id="4" fill="hold">
+                            <p:stCondLst>
+                              <p:cond delay="0"/>
+                            </p:stCondLst>
+                            <p:childTnLst>
+                              <p:par>
+                                <p:cTn id="5" presetID="1" presetClass="entr" presetSubtype="0" fill="hold" nodeType="clickEffect">
+                                  <p:stCondLst>
+                                    <p:cond delay="0"/>
+                                  </p:stCondLst>
+                                  <p:childTnLst>
+                                    <p:set>
+                                      <p:cBhvr>
+                                        <p:cTn id="6" dur="1" fill="hold">
+                                          <p:stCondLst>
+                                            <p:cond delay="0"/>
+                                          </p:stCondLst>
+                                        </p:cTn>
+                                        <p:tgtEl>
+                                          <p:spTgt spid="3">
+                                            <p:txEl>
+                                              <p:pRg st="1" end="1"/>
+                                            </p:txEl>
+                                          </p:spTgt>
+                                        </p:tgtEl>
+                                        <p:attrNameLst>
+                                          <p:attrName>style.visibility</p:attrName>
+                                        </p:attrNameLst>
+                                      </p:cBhvr>
+                                      <p:to>
+                                        <p:strVal val="visible"/>
+                                      </p:to>
+                                    </p:set>
+                                  </p:childTnLst>
+                                </p:cTn>
+                              </p:par>
+                              <p:par>
+                                <p:cTn id="7" presetID="1" presetClass="entr" presetSubtype="0" fill="hold" nodeType="withEffect">
+                                  <p:stCondLst>
+                                    <p:cond delay="0"/>
+                                  </p:stCondLst>
+                                  <p:childTnLst>
+                                    <p:set>
+                                      <p:cBhvr>
+                                        <p:cTn id="8" dur="1" fill="hold">
+                                          <p:stCondLst>
+                                            <p:cond delay="0"/>
+                                          </p:stCondLst>
+                                        </p:cTn>
+                                        <p:tgtEl>
+                                          <p:spTgt spid="5"/>
+                                        </p:tgtEl>
+                                        <p:attrNameLst>
+                                          <p:attrName>style.visibility</p:attrName>
+                                        </p:attrNameLst>
+                                      </p:cBhvr>
+                                      <p:to>
+                                        <p:strVal val="visible"/>
+                                      </p:to>
+                                    </p:set>
+                                  </p:childTnLst>
+                                </p:cTn>
+                              </p:par>
+                            </p:childTnLst>
+                          </p:cTn>
+                        </p:par>
+                      </p:childTnLst>
+                    </p:cTn>
+                  </p:par>
+                  <p:par>
+                    <p:cTn id="9" fill="hold">
+                      <p:stCondLst>
+                        <p:cond delay="indefinite"/>
+                      </p:stCondLst>
+                      <p:childTnLst>
+                        <p:par>
+                          <p:cTn id="10" fill="hold">
+                            <p:stCondLst>
+                              <p:cond delay="0"/>
+                            </p:stCondLst>
+                            <p:childTnLst>
+                              <p:par>
+                                <p:cTn id="11" presetID="1" presetClass="entr" presetSubtype="0" fill="hold" grpId="0" nodeType="clickEffect">
+                                  <p:stCondLst>
+                                    <p:cond delay="0"/>
+                                  </p:stCondLst>
+                                  <p:childTnLst>
+                                    <p:set>
+                                      <p:cBhvr>
+                                        <p:cTn id="12" dur="1" fill="hold">
+                                          <p:stCondLst>
+                                            <p:cond delay="0"/>
+                                          </p:stCondLst>
+                                        </p:cTn>
+                                        <p:tgtEl>
+                                          <p:spTgt spid="12"/>
+                                        </p:tgtEl>
+                                        <p:attrNameLst>
+                                          <p:attrName>style.visibility</p:attrName>
+                                        </p:attrNameLst>
+                                      </p:cBhvr>
+                                      <p:to>
+                                        <p:strVal val="visible"/>
+                                      </p:to>
+                                    </p:set>
+                                  </p:childTnLst>
+                                </p:cTn>
+                              </p:par>
+                              <p:par>
+                                <p:cTn id="13" presetID="1" presetClass="entr" presetSubtype="0" fill="hold" nodeType="withEffect">
+                                  <p:stCondLst>
+                                    <p:cond delay="0"/>
+                                  </p:stCondLst>
+                                  <p:childTnLst>
+                                    <p:set>
+                                      <p:cBhvr>
+                                        <p:cTn id="14" dur="1" fill="hold">
+                                          <p:stCondLst>
+                                            <p:cond delay="0"/>
+                                          </p:stCondLst>
+                                        </p:cTn>
+                                        <p:tgtEl>
+                                          <p:spTgt spid="13"/>
+                                        </p:tgtEl>
+                                        <p:attrNameLst>
+                                          <p:attrName>style.visibility</p:attrName>
+                                        </p:attrNameLst>
+                                      </p:cBhvr>
+                                      <p:to>
+                                        <p:strVal val="visible"/>
+                                      </p:to>
+                                    </p:set>
+                                  </p:childTnLst>
+                                </p:cTn>
+                              </p:par>
+                              <p:par>
+                                <p:cTn id="15" presetID="1" presetClass="entr" presetSubtype="0" fill="hold" nodeType="withEffect">
+                                  <p:stCondLst>
+                                    <p:cond delay="0"/>
+                                  </p:stCondLst>
+                                  <p:childTnLst>
+                                    <p:set>
+                                      <p:cBhvr>
+                                        <p:cTn id="16" dur="1" fill="hold">
+                                          <p:stCondLst>
+                                            <p:cond delay="0"/>
+                                          </p:stCondLst>
+                                        </p:cTn>
+                                        <p:tgtEl>
+                                          <p:spTgt spid="14"/>
+                                        </p:tgtEl>
+                                        <p:attrNameLst>
+                                          <p:attrName>style.visibility</p:attrName>
+                                        </p:attrNameLst>
+                                      </p:cBhvr>
+                                      <p:to>
+                                        <p:strVal val="visible"/>
+                                      </p:to>
+                                    </p:set>
+                                  </p:childTnLst>
+                                </p:cTn>
+                              </p:par>
+                            </p:childTnLst>
+                          </p:cTn>
+                        </p:par>
+                      </p:childTnLst>
+                    </p:cTn>
+                  </p:par>
+                  <p:par>
+                    <p:cTn id="17" fill="hold">
+                      <p:stCondLst>
+                        <p:cond delay="indefinite"/>
+                      </p:stCondLst>
+                      <p:childTnLst>
+                        <p:par>
+                          <p:cTn id="18" fill="hold">
+                            <p:stCondLst>
+                              <p:cond delay="0"/>
+                            </p:stCondLst>
+                            <p:childTnLst>
+                              <p:par>
+                                <p:cTn id="19" presetID="1" presetClass="entr" presetSubtype="0" fill="hold" grpId="0" nodeType="clickEffect">
+                                  <p:stCondLst>
+                                    <p:cond delay="0"/>
+                                  </p:stCondLst>
+                                  <p:childTnLst>
+                                    <p:set>
+                                      <p:cBhvr>
+                                        <p:cTn id="20" dur="1" fill="hold">
+                                          <p:stCondLst>
+                                            <p:cond delay="0"/>
+                                          </p:stCondLst>
+                                        </p:cTn>
+                                        <p:tgtEl>
+                                          <p:spTgt spid="6"/>
+                                        </p:tgtEl>
+                                        <p:attrNameLst>
+                                          <p:attrName>style.visibility</p:attrName>
+                                        </p:attrNameLst>
+                                      </p:cBhvr>
+                                      <p:to>
+                                        <p:strVal val="visible"/>
+                                      </p:to>
+                                    </p:set>
+                                  </p:childTnLst>
+                                </p:cTn>
+                              </p:par>
+                              <p:par>
+                                <p:cTn id="21" presetID="1" presetClass="entr" presetSubtype="0" fill="hold" nodeType="withEffect">
+                                  <p:stCondLst>
+                                    <p:cond delay="0"/>
+                                  </p:stCondLst>
+                                  <p:childTnLst>
+                                    <p:set>
+                                      <p:cBhvr>
+                                        <p:cTn id="22" dur="1" fill="hold">
+                                          <p:stCondLst>
+                                            <p:cond delay="0"/>
+                                          </p:stCondLst>
+                                        </p:cTn>
+                                        <p:tgtEl>
+                                          <p:spTgt spid="8"/>
+                                        </p:tgtEl>
+                                        <p:attrNameLst>
+                                          <p:attrName>style.visibility</p:attrName>
+                                        </p:attrNameLst>
+                                      </p:cBhvr>
+                                      <p:to>
+                                        <p:strVal val="visible"/>
+                                      </p:to>
+                                    </p:set>
+                                  </p:childTnLst>
+                                </p:cTn>
+                              </p:par>
+                              <p:par>
+                                <p:cTn id="23" presetID="1" presetClass="entr" presetSubtype="0" fill="hold" nodeType="withEffect">
+                                  <p:stCondLst>
+                                    <p:cond delay="0"/>
+                                  </p:stCondLst>
+                                  <p:childTnLst>
+                                    <p:set>
+                                      <p:cBhvr>
+                                        <p:cTn id="24" dur="1" fill="hold">
+                                          <p:stCondLst>
+                                            <p:cond delay="0"/>
+                                          </p:stCondLst>
+                                        </p:cTn>
+                                        <p:tgtEl>
+                                          <p:spTgt spid="9"/>
+                                        </p:tgtEl>
+                                        <p:attrNameLst>
+                                          <p:attrName>style.visibility</p:attrName>
+                                        </p:attrNameLst>
+                                      </p:cBhvr>
+                                      <p:to>
+                                        <p:strVal val="visible"/>
+                                      </p:to>
+                                    </p:set>
+                                  </p:childTnLst>
+                                </p:cTn>
+                              </p:par>
+                            </p:childTnLst>
+                          </p:cTn>
+                        </p:par>
+                      </p:childTnLst>
+                    </p:cTn>
+                  </p:par>
+                  <p:par>
+                    <p:cTn id="25" fill="hold">
+                      <p:stCondLst>
+                        <p:cond delay="indefinite"/>
+                      </p:stCondLst>
+                      <p:childTnLst>
+                        <p:par>
+                          <p:cTn id="26" fill="hold">
+                            <p:stCondLst>
+                              <p:cond delay="0"/>
+                            </p:stCondLst>
+                            <p:childTnLst>
+                              <p:par>
+                                <p:cTn id="27" presetID="1" presetClass="entr" presetSubtype="0" fill="hold" grpId="0" nodeType="clickEffect">
+                                  <p:stCondLst>
+                                    <p:cond delay="0"/>
+                                  </p:stCondLst>
+                                  <p:childTnLst>
+                                    <p:set>
+                                      <p:cBhvr>
+                                        <p:cTn id="28" dur="1" fill="hold">
+                                          <p:stCondLst>
+                                            <p:cond delay="0"/>
+                                          </p:stCondLst>
+                                        </p:cTn>
+                                        <p:tgtEl>
+                                          <p:spTgt spid="25"/>
+                                        </p:tgtEl>
+                                        <p:attrNameLst>
+                                          <p:attrName>style.visibility</p:attrName>
+                                        </p:attrNameLst>
+                                      </p:cBhvr>
+                                      <p:to>
+                                        <p:strVal val="visible"/>
+                                      </p:to>
+                                    </p:set>
+                                  </p:childTnLst>
+                                </p:cTn>
+                              </p:par>
+                              <p:par>
+                                <p:cTn id="29" presetID="1" presetClass="entr" presetSubtype="0" fill="hold" nodeType="withEffect">
+                                  <p:stCondLst>
+                                    <p:cond delay="0"/>
+                                  </p:stCondLst>
+                                  <p:childTnLst>
+                                    <p:set>
+                                      <p:cBhvr>
+                                        <p:cTn id="30" dur="1" fill="hold">
+                                          <p:stCondLst>
+                                            <p:cond delay="0"/>
+                                          </p:stCondLst>
+                                        </p:cTn>
+                                        <p:tgtEl>
+                                          <p:spTgt spid="26"/>
+                                        </p:tgtEl>
+                                        <p:attrNameLst>
+                                          <p:attrName>style.visibility</p:attrName>
+                                        </p:attrNameLst>
+                                      </p:cBhvr>
+                                      <p:to>
+                                        <p:strVal val="visible"/>
+                                      </p:to>
+                                    </p:set>
+                                  </p:childTnLst>
+                                </p:cTn>
+                              </p:par>
+                              <p:par>
+                                <p:cTn id="31" presetID="1" presetClass="entr" presetSubtype="0" fill="hold" nodeType="withEffect">
+                                  <p:stCondLst>
+                                    <p:cond delay="0"/>
+                                  </p:stCondLst>
+                                  <p:childTnLst>
+                                    <p:set>
+                                      <p:cBhvr>
+                                        <p:cTn id="32" dur="1" fill="hold">
+                                          <p:stCondLst>
+                                            <p:cond delay="0"/>
+                                          </p:stCondLst>
+                                        </p:cTn>
+                                        <p:tgtEl>
+                                          <p:spTgt spid="28"/>
+                                        </p:tgtEl>
+                                        <p:attrNameLst>
+                                          <p:attrName>style.visibility</p:attrName>
+                                        </p:attrNameLst>
+                                      </p:cBhvr>
+                                      <p:to>
+                                        <p:strVal val="visible"/>
+                                      </p:to>
+                                    </p:set>
+                                  </p:childTnLst>
+                                </p:cTn>
+                              </p:par>
+                              <p:par>
+                                <p:cTn id="33" presetID="1" presetClass="entr" presetSubtype="0" fill="hold" nodeType="withEffect">
+                                  <p:stCondLst>
+                                    <p:cond delay="0"/>
+                                  </p:stCondLst>
+                                  <p:childTnLst>
+                                    <p:set>
+                                      <p:cBhvr>
+                                        <p:cTn id="34" dur="1" fill="hold">
+                                          <p:stCondLst>
+                                            <p:cond delay="0"/>
+                                          </p:stCondLst>
+                                        </p:cTn>
+                                        <p:tgtEl>
+                                          <p:spTgt spid="27"/>
+                                        </p:tgtEl>
+                                        <p:attrNameLst>
+                                          <p:attrName>style.visibility</p:attrName>
+                                        </p:attrNameLst>
+                                      </p:cBhvr>
+                                      <p:to>
+                                        <p:strVal val="visible"/>
+                                      </p:to>
+                                    </p:set>
+                                  </p:childTnLst>
+                                </p:cTn>
+                              </p:par>
+                            </p:childTnLst>
+                          </p:cTn>
+                        </p:par>
+                      </p:childTnLst>
+                    </p:cTn>
+                  </p:par>
+                </p:childTnLst>
+              </p:cTn>
+              <p:prevCondLst>
+                <p:cond evt="onPrev" delay="0">
+                  <p:tgtEl>
+                    <p:sldTgt/>
+                  </p:tgtEl>
+                </p:cond>
+              </p:prevCondLst>
+              <p:nextCondLst>
+                <p:cond evt="onNext" delay="0">
+                  <p:tgtEl>
+                    <p:sldTgt/>
+                  </p:tgtEl>
+                </p:cond>
+              </p:nextCondLst>
+            </p:seq>
+          </p:childTnLst>
+        </p:cTn>
+      </p:par>
+    </p:tnLst>
+    <p:bldLst>
+      <p:bldP spid="6" grpId="0"/>
+      <p:bldP spid="12" grpId="0"/>
+      <p:bldP spid="25" grpId="0"/>
+    </p:bldLst>
+  </p:timing>
+</p:sld>
+</file>
+
+<file path=ppt/slides/slide52.xml><?xml version="1.0" encoding="utf-8"?>
+<p:sld xmlns:a="http://schemas.openxmlformats.org/drawingml/2006/main" xmlns:r="http://schemas.openxmlformats.org/officeDocument/2006/relationships" xmlns:p="http://schemas.openxmlformats.org/presentationml/2006/main">
+  <p:cSld>
+    <p:spTree>
+      <p:nvGrpSpPr>
+        <p:cNvPr id="1" name=""/>
+        <p:cNvGrpSpPr/>
+        <p:nvPr/>
+      </p:nvGrpSpPr>
+      <p:grpSpPr>
+        <a:xfrm>
+          <a:off x="0" y="0"/>
+          <a:ext cx="0" cy="0"/>
+          <a:chOff x="0" y="0"/>
+          <a:chExt cx="0" cy="0"/>
+        </a:xfrm>
+      </p:grpSpPr>
+      <p:sp>
+        <p:nvSpPr>
+          <p:cNvPr id="2" name="Title 1">
+            <a:extLst>
+              <a:ext uri="{FF2B5EF4-FFF2-40B4-BE49-F238E27FC236}">
+                <a16:creationId xmlns:a16="http://schemas.microsoft.com/office/drawing/2014/main" id="{0BCA2CD2-7671-5FAC-E475-6074266365DE}"/>
+              </a:ext>
+            </a:extLst>
+          </p:cNvPr>
+          <p:cNvSpPr>
+            <a:spLocks noGrp="1"/>
+          </p:cNvSpPr>
+          <p:nvPr>
+            <p:ph type="title"/>
+          </p:nvPr>
+        </p:nvSpPr>
+        <p:spPr/>
+        <p:txBody>
+          <a:bodyPr/>
+          <a:lstStyle/>
+          <a:p>
+            <a:r>
+              <a:rPr lang="en-US" dirty="0"/>
+              <a:t>The </a:t>
+            </a:r>
+            <a:r>
+              <a:rPr lang="en-US" dirty="0" err="1"/>
+              <a:t>PyTensor</a:t>
+            </a:r>
+            <a:r>
+              <a:rPr lang="en-US" dirty="0"/>
+              <a:t> graphical visualization</a:t>
+            </a:r>
+            <a:endParaRPr lang="en-IL" dirty="0"/>
+          </a:p>
+        </p:txBody>
+      </p:sp>
+      <p:sp>
+        <p:nvSpPr>
+          <p:cNvPr id="3" name="Content Placeholder 2">
+            <a:extLst>
+              <a:ext uri="{FF2B5EF4-FFF2-40B4-BE49-F238E27FC236}">
+                <a16:creationId xmlns:a16="http://schemas.microsoft.com/office/drawing/2014/main" id="{D906BA4E-7156-BE20-B2A7-4006AEDC0385}"/>
+              </a:ext>
+            </a:extLst>
+          </p:cNvPr>
+          <p:cNvSpPr>
+            <a:spLocks noGrp="1"/>
+          </p:cNvSpPr>
+          <p:nvPr>
+            <p:ph idx="1"/>
+          </p:nvPr>
+        </p:nvSpPr>
+        <p:spPr/>
+        <p:txBody>
+          <a:bodyPr/>
+          <a:lstStyle/>
+          <a:p>
+            <a:endParaRPr lang="en-IL"/>
+          </a:p>
+        </p:txBody>
+      </p:sp>
+      <p:pic>
+        <p:nvPicPr>
+          <p:cNvPr id="4" name="Picture 3">
+            <a:extLst>
+              <a:ext uri="{FF2B5EF4-FFF2-40B4-BE49-F238E27FC236}">
+                <a16:creationId xmlns:a16="http://schemas.microsoft.com/office/drawing/2014/main" id="{B5F13272-F280-1BDE-B13A-44D8CD0FFA8A}"/>
+              </a:ext>
+            </a:extLst>
+          </p:cNvPr>
+          <p:cNvPicPr>
+            <a:picLocks noChangeAspect="1"/>
+          </p:cNvPicPr>
+          <p:nvPr/>
+        </p:nvPicPr>
+        <p:blipFill>
+          <a:blip r:embed="rId2"/>
+          <a:stretch>
+            <a:fillRect/>
+          </a:stretch>
+        </p:blipFill>
+        <p:spPr>
+          <a:xfrm>
+            <a:off x="380999" y="1751568"/>
+            <a:ext cx="11549133" cy="3861832"/>
+          </a:xfrm>
+          <a:prstGeom prst="rect">
+            <a:avLst/>
+          </a:prstGeom>
+        </p:spPr>
+      </p:pic>
+    </p:spTree>
+    <p:extLst>
+      <p:ext uri="{BB962C8B-B14F-4D97-AF65-F5344CB8AC3E}">
+        <p14:creationId xmlns:p14="http://schemas.microsoft.com/office/powerpoint/2010/main" val="3222122075"/>
+      </p:ext>
+    </p:extLst>
+  </p:cSld>
+  <p:clrMapOvr>
+    <a:masterClrMapping/>
+  </p:clrMapOvr>
+</p:sld>
+</file>
+
+<file path=ppt/slides/slide53.xml><?xml version="1.0" encoding="utf-8"?>
+<p:sld xmlns:a="http://schemas.openxmlformats.org/drawingml/2006/main" xmlns:r="http://schemas.openxmlformats.org/officeDocument/2006/relationships" xmlns:p="http://schemas.openxmlformats.org/presentationml/2006/main">
+  <p:cSld>
+    <p:spTree>
+      <p:nvGrpSpPr>
+        <p:cNvPr id="1" name=""/>
+        <p:cNvGrpSpPr/>
+        <p:nvPr/>
+      </p:nvGrpSpPr>
+      <p:grpSpPr>
+        <a:xfrm>
+          <a:off x="0" y="0"/>
+          <a:ext cx="0" cy="0"/>
+          <a:chOff x="0" y="0"/>
+          <a:chExt cx="0" cy="0"/>
+        </a:xfrm>
+      </p:grpSpPr>
+      <p:sp>
+        <p:nvSpPr>
+          <p:cNvPr id="2" name="Title 1">
+            <a:extLst>
+              <a:ext uri="{FF2B5EF4-FFF2-40B4-BE49-F238E27FC236}">
                 <a16:creationId xmlns:a16="http://schemas.microsoft.com/office/drawing/2014/main" id="{1DEA1B1A-3DBB-E992-5782-C0E49CCFF76A}"/>
               </a:ext>
             </a:extLst>
@@ -20113,7 +21305,7 @@
 </p:sld>
 </file>
 
-<file path=ppt/slides/slide51.xml><?xml version="1.0" encoding="utf-8"?>
+<file path=ppt/slides/slide54.xml><?xml version="1.0" encoding="utf-8"?>
 <p:sld xmlns:a="http://schemas.openxmlformats.org/drawingml/2006/main" xmlns:r="http://schemas.openxmlformats.org/officeDocument/2006/relationships" xmlns:p="http://schemas.openxmlformats.org/presentationml/2006/main">
   <p:cSld>
     <p:spTree>
@@ -20240,7 +21432,7 @@
 </p:sld>
 </file>
 
-<file path=ppt/slides/slide52.xml><?xml version="1.0" encoding="utf-8"?>
+<file path=ppt/slides/slide55.xml><?xml version="1.0" encoding="utf-8"?>
 <p:sld xmlns:a="http://schemas.openxmlformats.org/drawingml/2006/main" xmlns:r="http://schemas.openxmlformats.org/officeDocument/2006/relationships" xmlns:p="http://schemas.openxmlformats.org/presentationml/2006/main">
   <p:cSld>
     <p:spTree>
@@ -21268,428 +22460,6 @@
       <p:bldP spid="7" grpId="0" animBg="1"/>
     </p:bldLst>
   </p:timing>
-</p:sld>
-</file>
-
-<file path=ppt/slides/slide53.xml><?xml version="1.0" encoding="utf-8"?>
-<p:sld xmlns:a="http://schemas.openxmlformats.org/drawingml/2006/main" xmlns:r="http://schemas.openxmlformats.org/officeDocument/2006/relationships" xmlns:p="http://schemas.openxmlformats.org/presentationml/2006/main">
-  <p:cSld>
-    <p:spTree>
-      <p:nvGrpSpPr>
-        <p:cNvPr id="1" name=""/>
-        <p:cNvGrpSpPr/>
-        <p:nvPr/>
-      </p:nvGrpSpPr>
-      <p:grpSpPr>
-        <a:xfrm>
-          <a:off x="0" y="0"/>
-          <a:ext cx="0" cy="0"/>
-          <a:chOff x="0" y="0"/>
-          <a:chExt cx="0" cy="0"/>
-        </a:xfrm>
-      </p:grpSpPr>
-      <p:sp>
-        <p:nvSpPr>
-          <p:cNvPr id="2" name="Title 1">
-            <a:extLst>
-              <a:ext uri="{FF2B5EF4-FFF2-40B4-BE49-F238E27FC236}">
-                <a16:creationId xmlns:a16="http://schemas.microsoft.com/office/drawing/2014/main" id="{168FABAB-79B4-A6B1-BEF5-2A45076B7B02}"/>
-              </a:ext>
-            </a:extLst>
-          </p:cNvPr>
-          <p:cNvSpPr>
-            <a:spLocks noGrp="1"/>
-          </p:cNvSpPr>
-          <p:nvPr>
-            <p:ph type="title"/>
-          </p:nvPr>
-        </p:nvSpPr>
-        <p:spPr/>
-        <p:txBody>
-          <a:bodyPr/>
-          <a:lstStyle/>
-          <a:p>
-            <a:r>
-              <a:rPr lang="en-US" dirty="0"/>
-              <a:t>The Jacobian is a matrix that keeps track of partial derivatives for vector functions</a:t>
-            </a:r>
-            <a:endParaRPr lang="en-IL" dirty="0"/>
-          </a:p>
-        </p:txBody>
-      </p:sp>
-      <p:pic>
-        <p:nvPicPr>
-          <p:cNvPr id="5" name="Picture 4">
-            <a:extLst>
-              <a:ext uri="{FF2B5EF4-FFF2-40B4-BE49-F238E27FC236}">
-                <a16:creationId xmlns:a16="http://schemas.microsoft.com/office/drawing/2014/main" id="{8FA3046C-AA8B-8CA9-C809-BFCE23C70DE3}"/>
-              </a:ext>
-            </a:extLst>
-          </p:cNvPr>
-          <p:cNvPicPr>
-            <a:picLocks noChangeAspect="1"/>
-          </p:cNvPicPr>
-          <p:nvPr/>
-        </p:nvPicPr>
-        <p:blipFill>
-          <a:blip r:embed="rId2">
-            <a:extLst>
-              <a:ext uri="{28A0092B-C50C-407E-A947-70E740481C1C}">
-                <a14:useLocalDpi xmlns:a14="http://schemas.microsoft.com/office/drawing/2010/main" val="0"/>
-              </a:ext>
-            </a:extLst>
-          </a:blip>
-          <a:srcRect/>
-          <a:stretch/>
-        </p:blipFill>
-        <p:spPr>
-          <a:xfrm>
-            <a:off x="480027" y="2287057"/>
-            <a:ext cx="5355280" cy="3631142"/>
-          </a:xfrm>
-          <a:prstGeom prst="rect">
-            <a:avLst/>
-          </a:prstGeom>
-        </p:spPr>
-      </p:pic>
-      <p:graphicFrame>
-        <p:nvGraphicFramePr>
-          <p:cNvPr id="6" name="Object 5">
-            <a:extLst>
-              <a:ext uri="{FF2B5EF4-FFF2-40B4-BE49-F238E27FC236}">
-                <a16:creationId xmlns:a16="http://schemas.microsoft.com/office/drawing/2014/main" id="{111F68A8-FF81-5E99-A9E0-57C2BAC03373}"/>
-              </a:ext>
-            </a:extLst>
-          </p:cNvPr>
-          <p:cNvGraphicFramePr>
-            <a:graphicFrameLocks noChangeAspect="1"/>
-          </p:cNvGraphicFramePr>
-          <p:nvPr>
-            <p:extLst>
-              <p:ext uri="{D42A27DB-BD31-4B8C-83A1-F6EECF244321}">
-                <p14:modId xmlns:p14="http://schemas.microsoft.com/office/powerpoint/2010/main" val="3455624016"/>
-              </p:ext>
-            </p:extLst>
-          </p:nvPr>
-        </p:nvGraphicFramePr>
-        <p:xfrm>
-          <a:off x="7230533" y="2433331"/>
-          <a:ext cx="3850217" cy="3484868"/>
-        </p:xfrm>
-        <a:graphic>
-          <a:graphicData uri="http://schemas.openxmlformats.org/presentationml/2006/ole">
-            <mc:AlternateContent xmlns:mc="http://schemas.openxmlformats.org/markup-compatibility/2006">
-              <mc:Choice xmlns:v="urn:schemas-microsoft-com:vml" Requires="v">
-                <p:oleObj name="Equation" r:id="rId3" imgW="1739880" imgH="1574640" progId="Equation.DSMT4">
-                  <p:embed/>
-                </p:oleObj>
-              </mc:Choice>
-              <mc:Fallback>
-                <p:oleObj name="Equation" r:id="rId3" imgW="1739880" imgH="1574640" progId="Equation.DSMT4">
-                  <p:embed/>
-                  <p:pic>
-                    <p:nvPicPr>
-                      <p:cNvPr id="0" name=""/>
-                      <p:cNvPicPr/>
-                      <p:nvPr/>
-                    </p:nvPicPr>
-                    <p:blipFill>
-                      <a:blip r:embed="rId4"/>
-                      <a:stretch>
-                        <a:fillRect/>
-                      </a:stretch>
-                    </p:blipFill>
-                    <p:spPr>
-                      <a:xfrm>
-                        <a:off x="7230533" y="2433331"/>
-                        <a:ext cx="3850217" cy="3484868"/>
-                      </a:xfrm>
-                      <a:prstGeom prst="rect">
-                        <a:avLst/>
-                      </a:prstGeom>
-                    </p:spPr>
-                  </p:pic>
-                </p:oleObj>
-              </mc:Fallback>
-            </mc:AlternateContent>
-          </a:graphicData>
-        </a:graphic>
-      </p:graphicFrame>
-    </p:spTree>
-    <p:extLst>
-      <p:ext uri="{BB962C8B-B14F-4D97-AF65-F5344CB8AC3E}">
-        <p14:creationId xmlns:p14="http://schemas.microsoft.com/office/powerpoint/2010/main" val="1408951753"/>
-      </p:ext>
-    </p:extLst>
-  </p:cSld>
-  <p:clrMapOvr>
-    <a:masterClrMapping/>
-  </p:clrMapOvr>
-</p:sld>
-</file>
-
-<file path=ppt/slides/slide54.xml><?xml version="1.0" encoding="utf-8"?>
-<p:sld xmlns:a="http://schemas.openxmlformats.org/drawingml/2006/main" xmlns:r="http://schemas.openxmlformats.org/officeDocument/2006/relationships" xmlns:p="http://schemas.openxmlformats.org/presentationml/2006/main">
-  <p:cSld>
-    <p:spTree>
-      <p:nvGrpSpPr>
-        <p:cNvPr id="1" name="">
-          <a:extLst>
-            <a:ext uri="{FF2B5EF4-FFF2-40B4-BE49-F238E27FC236}">
-              <a16:creationId xmlns:a16="http://schemas.microsoft.com/office/drawing/2014/main" id="{B25C5126-1892-3EF7-01BA-94863F0FDB81}"/>
-            </a:ext>
-          </a:extLst>
-        </p:cNvPr>
-        <p:cNvGrpSpPr/>
-        <p:nvPr/>
-      </p:nvGrpSpPr>
-      <p:grpSpPr>
-        <a:xfrm>
-          <a:off x="0" y="0"/>
-          <a:ext cx="0" cy="0"/>
-          <a:chOff x="0" y="0"/>
-          <a:chExt cx="0" cy="0"/>
-        </a:xfrm>
-      </p:grpSpPr>
-      <p:sp>
-        <p:nvSpPr>
-          <p:cNvPr id="2" name="Title 1">
-            <a:extLst>
-              <a:ext uri="{FF2B5EF4-FFF2-40B4-BE49-F238E27FC236}">
-                <a16:creationId xmlns:a16="http://schemas.microsoft.com/office/drawing/2014/main" id="{D43B0B22-990C-A51E-E8B6-0654F8AED84D}"/>
-              </a:ext>
-            </a:extLst>
-          </p:cNvPr>
-          <p:cNvSpPr>
-            <a:spLocks noGrp="1"/>
-          </p:cNvSpPr>
-          <p:nvPr>
-            <p:ph type="title"/>
-          </p:nvPr>
-        </p:nvSpPr>
-        <p:spPr/>
-        <p:txBody>
-          <a:bodyPr>
-            <a:normAutofit fontScale="90000"/>
-          </a:bodyPr>
-          <a:lstStyle/>
-          <a:p>
-            <a:r>
-              <a:rPr lang="en-US" dirty="0"/>
-              <a:t>A tensor generalizes the Jacobian to keep track of partial derivatives for matrix functions</a:t>
-            </a:r>
-            <a:endParaRPr lang="en-IL" dirty="0"/>
-          </a:p>
-        </p:txBody>
-      </p:sp>
-      <p:pic>
-        <p:nvPicPr>
-          <p:cNvPr id="3" name="Picture 2">
-            <a:extLst>
-              <a:ext uri="{FF2B5EF4-FFF2-40B4-BE49-F238E27FC236}">
-                <a16:creationId xmlns:a16="http://schemas.microsoft.com/office/drawing/2014/main" id="{468B13E8-1DD9-CC33-7E2B-53BA17E7F08F}"/>
-              </a:ext>
-            </a:extLst>
-          </p:cNvPr>
-          <p:cNvPicPr>
-            <a:picLocks noChangeAspect="1"/>
-          </p:cNvPicPr>
-          <p:nvPr/>
-        </p:nvPicPr>
-        <p:blipFill>
-          <a:blip r:embed="rId2"/>
-          <a:stretch>
-            <a:fillRect/>
-          </a:stretch>
-        </p:blipFill>
-        <p:spPr>
-          <a:xfrm>
-            <a:off x="546945" y="2579157"/>
-            <a:ext cx="5549055" cy="3339042"/>
-          </a:xfrm>
-          <a:prstGeom prst="rect">
-            <a:avLst/>
-          </a:prstGeom>
-        </p:spPr>
-      </p:pic>
-      <p:graphicFrame>
-        <p:nvGraphicFramePr>
-          <p:cNvPr id="4" name="Object 3">
-            <a:extLst>
-              <a:ext uri="{FF2B5EF4-FFF2-40B4-BE49-F238E27FC236}">
-                <a16:creationId xmlns:a16="http://schemas.microsoft.com/office/drawing/2014/main" id="{6328CF83-07B9-1F03-6A23-F53E3090FBBA}"/>
-              </a:ext>
-            </a:extLst>
-          </p:cNvPr>
-          <p:cNvGraphicFramePr>
-            <a:graphicFrameLocks noChangeAspect="1"/>
-          </p:cNvGraphicFramePr>
-          <p:nvPr>
-            <p:extLst>
-              <p:ext uri="{D42A27DB-BD31-4B8C-83A1-F6EECF244321}">
-                <p14:modId xmlns:p14="http://schemas.microsoft.com/office/powerpoint/2010/main" val="174319225"/>
-              </p:ext>
-            </p:extLst>
-          </p:nvPr>
-        </p:nvGraphicFramePr>
-        <p:xfrm>
-          <a:off x="7589123" y="3317345"/>
-          <a:ext cx="2947644" cy="1593321"/>
-        </p:xfrm>
-        <a:graphic>
-          <a:graphicData uri="http://schemas.openxmlformats.org/presentationml/2006/ole">
-            <mc:AlternateContent xmlns:mc="http://schemas.openxmlformats.org/markup-compatibility/2006">
-              <mc:Choice xmlns:v="urn:schemas-microsoft-com:vml" Requires="v">
-                <p:oleObj name="Equation" r:id="rId3" imgW="939600" imgH="507960" progId="Equation.DSMT4">
-                  <p:embed/>
-                </p:oleObj>
-              </mc:Choice>
-              <mc:Fallback>
-                <p:oleObj name="Equation" r:id="rId3" imgW="939600" imgH="507960" progId="Equation.DSMT4">
-                  <p:embed/>
-                  <p:pic>
-                    <p:nvPicPr>
-                      <p:cNvPr id="0" name=""/>
-                      <p:cNvPicPr/>
-                      <p:nvPr/>
-                    </p:nvPicPr>
-                    <p:blipFill>
-                      <a:blip r:embed="rId4"/>
-                      <a:stretch>
-                        <a:fillRect/>
-                      </a:stretch>
-                    </p:blipFill>
-                    <p:spPr>
-                      <a:xfrm>
-                        <a:off x="7589123" y="3317345"/>
-                        <a:ext cx="2947644" cy="1593321"/>
-                      </a:xfrm>
-                      <a:prstGeom prst="rect">
-                        <a:avLst/>
-                      </a:prstGeom>
-                    </p:spPr>
-                  </p:pic>
-                </p:oleObj>
-              </mc:Fallback>
-            </mc:AlternateContent>
-          </a:graphicData>
-        </a:graphic>
-      </p:graphicFrame>
-    </p:spTree>
-    <p:extLst>
-      <p:ext uri="{BB962C8B-B14F-4D97-AF65-F5344CB8AC3E}">
-        <p14:creationId xmlns:p14="http://schemas.microsoft.com/office/powerpoint/2010/main" val="3916618626"/>
-      </p:ext>
-    </p:extLst>
-  </p:cSld>
-  <p:clrMapOvr>
-    <a:masterClrMapping/>
-  </p:clrMapOvr>
-</p:sld>
-</file>
-
-<file path=ppt/slides/slide55.xml><?xml version="1.0" encoding="utf-8"?>
-<p:sld xmlns:a="http://schemas.openxmlformats.org/drawingml/2006/main" xmlns:r="http://schemas.openxmlformats.org/officeDocument/2006/relationships" xmlns:p="http://schemas.openxmlformats.org/presentationml/2006/main">
-  <p:cSld>
-    <p:spTree>
-      <p:nvGrpSpPr>
-        <p:cNvPr id="1" name=""/>
-        <p:cNvGrpSpPr/>
-        <p:nvPr/>
-      </p:nvGrpSpPr>
-      <p:grpSpPr>
-        <a:xfrm>
-          <a:off x="0" y="0"/>
-          <a:ext cx="0" cy="0"/>
-          <a:chOff x="0" y="0"/>
-          <a:chExt cx="0" cy="0"/>
-        </a:xfrm>
-      </p:grpSpPr>
-      <p:sp>
-        <p:nvSpPr>
-          <p:cNvPr id="2" name="Title 1">
-            <a:extLst>
-              <a:ext uri="{FF2B5EF4-FFF2-40B4-BE49-F238E27FC236}">
-                <a16:creationId xmlns:a16="http://schemas.microsoft.com/office/drawing/2014/main" id="{1371D413-320D-D3EE-6093-47AC8E01493F}"/>
-              </a:ext>
-            </a:extLst>
-          </p:cNvPr>
-          <p:cNvSpPr>
-            <a:spLocks noGrp="1"/>
-          </p:cNvSpPr>
-          <p:nvPr>
-            <p:ph type="title"/>
-          </p:nvPr>
-        </p:nvSpPr>
-        <p:spPr/>
-        <p:txBody>
-          <a:bodyPr/>
-          <a:lstStyle/>
-          <a:p>
-            <a:r>
-              <a:rPr lang="en-US" dirty="0"/>
-              <a:t>Tensor processing is important</a:t>
-            </a:r>
-            <a:endParaRPr lang="en-IL" dirty="0"/>
-          </a:p>
-        </p:txBody>
-      </p:sp>
-      <p:sp>
-        <p:nvSpPr>
-          <p:cNvPr id="3" name="Content Placeholder 2">
-            <a:extLst>
-              <a:ext uri="{FF2B5EF4-FFF2-40B4-BE49-F238E27FC236}">
-                <a16:creationId xmlns:a16="http://schemas.microsoft.com/office/drawing/2014/main" id="{FD080D8A-CFCB-4014-E85F-252D0EB3F707}"/>
-              </a:ext>
-            </a:extLst>
-          </p:cNvPr>
-          <p:cNvSpPr>
-            <a:spLocks noGrp="1"/>
-          </p:cNvSpPr>
-          <p:nvPr>
-            <p:ph idx="1"/>
-          </p:nvPr>
-        </p:nvSpPr>
-        <p:spPr/>
-        <p:txBody>
-          <a:bodyPr>
-            <a:normAutofit/>
-          </a:bodyPr>
-          <a:lstStyle/>
-          <a:p>
-            <a:r>
-              <a:rPr lang="en-US" sz="2400" dirty="0"/>
-              <a:t>Modern machine learning does calculations with very large multi-dimensional matrixes</a:t>
-            </a:r>
-          </a:p>
-          <a:p>
-            <a:r>
-              <a:rPr lang="en-US" sz="2400" dirty="0"/>
-              <a:t>Probabilistic models are nodes with multi-dimensional input and output</a:t>
-            </a:r>
-          </a:p>
-          <a:p>
-            <a:endParaRPr lang="en-US" sz="2400" dirty="0"/>
-          </a:p>
-          <a:p>
-            <a:r>
-              <a:rPr lang="en-US" sz="2400" dirty="0"/>
-              <a:t>Both fields need automatic differentiation!</a:t>
-            </a:r>
-            <a:endParaRPr lang="en-IL" sz="2400" dirty="0"/>
-          </a:p>
-        </p:txBody>
-      </p:sp>
-    </p:spTree>
-    <p:extLst>
-      <p:ext uri="{BB962C8B-B14F-4D97-AF65-F5344CB8AC3E}">
-        <p14:creationId xmlns:p14="http://schemas.microsoft.com/office/powerpoint/2010/main" val="3637288679"/>
-      </p:ext>
-    </p:extLst>
-  </p:cSld>
-  <p:clrMapOvr>
-    <a:masterClrMapping/>
-  </p:clrMapOvr>
 </p:sld>
 </file>
 

</xml_diff>